<commit_message>
Mac port name update, doc update
</commit_message>
<xml_diff>
--- a/SL-MK3 Extension.pptx
+++ b/SL-MK3 Extension.pptx
@@ -5,13 +5,15 @@
     <p:sldMasterId id="2147483660" r:id="rId1"/>
   </p:sldMasterIdLst>
   <p:sldIdLst>
-    <p:sldId id="262" r:id="rId2"/>
-    <p:sldId id="258" r:id="rId3"/>
-    <p:sldId id="263" r:id="rId4"/>
-    <p:sldId id="265" r:id="rId5"/>
-    <p:sldId id="267" r:id="rId6"/>
-    <p:sldId id="264" r:id="rId7"/>
-    <p:sldId id="266" r:id="rId8"/>
+    <p:sldId id="268" r:id="rId2"/>
+    <p:sldId id="262" r:id="rId3"/>
+    <p:sldId id="258" r:id="rId4"/>
+    <p:sldId id="263" r:id="rId5"/>
+    <p:sldId id="265" r:id="rId6"/>
+    <p:sldId id="267" r:id="rId7"/>
+    <p:sldId id="264" r:id="rId8"/>
+    <p:sldId id="266" r:id="rId9"/>
+    <p:sldId id="269" r:id="rId10"/>
   </p:sldIdLst>
   <p:sldSz cx="9144000" cy="6858000" type="screen4x3"/>
   <p:notesSz cx="6858000" cy="9144000"/>
@@ -249,7 +251,7 @@
           <a:p>
             <a:fld id="{95339B3D-D54B-4A71-BAD3-52665AB11A2C}" type="datetimeFigureOut">
               <a:rPr lang="en-US" smtClean="0"/>
-              <a:t>3/12/2023</a:t>
+              <a:t>3/28/2023</a:t>
             </a:fld>
             <a:endParaRPr lang="en-US"/>
           </a:p>
@@ -419,7 +421,7 @@
           <a:p>
             <a:fld id="{95339B3D-D54B-4A71-BAD3-52665AB11A2C}" type="datetimeFigureOut">
               <a:rPr lang="en-US" smtClean="0"/>
-              <a:t>3/12/2023</a:t>
+              <a:t>3/28/2023</a:t>
             </a:fld>
             <a:endParaRPr lang="en-US"/>
           </a:p>
@@ -599,7 +601,7 @@
           <a:p>
             <a:fld id="{95339B3D-D54B-4A71-BAD3-52665AB11A2C}" type="datetimeFigureOut">
               <a:rPr lang="en-US" smtClean="0"/>
-              <a:t>3/12/2023</a:t>
+              <a:t>3/28/2023</a:t>
             </a:fld>
             <a:endParaRPr lang="en-US"/>
           </a:p>
@@ -769,7 +771,7 @@
           <a:p>
             <a:fld id="{95339B3D-D54B-4A71-BAD3-52665AB11A2C}" type="datetimeFigureOut">
               <a:rPr lang="en-US" smtClean="0"/>
-              <a:t>3/12/2023</a:t>
+              <a:t>3/28/2023</a:t>
             </a:fld>
             <a:endParaRPr lang="en-US"/>
           </a:p>
@@ -1013,7 +1015,7 @@
           <a:p>
             <a:fld id="{95339B3D-D54B-4A71-BAD3-52665AB11A2C}" type="datetimeFigureOut">
               <a:rPr lang="en-US" smtClean="0"/>
-              <a:t>3/12/2023</a:t>
+              <a:t>3/28/2023</a:t>
             </a:fld>
             <a:endParaRPr lang="en-US"/>
           </a:p>
@@ -1245,7 +1247,7 @@
           <a:p>
             <a:fld id="{95339B3D-D54B-4A71-BAD3-52665AB11A2C}" type="datetimeFigureOut">
               <a:rPr lang="en-US" smtClean="0"/>
-              <a:t>3/12/2023</a:t>
+              <a:t>3/28/2023</a:t>
             </a:fld>
             <a:endParaRPr lang="en-US"/>
           </a:p>
@@ -1612,7 +1614,7 @@
           <a:p>
             <a:fld id="{95339B3D-D54B-4A71-BAD3-52665AB11A2C}" type="datetimeFigureOut">
               <a:rPr lang="en-US" smtClean="0"/>
-              <a:t>3/12/2023</a:t>
+              <a:t>3/28/2023</a:t>
             </a:fld>
             <a:endParaRPr lang="en-US"/>
           </a:p>
@@ -1730,7 +1732,7 @@
           <a:p>
             <a:fld id="{95339B3D-D54B-4A71-BAD3-52665AB11A2C}" type="datetimeFigureOut">
               <a:rPr lang="en-US" smtClean="0"/>
-              <a:t>3/12/2023</a:t>
+              <a:t>3/28/2023</a:t>
             </a:fld>
             <a:endParaRPr lang="en-US"/>
           </a:p>
@@ -1825,7 +1827,7 @@
           <a:p>
             <a:fld id="{95339B3D-D54B-4A71-BAD3-52665AB11A2C}" type="datetimeFigureOut">
               <a:rPr lang="en-US" smtClean="0"/>
-              <a:t>3/12/2023</a:t>
+              <a:t>3/28/2023</a:t>
             </a:fld>
             <a:endParaRPr lang="en-US"/>
           </a:p>
@@ -2102,7 +2104,7 @@
           <a:p>
             <a:fld id="{95339B3D-D54B-4A71-BAD3-52665AB11A2C}" type="datetimeFigureOut">
               <a:rPr lang="en-US" smtClean="0"/>
-              <a:t>3/12/2023</a:t>
+              <a:t>3/28/2023</a:t>
             </a:fld>
             <a:endParaRPr lang="en-US"/>
           </a:p>
@@ -2359,7 +2361,7 @@
           <a:p>
             <a:fld id="{95339B3D-D54B-4A71-BAD3-52665AB11A2C}" type="datetimeFigureOut">
               <a:rPr lang="en-US" smtClean="0"/>
-              <a:t>3/12/2023</a:t>
+              <a:t>3/28/2023</a:t>
             </a:fld>
             <a:endParaRPr lang="en-US"/>
           </a:p>
@@ -2572,7 +2574,7 @@
           <a:p>
             <a:fld id="{95339B3D-D54B-4A71-BAD3-52665AB11A2C}" type="datetimeFigureOut">
               <a:rPr lang="en-US" smtClean="0"/>
-              <a:t>3/12/2023</a:t>
+              <a:t>3/28/2023</a:t>
             </a:fld>
             <a:endParaRPr lang="en-US"/>
           </a:p>
@@ -2986,7 +2988,7 @@
         <p:spPr>
           <a:xfrm>
             <a:off x="362992" y="369537"/>
-            <a:ext cx="8095208" cy="6093976"/>
+            <a:ext cx="8095208" cy="5724644"/>
           </a:xfrm>
           <a:prstGeom prst="rect">
             <a:avLst/>
@@ -3001,16 +3003,68 @@
           <a:p>
             <a:r>
               <a:rPr lang="en-US" sz="1400" b="1" dirty="0"/>
-              <a:t>Overview of the Novation SL-MK3 Extension</a:t>
-            </a:r>
-          </a:p>
-          <a:p>
-            <a:endParaRPr lang="en-US" sz="1200" dirty="0"/>
-          </a:p>
-          <a:p>
-            <a:r>
-              <a:rPr lang="en-US" sz="1200" dirty="0"/>
-              <a:t>The SL-MK3 offers an “InControl” mode and protocol that allows DAWs and programs like </a:t>
+              <a:t>Getting Started with the SL-MK3 Extension</a:t>
+            </a:r>
+          </a:p>
+          <a:p>
+            <a:r>
+              <a:rPr lang="en-US" sz="1200" dirty="0"/>
+              <a:t>Follow these simple steps to get started:</a:t>
+            </a:r>
+          </a:p>
+          <a:p>
+            <a:pPr marL="628650" lvl="1" indent="-171450">
+              <a:buFont typeface="Arial" panose="020B0604020202020204" pitchFamily="34" charset="0"/>
+              <a:buChar char="•"/>
+            </a:pPr>
+            <a:r>
+              <a:rPr lang="en-US" sz="1200" dirty="0"/>
+              <a:t>Download the zip file for your platform (Mac or Windows) from </a:t>
+            </a:r>
+            <a:r>
+              <a:rPr lang="en-US" sz="1200" dirty="0">
+                <a:hlinkClick r:id="rId2"/>
+              </a:rPr>
+              <a:t>Releases · </a:t>
+            </a:r>
+            <a:r>
+              <a:rPr lang="en-US" sz="1200" dirty="0" err="1">
+                <a:hlinkClick r:id="rId2"/>
+              </a:rPr>
+              <a:t>WidnerM</a:t>
+            </a:r>
+            <a:r>
+              <a:rPr lang="en-US" sz="1200" dirty="0">
+                <a:hlinkClick r:id="rId2"/>
+              </a:rPr>
+              <a:t>/GP-SL-MK3 (github.com)</a:t>
+            </a:r>
+            <a:endParaRPr lang="en-US" sz="1200" dirty="0"/>
+          </a:p>
+          <a:p>
+            <a:pPr marL="628650" lvl="1" indent="-171450">
+              <a:buFont typeface="Arial" panose="020B0604020202020204" pitchFamily="34" charset="0"/>
+              <a:buChar char="•"/>
+            </a:pPr>
+            <a:r>
+              <a:rPr lang="en-US" sz="1200" dirty="0"/>
+              <a:t>From the zip file install the extension (.</a:t>
+            </a:r>
+            <a:r>
+              <a:rPr lang="en-US" sz="1200" dirty="0" err="1"/>
+              <a:t>dylib</a:t>
+            </a:r>
+            <a:r>
+              <a:rPr lang="en-US" sz="1200" dirty="0"/>
+              <a:t> for Mac, .</a:t>
+            </a:r>
+            <a:r>
+              <a:rPr lang="en-US" sz="1200" dirty="0" err="1"/>
+              <a:t>dll</a:t>
+            </a:r>
+            <a:r>
+              <a:rPr lang="en-US" sz="1200" dirty="0"/>
+              <a:t> for Windows) to the appropriate </a:t>
             </a:r>
             <a:r>
               <a:rPr lang="en-US" sz="1200" dirty="0" err="1"/>
@@ -3018,7 +3072,295 @@
             </a:r>
             <a:r>
               <a:rPr lang="en-US" sz="1200" dirty="0"/>
-              <a:t> to utilize the displays and controls at a granular level.  This extension works with the SL-MK3 when enabling “InControl” mode using the “InControl” button on the SL-MK3.</a:t>
+              <a:t> folder</a:t>
+            </a:r>
+          </a:p>
+          <a:p>
+            <a:pPr marL="1085850" lvl="2" indent="-171450">
+              <a:buFont typeface="Arial" panose="020B0604020202020204" pitchFamily="34" charset="0"/>
+              <a:buChar char="•"/>
+            </a:pPr>
+            <a:r>
+              <a:rPr lang="en-US" sz="1200" dirty="0"/>
+              <a:t>/Users/Shared/Gig Performer/Extensions on Mac</a:t>
+            </a:r>
+          </a:p>
+          <a:p>
+            <a:pPr marL="1085850" lvl="2" indent="-171450">
+              <a:buFont typeface="Arial" panose="020B0604020202020204" pitchFamily="34" charset="0"/>
+              <a:buChar char="•"/>
+            </a:pPr>
+            <a:r>
+              <a:rPr lang="en-US" sz="1200" dirty="0"/>
+              <a:t>C:/Users/Public/Documents/Gig Performer/Extensions on Windows</a:t>
+            </a:r>
+          </a:p>
+          <a:p>
+            <a:pPr marL="628650" lvl="1" indent="-171450">
+              <a:buFont typeface="Arial" panose="020B0604020202020204" pitchFamily="34" charset="0"/>
+              <a:buChar char="•"/>
+            </a:pPr>
+            <a:r>
+              <a:rPr lang="en-US" sz="1200" dirty="0"/>
+              <a:t>Load the Demo </a:t>
+            </a:r>
+            <a:r>
+              <a:rPr lang="en-US" sz="1200" dirty="0" err="1"/>
+              <a:t>gigfile</a:t>
+            </a:r>
+            <a:r>
+              <a:rPr lang="en-US" sz="1200" dirty="0"/>
+              <a:t> from the zip file in </a:t>
+            </a:r>
+            <a:r>
+              <a:rPr lang="en-US" sz="1200" dirty="0" err="1"/>
+              <a:t>GigPerformer</a:t>
+            </a:r>
+            <a:endParaRPr lang="en-US" sz="1200" dirty="0"/>
+          </a:p>
+          <a:p>
+            <a:pPr marL="628650" lvl="1" indent="-171450">
+              <a:buFont typeface="Arial" panose="020B0604020202020204" pitchFamily="34" charset="0"/>
+              <a:buChar char="•"/>
+            </a:pPr>
+            <a:r>
+              <a:rPr lang="en-US" sz="1200" dirty="0"/>
+              <a:t>Make sure your controller is in InControl mode by pressing the InControl button</a:t>
+            </a:r>
+          </a:p>
+          <a:p>
+            <a:pPr marL="628650" lvl="1" indent="-171450">
+              <a:buFont typeface="Arial" panose="020B0604020202020204" pitchFamily="34" charset="0"/>
+              <a:buChar char="•"/>
+            </a:pPr>
+            <a:r>
+              <a:rPr lang="en-US" sz="1200" dirty="0"/>
+              <a:t>You may need to exit and restart </a:t>
+            </a:r>
+            <a:r>
+              <a:rPr lang="en-US" sz="1200" dirty="0" err="1"/>
+              <a:t>GigPerformer</a:t>
+            </a:r>
+            <a:r>
+              <a:rPr lang="en-US" sz="1200" dirty="0"/>
+              <a:t> after the first time you enable the extension</a:t>
+            </a:r>
+          </a:p>
+          <a:p>
+            <a:endParaRPr lang="en-US" sz="1200" dirty="0"/>
+          </a:p>
+          <a:p>
+            <a:r>
+              <a:rPr lang="en-US" sz="1400" b="1" dirty="0"/>
+              <a:t>Setting the MIDI Ports</a:t>
+            </a:r>
+          </a:p>
+          <a:p>
+            <a:endParaRPr lang="en-US" sz="1200" dirty="0"/>
+          </a:p>
+          <a:p>
+            <a:r>
+              <a:rPr lang="en-US" sz="1200" dirty="0"/>
+              <a:t>The extension should automatically find your controller’s MIDI ports using their default names. If it does not, you can tell the extension which MIDI ports to use by creating two text widgets in the global </a:t>
+            </a:r>
+            <a:r>
+              <a:rPr lang="en-US" sz="1200" dirty="0" err="1"/>
+              <a:t>rackspace</a:t>
+            </a:r>
+            <a:r>
+              <a:rPr lang="en-US" sz="1200" dirty="0"/>
+              <a:t> and setting them appropriately</a:t>
+            </a:r>
+            <a:r>
+              <a:rPr lang="sv-SE" sz="1200" dirty="0"/>
+              <a:t>.</a:t>
+            </a:r>
+          </a:p>
+          <a:p>
+            <a:endParaRPr lang="sv-SE" sz="1200" dirty="0"/>
+          </a:p>
+          <a:p>
+            <a:r>
+              <a:rPr lang="en-US" sz="1200" dirty="0"/>
+              <a:t>These widgets must be named “</a:t>
+            </a:r>
+            <a:r>
+              <a:rPr lang="en-US" sz="1200" dirty="0" err="1"/>
+              <a:t>sl_midiin</a:t>
+            </a:r>
+            <a:r>
+              <a:rPr lang="en-US" sz="1200" dirty="0"/>
+              <a:t>” and “</a:t>
+            </a:r>
+            <a:r>
+              <a:rPr lang="en-US" sz="1200" dirty="0" err="1"/>
+              <a:t>sl_midiout</a:t>
+            </a:r>
+            <a:r>
+              <a:rPr lang="en-US" sz="1200" dirty="0"/>
+              <a:t>” (using the Advanced tab in the “OSC/</a:t>
+            </a:r>
+            <a:r>
+              <a:rPr lang="en-US" sz="1200" dirty="0" err="1"/>
+              <a:t>GPScript</a:t>
+            </a:r>
+            <a:r>
+              <a:rPr lang="en-US" sz="1200" dirty="0"/>
+              <a:t> Name” field).</a:t>
+            </a:r>
+          </a:p>
+          <a:p>
+            <a:r>
+              <a:rPr lang="en-US" sz="1200" dirty="0"/>
+              <a:t>Set the Caption for these widgets (on the General tab) to the MIDI port names exactly as they appear in the GP MIDI ports list.</a:t>
+            </a:r>
+          </a:p>
+          <a:p>
+            <a:endParaRPr lang="en-US" sz="1200" dirty="0"/>
+          </a:p>
+          <a:p>
+            <a:endParaRPr lang="sv-SE" sz="1200" dirty="0"/>
+          </a:p>
+          <a:p>
+            <a:r>
+              <a:rPr lang="en-US" sz="1400" b="1" dirty="0"/>
+              <a:t>Basic Operations and Troubleshooting</a:t>
+            </a:r>
+          </a:p>
+          <a:p>
+            <a:endParaRPr lang="sv-SE" sz="1200" dirty="0"/>
+          </a:p>
+          <a:p>
+            <a:r>
+              <a:rPr lang="en-US" sz="1200" dirty="0"/>
+              <a:t>Without any widgets configured you should see your </a:t>
+            </a:r>
+            <a:r>
+              <a:rPr lang="en-US" sz="1200" dirty="0" err="1"/>
+              <a:t>Rackspaces</a:t>
+            </a:r>
+            <a:r>
+              <a:rPr lang="en-US" sz="1200" dirty="0"/>
+              <a:t> / Variations / Songs / </a:t>
+            </a:r>
+            <a:r>
+              <a:rPr lang="en-US" sz="1200" dirty="0" err="1"/>
+              <a:t>Songparts</a:t>
+            </a:r>
+            <a:r>
+              <a:rPr lang="en-US" sz="1200" dirty="0"/>
+              <a:t> listed on the bottom row of the display.</a:t>
+            </a:r>
+            <a:r>
+              <a:rPr lang="sv-SE" sz="1200" dirty="0"/>
+              <a:t>  You can switch between them using the Grid and Clear keys and cycle through using the arrows toward the lower left of the keyboard.</a:t>
+            </a:r>
+          </a:p>
+          <a:p>
+            <a:endParaRPr lang="sv-SE" sz="1200" dirty="0"/>
+          </a:p>
+          <a:p>
+            <a:r>
+              <a:rPr lang="sv-SE" sz="1200" dirty="0"/>
+              <a:t>The naming conventions for other widgets is the main subject of the remainder of this document.</a:t>
+            </a:r>
+            <a:endParaRPr lang="en-US" sz="1200" dirty="0"/>
+          </a:p>
+          <a:p>
+            <a:endParaRPr lang="sv-SE" sz="1200" dirty="0"/>
+          </a:p>
+          <a:p>
+            <a:r>
+              <a:rPr lang="en-US" sz="1200" b="1" i="1" dirty="0"/>
+              <a:t>To sync your Rackspace with the SL-MK3 after adding new control widgets you should change </a:t>
+            </a:r>
+            <a:r>
+              <a:rPr lang="en-US" sz="1200" b="1" i="1" dirty="0" err="1"/>
+              <a:t>Rackspaces</a:t>
+            </a:r>
+            <a:r>
+              <a:rPr lang="en-US" sz="1200" b="1" i="1" dirty="0"/>
+              <a:t>, then come back</a:t>
+            </a:r>
+            <a:r>
+              <a:rPr lang="en-US" sz="1200" dirty="0"/>
+              <a:t>.  This is necessary because the extension scans widget names upon Rackspace entry.  It doesn’t know you renamed widgets until you change </a:t>
+            </a:r>
+            <a:r>
+              <a:rPr lang="en-US" sz="1200" dirty="0" err="1"/>
+              <a:t>Rackspaces</a:t>
+            </a:r>
+            <a:r>
+              <a:rPr lang="en-US" sz="1200" dirty="0"/>
+              <a:t> and return.</a:t>
+            </a:r>
+          </a:p>
+        </p:txBody>
+      </p:sp>
+    </p:spTree>
+    <p:extLst>
+      <p:ext uri="{BB962C8B-B14F-4D97-AF65-F5344CB8AC3E}">
+        <p14:creationId xmlns:p14="http://schemas.microsoft.com/office/powerpoint/2010/main" val="3146490023"/>
+      </p:ext>
+    </p:extLst>
+  </p:cSld>
+  <p:clrMapOvr>
+    <a:masterClrMapping/>
+  </p:clrMapOvr>
+</p:sld>
+</file>
+
+<file path=ppt/slides/slide2.xml><?xml version="1.0" encoding="utf-8"?>
+<p:sld xmlns:a="http://schemas.openxmlformats.org/drawingml/2006/main" xmlns:r="http://schemas.openxmlformats.org/officeDocument/2006/relationships" xmlns:p="http://schemas.openxmlformats.org/presentationml/2006/main">
+  <p:cSld>
+    <p:spTree>
+      <p:nvGrpSpPr>
+        <p:cNvPr id="1" name=""/>
+        <p:cNvGrpSpPr/>
+        <p:nvPr/>
+      </p:nvGrpSpPr>
+      <p:grpSpPr>
+        <a:xfrm>
+          <a:off x="0" y="0"/>
+          <a:ext cx="0" cy="0"/>
+          <a:chOff x="0" y="0"/>
+          <a:chExt cx="0" cy="0"/>
+        </a:xfrm>
+      </p:grpSpPr>
+      <p:sp>
+        <p:nvSpPr>
+          <p:cNvPr id="4" name="TextBox 3"/>
+          <p:cNvSpPr txBox="1"/>
+          <p:nvPr/>
+        </p:nvSpPr>
+        <p:spPr>
+          <a:xfrm>
+            <a:off x="362992" y="369537"/>
+            <a:ext cx="8095208" cy="5909310"/>
+          </a:xfrm>
+          <a:prstGeom prst="rect">
+            <a:avLst/>
+          </a:prstGeom>
+          <a:noFill/>
+        </p:spPr>
+        <p:txBody>
+          <a:bodyPr wrap="square" rtlCol="0">
+            <a:spAutoFit/>
+          </a:bodyPr>
+          <a:lstStyle/>
+          <a:p>
+            <a:r>
+              <a:rPr lang="en-US" sz="1400" b="1" dirty="0"/>
+              <a:t>Overview of the Novation SL-MK3 Extension</a:t>
+            </a:r>
+          </a:p>
+          <a:p>
+            <a:endParaRPr lang="en-US" sz="1200" dirty="0"/>
+          </a:p>
+          <a:p>
+            <a:r>
+              <a:rPr lang="en-US" sz="1200" dirty="0"/>
+              <a:t>This extension works with the SL-MK3 by taking control of the displays, buttons, and pads when “InControl” mode is enabled using the “InControl” button on the SL-MK3.</a:t>
             </a:r>
           </a:p>
           <a:p>
@@ -3146,7 +3488,7 @@
           <a:p>
             <a:r>
               <a:rPr lang="en-US" sz="1200" dirty="0"/>
-              <a:t>Every button, pad, display section, and LED on the SL-MK3 can be programmed with RGB colors.  Because only so much information can be attached to a knob widget, for example, the extension will often look for information on additional widgets to control how they are displayed on the SL-MK3.</a:t>
+              <a:t>Every button, pad, display section, and LED on the SL-MK3 can be programmed with RGB colors.  Because only so much information can be attached to a knob widget, for example, the extension will look for information on additional widgets to control how they are displayed on the SL-MK3.</a:t>
             </a:r>
           </a:p>
           <a:p>
@@ -3203,7 +3545,7 @@
 </p:sld>
 </file>
 
-<file path=ppt/slides/slide2.xml><?xml version="1.0" encoding="utf-8"?>
+<file path=ppt/slides/slide3.xml><?xml version="1.0" encoding="utf-8"?>
 <p:sld xmlns:a="http://schemas.openxmlformats.org/drawingml/2006/main" xmlns:r="http://schemas.openxmlformats.org/officeDocument/2006/relationships" xmlns:p="http://schemas.openxmlformats.org/presentationml/2006/main">
   <p:cSld>
     <p:spTree>
@@ -3908,253 +4250,6 @@
 </p:sld>
 </file>
 
-<file path=ppt/slides/slide3.xml><?xml version="1.0" encoding="utf-8"?>
-<p:sld xmlns:a="http://schemas.openxmlformats.org/drawingml/2006/main" xmlns:r="http://schemas.openxmlformats.org/officeDocument/2006/relationships" xmlns:p="http://schemas.openxmlformats.org/presentationml/2006/main">
-  <p:cSld>
-    <p:spTree>
-      <p:nvGrpSpPr>
-        <p:cNvPr id="1" name=""/>
-        <p:cNvGrpSpPr/>
-        <p:nvPr/>
-      </p:nvGrpSpPr>
-      <p:grpSpPr>
-        <a:xfrm>
-          <a:off x="0" y="0"/>
-          <a:ext cx="0" cy="0"/>
-          <a:chOff x="0" y="0"/>
-          <a:chExt cx="0" cy="0"/>
-        </a:xfrm>
-      </p:grpSpPr>
-      <p:sp>
-        <p:nvSpPr>
-          <p:cNvPr id="4" name="TextBox 3"/>
-          <p:cNvSpPr txBox="1"/>
-          <p:nvPr/>
-        </p:nvSpPr>
-        <p:spPr>
-          <a:xfrm>
-            <a:off x="362992" y="369537"/>
-            <a:ext cx="8095208" cy="6247864"/>
-          </a:xfrm>
-          <a:prstGeom prst="rect">
-            <a:avLst/>
-          </a:prstGeom>
-          <a:noFill/>
-        </p:spPr>
-        <p:txBody>
-          <a:bodyPr wrap="square" rtlCol="0">
-            <a:spAutoFit/>
-          </a:bodyPr>
-          <a:lstStyle/>
-          <a:p>
-            <a:r>
-              <a:rPr lang="en-US" sz="1400" b="1" dirty="0"/>
-              <a:t>Parameter Widgets</a:t>
-            </a:r>
-          </a:p>
-          <a:p>
-            <a:endParaRPr lang="en-US" sz="1400" b="1" dirty="0"/>
-          </a:p>
-          <a:p>
-            <a:r>
-              <a:rPr lang="en-US" sz="1200" dirty="0"/>
-              <a:t>“Parameter Widgets” can be used to specify how “Control Widgets” appear on the SL-MK3.  Parameter Widgets are not strictly necessary, but without them everything will appear using default colors and labels on the SL-MK3.</a:t>
-            </a:r>
-          </a:p>
-          <a:p>
-            <a:endParaRPr lang="en-US" sz="1200" dirty="0"/>
-          </a:p>
-          <a:p>
-            <a:r>
-              <a:rPr lang="en-US" sz="1200" dirty="0"/>
-              <a:t>Parameter Widgets associated with buttons and pads control the RGB “on” and “off” colors on the SL-MK3.  Parameter Widgets for knobs control the knob color, the bar color above the knob, and optionally the resolution of the knobs.</a:t>
-            </a:r>
-          </a:p>
-          <a:p>
-            <a:endParaRPr lang="en-US" sz="1200" dirty="0"/>
-          </a:p>
-          <a:p>
-            <a:r>
-              <a:rPr lang="en-US" sz="1200" dirty="0"/>
-              <a:t>Parameter Widgets can be created at the bank level (for controlling colors of the entire bank) or at the individual widget level.</a:t>
-            </a:r>
-          </a:p>
-          <a:p>
-            <a:endParaRPr lang="en-US" sz="1200" dirty="0"/>
-          </a:p>
-          <a:p>
-            <a:r>
-              <a:rPr lang="en-US" sz="1200" dirty="0"/>
-              <a:t>Parameter Widgets use the same general naming format as Control Widgets, but append a “p” to the “type” field.</a:t>
-            </a:r>
-          </a:p>
-          <a:p>
-            <a:r>
-              <a:rPr lang="en-US" sz="1200" dirty="0"/>
-              <a:t>	e.g., Control Widget “sl_k_pan_0” can have an associated Parameter Widget “sl_kp_pan_0”</a:t>
-            </a:r>
-          </a:p>
-          <a:p>
-            <a:endParaRPr lang="en-US" sz="1200" dirty="0"/>
-          </a:p>
-          <a:p>
-            <a:r>
-              <a:rPr lang="en-US" sz="1200" dirty="0"/>
-              <a:t>Parameter Widgets intended to operate at the bank level append “p” to the “type” and drop the “_position” part of the name</a:t>
-            </a:r>
-          </a:p>
-          <a:p>
-            <a:r>
-              <a:rPr lang="en-US" sz="1200" dirty="0"/>
-              <a:t>	e.g., Parameter Widget “</a:t>
-            </a:r>
-            <a:r>
-              <a:rPr lang="en-US" sz="1200" dirty="0" err="1"/>
-              <a:t>sl_kp_pan</a:t>
-            </a:r>
-            <a:r>
-              <a:rPr lang="en-US" sz="1200" dirty="0"/>
-              <a:t>” would apply to all of the knobs with </a:t>
-            </a:r>
-            <a:r>
-              <a:rPr lang="en-US" sz="1200" dirty="0" err="1"/>
-              <a:t>BankID</a:t>
-            </a:r>
-            <a:r>
-              <a:rPr lang="en-US" sz="1200" dirty="0"/>
-              <a:t> “pan”</a:t>
-            </a:r>
-          </a:p>
-          <a:p>
-            <a:endParaRPr lang="en-US" sz="1200" dirty="0"/>
-          </a:p>
-          <a:p>
-            <a:r>
-              <a:rPr lang="en-US" sz="1200" dirty="0"/>
-              <a:t>Individual parameter widgets take priority over bank parameter widgets if both exist</a:t>
-            </a:r>
-          </a:p>
-          <a:p>
-            <a:pPr marL="457200" indent="-457200"/>
-            <a:r>
-              <a:rPr lang="en-US" sz="1200" dirty="0"/>
-              <a:t>	e.g., widget “</a:t>
-            </a:r>
-            <a:r>
-              <a:rPr lang="en-US" sz="1200" dirty="0" err="1"/>
-              <a:t>sl_kp_pan</a:t>
-            </a:r>
-            <a:r>
-              <a:rPr lang="en-US" sz="1200" dirty="0"/>
-              <a:t>” will control the default knob color for the “pan” knob bank, but widget “sl_kp_pan_3” can be used to override that color for that knob</a:t>
-            </a:r>
-          </a:p>
-          <a:p>
-            <a:endParaRPr lang="en-US" sz="1200" dirty="0"/>
-          </a:p>
-          <a:p>
-            <a:r>
-              <a:rPr lang="en-US" sz="1200" dirty="0"/>
-              <a:t>Parameter Widgets should generally be created as Text Widgets in </a:t>
-            </a:r>
-            <a:r>
-              <a:rPr lang="en-US" sz="1200" dirty="0" err="1"/>
-              <a:t>GigPerformer</a:t>
-            </a:r>
-            <a:r>
-              <a:rPr lang="en-US" sz="1200" dirty="0"/>
-              <a:t>, and often should be hidden.</a:t>
-            </a:r>
-          </a:p>
-          <a:p>
-            <a:endParaRPr lang="en-US" sz="1200" dirty="0"/>
-          </a:p>
-          <a:p>
-            <a:r>
-              <a:rPr lang="en-US" sz="1200" dirty="0"/>
-              <a:t>The information the SL-MK3 extension looks for in Parameter Widgets is:</a:t>
-            </a:r>
-          </a:p>
-          <a:p>
-            <a:pPr marL="628650" lvl="1" indent="-171450">
-              <a:buFont typeface="Arial" panose="020B0604020202020204" pitchFamily="34" charset="0"/>
-              <a:buChar char="•"/>
-            </a:pPr>
-            <a:r>
-              <a:rPr lang="en-US" sz="1200" dirty="0"/>
-              <a:t>Caption – sets the label that will appear on the SL-MK3 display for the widget</a:t>
-            </a:r>
-          </a:p>
-          <a:p>
-            <a:pPr marL="628650" lvl="1" indent="-171450">
-              <a:buFont typeface="Arial" panose="020B0604020202020204" pitchFamily="34" charset="0"/>
-              <a:buChar char="•"/>
-            </a:pPr>
-            <a:r>
-              <a:rPr lang="en-US" sz="1200" dirty="0"/>
-              <a:t>Fill Color – controls the “on” color of buttons/pads or the color of knobs on the display</a:t>
-            </a:r>
-          </a:p>
-          <a:p>
-            <a:pPr marL="628650" lvl="1" indent="-171450">
-              <a:buFont typeface="Arial" panose="020B0604020202020204" pitchFamily="34" charset="0"/>
-              <a:buChar char="•"/>
-            </a:pPr>
-            <a:r>
-              <a:rPr lang="en-US" sz="1200" dirty="0"/>
-              <a:t>Outline Color – controls the “off” color of buttons/pads or the top bar color above knobs</a:t>
-            </a:r>
-          </a:p>
-          <a:p>
-            <a:pPr marL="628650" lvl="1" indent="-171450">
-              <a:buFont typeface="Arial" panose="020B0604020202020204" pitchFamily="34" charset="0"/>
-              <a:buChar char="•"/>
-            </a:pPr>
-            <a:r>
-              <a:rPr lang="en-US" sz="1200" dirty="0"/>
-              <a:t>Knob resolution – for knob widgets you can change the resolution by appending an “_” after the label in the Caption field followed by an integer.  e.g., a Caption of “Volume_1000” would result in a knob label of “Volume” and a resolution of 1000 “ticks” to move the widget from 0.0 to 1.0.  The default resolution is 250.</a:t>
-            </a:r>
-          </a:p>
-          <a:p>
-            <a:pPr marL="628650" lvl="1" indent="-171450">
-              <a:buFont typeface="Arial" panose="020B0604020202020204" pitchFamily="34" charset="0"/>
-              <a:buChar char="•"/>
-            </a:pPr>
-            <a:r>
-              <a:rPr lang="en-US" sz="1200" dirty="0"/>
-              <a:t>Note that the alpha (transparency) of the Fill and Outline color is not used by the extension.  Setting the Fill and Outline alphas to zero in </a:t>
-            </a:r>
-            <a:r>
-              <a:rPr lang="en-US" sz="1200" dirty="0" err="1"/>
-              <a:t>GigPerfomer</a:t>
-            </a:r>
-            <a:r>
-              <a:rPr lang="en-US" sz="1200" dirty="0"/>
-              <a:t> is an alternative to hiding these widgets.  This can be useful if you want to see the label on the Rackspace but not the color</a:t>
-            </a:r>
-          </a:p>
-          <a:p>
-            <a:pPr marL="628650" lvl="1" indent="-171450">
-              <a:buFont typeface="Arial" panose="020B0604020202020204" pitchFamily="34" charset="0"/>
-              <a:buChar char="•"/>
-            </a:pPr>
-            <a:endParaRPr lang="en-US" sz="1200" dirty="0"/>
-          </a:p>
-        </p:txBody>
-      </p:sp>
-    </p:spTree>
-    <p:extLst>
-      <p:ext uri="{BB962C8B-B14F-4D97-AF65-F5344CB8AC3E}">
-        <p14:creationId xmlns:p14="http://schemas.microsoft.com/office/powerpoint/2010/main" val="2034193139"/>
-      </p:ext>
-    </p:extLst>
-  </p:cSld>
-  <p:clrMapOvr>
-    <a:masterClrMapping/>
-  </p:clrMapOvr>
-</p:sld>
-</file>
-
 <file path=ppt/slides/slide4.xml><?xml version="1.0" encoding="utf-8"?>
 <p:sld xmlns:a="http://schemas.openxmlformats.org/drawingml/2006/main" xmlns:r="http://schemas.openxmlformats.org/officeDocument/2006/relationships" xmlns:p="http://schemas.openxmlformats.org/presentationml/2006/main">
   <p:cSld>
@@ -4181,7 +4276,7 @@
         <p:spPr>
           <a:xfrm>
             <a:off x="362992" y="369537"/>
-            <a:ext cx="8095208" cy="5878532"/>
+            <a:ext cx="8095208" cy="6432530"/>
           </a:xfrm>
           <a:prstGeom prst="rect">
             <a:avLst/>
@@ -4196,7 +4291,7 @@
           <a:p>
             <a:r>
               <a:rPr lang="en-US" sz="1400" b="1" dirty="0"/>
-              <a:t>Indicator Widgets</a:t>
+              <a:t>Parameter Widgets</a:t>
             </a:r>
           </a:p>
           <a:p>
@@ -4205,16 +4300,116 @@
           <a:p>
             <a:r>
               <a:rPr lang="en-US" sz="1200" dirty="0"/>
-              <a:t>“Indicator Widgets” are similar to Parameter Widgets, but instead of controlling the colors of widgets on the SL-MK3 they are used to show on the Rackspace screen which widget banks are actively being controlled by the SL-MK3.</a:t>
-            </a:r>
-          </a:p>
-          <a:p>
-            <a:endParaRPr lang="en-US" sz="1200" dirty="0"/>
-          </a:p>
-          <a:p>
-            <a:r>
-              <a:rPr lang="en-US" sz="1200" dirty="0"/>
-              <a:t>For example, if you have three separate banks of knobs in a Rackspace (e.g., instrument parameters, reverb parameters, and pans) it can be helpful to see on the </a:t>
+              <a:t>“Parameter Widgets” can be used to specify how “Control Widgets” appear on the SL-MK3.  Parameter Widgets are not strictly necessary, but without them everything will appear using default colors and labels on the SL-MK3.</a:t>
+            </a:r>
+          </a:p>
+          <a:p>
+            <a:endParaRPr lang="en-US" sz="1200" dirty="0"/>
+          </a:p>
+          <a:p>
+            <a:r>
+              <a:rPr lang="en-US" sz="1200" dirty="0"/>
+              <a:t>Parameter Widgets associated with buttons and pads control the RGB “on” and “off” colors on the SL-MK3.  Parameter Widgets for knobs control the knob color, the bar color above the knob, and optionally the resolution of the knobs.</a:t>
+            </a:r>
+          </a:p>
+          <a:p>
+            <a:endParaRPr lang="en-US" sz="1200" dirty="0"/>
+          </a:p>
+          <a:p>
+            <a:r>
+              <a:rPr lang="en-US" sz="1200" dirty="0"/>
+              <a:t>Parameter Widgets can be created at the bank level (for controlling colors of the entire bank) or at the individual widget level.</a:t>
+            </a:r>
+          </a:p>
+          <a:p>
+            <a:endParaRPr lang="en-US" sz="1200" dirty="0"/>
+          </a:p>
+          <a:p>
+            <a:r>
+              <a:rPr lang="en-US" sz="1200" dirty="0"/>
+              <a:t>Parameter Widgets use the same general naming format as Control Widgets, but append a “p” to the “type” field.</a:t>
+            </a:r>
+          </a:p>
+          <a:p>
+            <a:r>
+              <a:rPr lang="en-US" sz="1200" dirty="0"/>
+              <a:t>	e.g., Control Widget “sl_k_pan_0” can have an associated Parameter Widget “sl_k</a:t>
+            </a:r>
+            <a:r>
+              <a:rPr lang="en-US" sz="1200" b="1" dirty="0">
+                <a:solidFill>
+                  <a:srgbClr val="FF0000"/>
+                </a:solidFill>
+              </a:rPr>
+              <a:t>p</a:t>
+            </a:r>
+            <a:r>
+              <a:rPr lang="en-US" sz="1200" dirty="0"/>
+              <a:t>_pan_0”</a:t>
+            </a:r>
+          </a:p>
+          <a:p>
+            <a:endParaRPr lang="en-US" sz="1200" dirty="0"/>
+          </a:p>
+          <a:p>
+            <a:r>
+              <a:rPr lang="en-US" sz="1200" dirty="0"/>
+              <a:t>Parameter Widgets intended to operate at the bank level append “p” to the “type” and drop the “_position” part of the name</a:t>
+            </a:r>
+          </a:p>
+          <a:p>
+            <a:r>
+              <a:rPr lang="en-US" sz="1200" dirty="0"/>
+              <a:t>	e.g., Parameter Widget “</a:t>
+            </a:r>
+            <a:r>
+              <a:rPr lang="en-US" sz="1200" dirty="0" err="1"/>
+              <a:t>sl_kp_pan</a:t>
+            </a:r>
+            <a:r>
+              <a:rPr lang="en-US" sz="1200" dirty="0"/>
+              <a:t>” would apply to all of the knobs with </a:t>
+            </a:r>
+            <a:r>
+              <a:rPr lang="en-US" sz="1200" dirty="0" err="1"/>
+              <a:t>BankID</a:t>
+            </a:r>
+            <a:r>
+              <a:rPr lang="en-US" sz="1200" dirty="0"/>
+              <a:t> “pan”</a:t>
+            </a:r>
+          </a:p>
+          <a:p>
+            <a:endParaRPr lang="en-US" sz="1200" dirty="0"/>
+          </a:p>
+          <a:p>
+            <a:r>
+              <a:rPr lang="en-US" sz="1200" dirty="0"/>
+              <a:t>Individual parameter widgets take priority over bank parameter widgets if both exist</a:t>
+            </a:r>
+          </a:p>
+          <a:p>
+            <a:pPr marL="457200" indent="-457200"/>
+            <a:r>
+              <a:rPr lang="en-US" sz="1200" dirty="0"/>
+              <a:t>	e.g., widget “</a:t>
+            </a:r>
+            <a:r>
+              <a:rPr lang="en-US" sz="1200" dirty="0" err="1"/>
+              <a:t>sl_kp_pan</a:t>
+            </a:r>
+            <a:r>
+              <a:rPr lang="en-US" sz="1200" dirty="0"/>
+              <a:t>” will control the default knob color for the “pan” knob bank, but widget “sl_kp_pan_3” can be used to override that color for that knob</a:t>
+            </a:r>
+          </a:p>
+          <a:p>
+            <a:endParaRPr lang="en-US" sz="1200" dirty="0"/>
+          </a:p>
+          <a:p>
+            <a:r>
+              <a:rPr lang="en-US" sz="1200" dirty="0"/>
+              <a:t>Parameter Widgets should generally be created as Text Widgets in </a:t>
             </a:r>
             <a:r>
               <a:rPr lang="en-US" sz="1200" dirty="0" err="1"/>
@@ -4222,120 +4417,89 @@
             </a:r>
             <a:r>
               <a:rPr lang="en-US" sz="1200" dirty="0"/>
-              <a:t> screen which ones are actively linked to the knobs on the SL-MK3.  You can change banks using the up/down arrow keys next to the control row on the SL-MK3 and the Indicator Widgets will reflect which bank is currently active</a:t>
-            </a:r>
-          </a:p>
-          <a:p>
-            <a:endParaRPr lang="en-US" sz="1200" dirty="0"/>
-          </a:p>
-          <a:p>
-            <a:r>
-              <a:rPr lang="en-US" sz="1200" dirty="0"/>
-              <a:t>Indicator Widgets are named with the same format as Control and Parameter widgets but with “_</a:t>
+              <a:t>, and often should be hidden.</a:t>
+            </a:r>
+          </a:p>
+          <a:p>
+            <a:endParaRPr lang="en-US" sz="1200" dirty="0"/>
+          </a:p>
+          <a:p>
+            <a:r>
+              <a:rPr lang="en-US" sz="1200" dirty="0"/>
+              <a:t>The information the SL-MK3 extension looks for in Parameter Widgets is:</a:t>
+            </a:r>
+          </a:p>
+          <a:p>
+            <a:pPr marL="628650" lvl="1" indent="-171450">
+              <a:buFont typeface="Arial" panose="020B0604020202020204" pitchFamily="34" charset="0"/>
+              <a:buChar char="•"/>
+            </a:pPr>
+            <a:r>
+              <a:rPr lang="en-US" sz="1200" dirty="0"/>
+              <a:t>Caption – sets the label that will appear on the SL-MK3 display for the widget</a:t>
+            </a:r>
+          </a:p>
+          <a:p>
+            <a:pPr marL="628650" lvl="1" indent="-171450">
+              <a:buFont typeface="Arial" panose="020B0604020202020204" pitchFamily="34" charset="0"/>
+              <a:buChar char="•"/>
+            </a:pPr>
+            <a:r>
+              <a:rPr lang="en-US" sz="1200" dirty="0"/>
+              <a:t>Fill Color – controls the “on” color of buttons/pads or the color of knobs on the display</a:t>
+            </a:r>
+          </a:p>
+          <a:p>
+            <a:pPr marL="628650" lvl="1" indent="-171450">
+              <a:buFont typeface="Arial" panose="020B0604020202020204" pitchFamily="34" charset="0"/>
+              <a:buChar char="•"/>
+            </a:pPr>
+            <a:r>
+              <a:rPr lang="en-US" sz="1200" dirty="0"/>
+              <a:t>Outline Color – controls the “off” color of buttons/pads or the top bar color above knobs</a:t>
+            </a:r>
+          </a:p>
+          <a:p>
+            <a:pPr marL="628650" lvl="1" indent="-171450">
+              <a:buFont typeface="Arial" panose="020B0604020202020204" pitchFamily="34" charset="0"/>
+              <a:buChar char="•"/>
+            </a:pPr>
+            <a:r>
+              <a:rPr lang="en-US" sz="1200" dirty="0"/>
+              <a:t>Knob resolution – for knob widgets you can change the resolution by appending an “_” after the label in the Caption field followed by an integer.  e.g., a Caption of “Volume_200” would result in a knob label of “Volume” and a resolution of 200 “ticks” to move the widget from 0.0 to 1.0.  The default resolution is 1000.</a:t>
+            </a:r>
+          </a:p>
+          <a:p>
+            <a:pPr marL="628650" lvl="1" indent="-171450">
+              <a:buFont typeface="Arial" panose="020B0604020202020204" pitchFamily="34" charset="0"/>
+              <a:buChar char="•"/>
+            </a:pPr>
+            <a:r>
+              <a:rPr lang="en-US" sz="1200" dirty="0"/>
+              <a:t>Note that the alpha (transparency) of the Fill and Outline color is not used by the extension.  Setting the Fill and Outline alphas to zero in </a:t>
             </a:r>
             <a:r>
               <a:rPr lang="en-US" sz="1200" dirty="0" err="1"/>
-              <a:t>i</a:t>
-            </a:r>
-            <a:r>
-              <a:rPr lang="en-US" sz="1200" dirty="0"/>
-              <a:t>” in place of the _position.</a:t>
-            </a:r>
-          </a:p>
-          <a:p>
-            <a:r>
-              <a:rPr lang="en-US" sz="1200" dirty="0"/>
-              <a:t>	e.g., </a:t>
-            </a:r>
-            <a:r>
-              <a:rPr lang="en-US" sz="1200" dirty="0" err="1"/>
-              <a:t>sl_k_pan_i</a:t>
-            </a:r>
-            <a:endParaRPr lang="en-US" sz="1200" dirty="0"/>
-          </a:p>
-          <a:p>
-            <a:endParaRPr lang="en-US" sz="1200" dirty="0"/>
-          </a:p>
-          <a:p>
-            <a:r>
-              <a:rPr lang="en-US" sz="1200" dirty="0"/>
-              <a:t>Indicator Widgets are generally created as Text widgets, most often with the text itself being blank or with the Text Color alpha set to zero so that the text itself does not appear on the Rackspace screen.</a:t>
-            </a:r>
-          </a:p>
-          <a:p>
-            <a:endParaRPr lang="en-US" sz="1200" dirty="0"/>
-          </a:p>
-          <a:p>
-            <a:r>
-              <a:rPr lang="en-US" sz="1200" dirty="0"/>
-              <a:t>When the bank specified is “active” the extension will set the value of the widget to 1, which will raise its visibility on the Rackspace screen.  When the bank is not active the value will be set to 0.3, which will reduce its visibility.  A common use of these widgets is as an outline and background behind the associated set of Control Widgets.</a:t>
-            </a:r>
-          </a:p>
-          <a:p>
-            <a:endParaRPr lang="en-US" sz="1200" dirty="0"/>
-          </a:p>
-          <a:p>
-            <a:r>
-              <a:rPr lang="en-US" sz="1200" dirty="0"/>
-              <a:t>The Caption of Indicator Widgets for knob and button banks controls the text that appears in the label areas on the right-most display on the SL-MK3, or temporarily in the Notify area when bank switching pad banks.  Text for knob and button banks appears on two lines, which should be separated in the Caption by the “_” character.  e.g., a Caption of “</a:t>
-            </a:r>
-            <a:r>
-              <a:rPr lang="en-US" sz="1200" dirty="0" err="1"/>
-              <a:t>Solo_Mute</a:t>
-            </a:r>
-            <a:r>
-              <a:rPr lang="en-US" sz="1200" dirty="0"/>
-              <a:t>” for a button bank would show the label “Solo” next to the top row of buttons, and “Mute” next to the bottom row.</a:t>
-            </a:r>
-          </a:p>
-          <a:p>
-            <a:endParaRPr lang="en-US" sz="1200" dirty="0"/>
-          </a:p>
-          <a:p>
-            <a:r>
-              <a:rPr lang="en-US" sz="1200" b="1" dirty="0"/>
-              <a:t>Note</a:t>
-            </a:r>
-            <a:r>
-              <a:rPr lang="en-US" sz="1200" dirty="0"/>
-              <a:t> – </a:t>
-            </a:r>
-            <a:r>
-              <a:rPr lang="en-US" sz="1200" dirty="0" err="1"/>
-              <a:t>GigPerformer</a:t>
-            </a:r>
-            <a:r>
-              <a:rPr lang="en-US" sz="1200" dirty="0"/>
-              <a:t> will remember Indicator Widget values when switching between </a:t>
-            </a:r>
-            <a:r>
-              <a:rPr lang="en-US" sz="1200" dirty="0" err="1"/>
-              <a:t>Rackspaces</a:t>
-            </a:r>
-            <a:r>
-              <a:rPr lang="en-US" sz="1200" dirty="0"/>
-              <a:t>/Variations/etc.  As a result it will remember which banks you were controlling when you last used or saved a Variation, and when you return to it those same banks will be “active” again on the SL-MK3.</a:t>
-            </a:r>
-          </a:p>
-          <a:p>
-            <a:endParaRPr lang="en-US" sz="1200" dirty="0"/>
-          </a:p>
-          <a:p>
-            <a:r>
-              <a:rPr lang="en-US" sz="1200" b="1" dirty="0"/>
-              <a:t>Note</a:t>
-            </a:r>
-            <a:r>
-              <a:rPr lang="en-US" sz="1200" dirty="0"/>
-              <a:t> – the background color of an Indicator Widget is used for coloring the up/down bank select arrows on the SL-MK3.  If you make each bank a different color, the up/down arrows will indicate which bank is next/previous as you bank select.</a:t>
-            </a:r>
+              <a:t>GigPerfomer</a:t>
+            </a:r>
+            <a:r>
+              <a:rPr lang="en-US" sz="1200" dirty="0"/>
+              <a:t> is an alternative to hiding these widgets.  This can be useful if you want to see the label on the Rackspace but not the color.  This can also be very confusing when you’re trying to remember where you set the color, so I usually hide them instead.</a:t>
+            </a:r>
+          </a:p>
+          <a:p>
+            <a:pPr marL="628650" lvl="1" indent="-171450">
+              <a:buFont typeface="Arial" panose="020B0604020202020204" pitchFamily="34" charset="0"/>
+              <a:buChar char="•"/>
+            </a:pPr>
+            <a:endParaRPr lang="en-US" sz="1200" dirty="0"/>
           </a:p>
         </p:txBody>
       </p:sp>
     </p:spTree>
     <p:extLst>
       <p:ext uri="{BB962C8B-B14F-4D97-AF65-F5344CB8AC3E}">
-        <p14:creationId xmlns:p14="http://schemas.microsoft.com/office/powerpoint/2010/main" val="3928714981"/>
+        <p14:creationId xmlns:p14="http://schemas.microsoft.com/office/powerpoint/2010/main" val="2034193139"/>
       </p:ext>
     </p:extLst>
   </p:cSld>
@@ -4371,7 +4535,7 @@
         <p:spPr>
           <a:xfrm>
             <a:off x="362992" y="369537"/>
-            <a:ext cx="8095208" cy="4031873"/>
+            <a:ext cx="8095208" cy="5878532"/>
           </a:xfrm>
           <a:prstGeom prst="rect">
             <a:avLst/>
@@ -4385,130 +4549,147 @@
           <a:lstStyle/>
           <a:p>
             <a:r>
-              <a:rPr lang="en-US" sz="1400" b="1" dirty="0" err="1"/>
-              <a:t>BankID</a:t>
-            </a:r>
-            <a:r>
               <a:rPr lang="en-US" sz="1400" b="1" dirty="0"/>
-              <a:t> Linking</a:t>
-            </a:r>
-          </a:p>
-          <a:p>
-            <a:endParaRPr lang="en-US" sz="1400" dirty="0"/>
-          </a:p>
-          <a:p>
-            <a:r>
-              <a:rPr lang="en-US" sz="1200" dirty="0"/>
-              <a:t>If the same </a:t>
+              <a:t>Indicator Widgets</a:t>
+            </a:r>
+          </a:p>
+          <a:p>
+            <a:endParaRPr lang="en-US" sz="1400" b="1" dirty="0"/>
+          </a:p>
+          <a:p>
+            <a:r>
+              <a:rPr lang="en-US" sz="1200" dirty="0"/>
+              <a:t>“Indicator Widgets” are similar to Parameter Widgets, but instead of controlling the colors of widgets on the SL-MK3 they are used to show on the Rackspace screen which widget banks are actively being controlled by the SL-MK3.</a:t>
+            </a:r>
+          </a:p>
+          <a:p>
+            <a:endParaRPr lang="en-US" sz="1200" dirty="0"/>
+          </a:p>
+          <a:p>
+            <a:r>
+              <a:rPr lang="en-US" sz="1200" dirty="0"/>
+              <a:t>For example, if you have three separate banks of knobs in a Rackspace (e.g., instrument parameters, reverb parameters, and pans) it can be helpful to see on the </a:t>
             </a:r>
             <a:r>
               <a:rPr lang="en-US" sz="1200" dirty="0" err="1"/>
-              <a:t>bankID</a:t>
-            </a:r>
-            <a:r>
-              <a:rPr lang="en-US" sz="1200" dirty="0"/>
-              <a:t> is used for different control rows (e.g., Faders and Knobs) then when that </a:t>
+              <a:t>GigPerformer</a:t>
+            </a:r>
+            <a:r>
+              <a:rPr lang="en-US" sz="1200" dirty="0"/>
+              <a:t> screen which ones are actively linked to the knobs on the SL-MK3.  You can change banks using the up/down arrow keys next to the control row on the SL-MK3 and the Indicator Widgets will reflect which bank is currently active</a:t>
+            </a:r>
+          </a:p>
+          <a:p>
+            <a:endParaRPr lang="en-US" sz="1200" dirty="0"/>
+          </a:p>
+          <a:p>
+            <a:r>
+              <a:rPr lang="en-US" sz="1200" dirty="0"/>
+              <a:t>Indicator Widgets are named with the same format as Control and Parameter widgets but with “_</a:t>
             </a:r>
             <a:r>
               <a:rPr lang="en-US" sz="1200" dirty="0" err="1"/>
-              <a:t>bankID</a:t>
-            </a:r>
-            <a:r>
-              <a:rPr lang="en-US" sz="1200" dirty="0"/>
-              <a:t> is selected to be active for one control row (e.g., Knobs or Faders) it will be selected for all rows that have a </a:t>
+              <a:t>i</a:t>
+            </a:r>
+            <a:r>
+              <a:rPr lang="en-US" sz="1200" dirty="0"/>
+              <a:t>” in place of the _position.</a:t>
+            </a:r>
+          </a:p>
+          <a:p>
+            <a:r>
+              <a:rPr lang="en-US" sz="1200" dirty="0"/>
+              <a:t>	e.g., </a:t>
             </a:r>
             <a:r>
               <a:rPr lang="en-US" sz="1200" dirty="0" err="1"/>
-              <a:t>bankID</a:t>
-            </a:r>
-            <a:r>
-              <a:rPr lang="en-US" sz="1200" dirty="0"/>
-              <a:t> of that name.</a:t>
-            </a:r>
-          </a:p>
-          <a:p>
-            <a:endParaRPr lang="en-US" sz="1200" dirty="0"/>
-          </a:p>
-          <a:p>
-            <a:r>
-              <a:rPr lang="en-US" sz="1200" dirty="0"/>
-              <a:t>For example, if you want to be able to bank select between three separate 8 channel mixers plugins and have the entire control surface move together between them you would use Widget names like:</a:t>
-            </a:r>
-          </a:p>
-          <a:p>
-            <a:r>
-              <a:rPr lang="en-US" sz="1200" dirty="0"/>
-              <a:t>	mc_f_mix1_0 … mc_f_mix1_7   and  mc_k_mix1_0 … mc_k_mix1_7   and  mc_p_mix1_0   etc.</a:t>
-            </a:r>
-          </a:p>
-          <a:p>
-            <a:r>
-              <a:rPr lang="en-US" sz="1200" dirty="0"/>
-              <a:t>	mc_f_mix2_0 … mc_f_mix2_7   and  mc_k_mix2_0 … mc_k_mix2_7   and  mc_p_mix2_0   etc.</a:t>
-            </a:r>
-          </a:p>
-          <a:p>
-            <a:r>
-              <a:rPr lang="en-US" sz="1200" dirty="0"/>
-              <a:t>	mc_f_mix3_0 … mc_f_mix3_7   and  mc_k_mix3_0 … mc_k_mix3_7   and  mc_p_mix3_0   etc.</a:t>
-            </a:r>
-          </a:p>
-          <a:p>
-            <a:endParaRPr lang="en-US" sz="1200" dirty="0"/>
-          </a:p>
-          <a:p>
-            <a:r>
-              <a:rPr lang="en-US" sz="1200" dirty="0"/>
-              <a:t>Named as such, when you bank select using the Knob bank select keys you will automatically also select the corresponding set of Faders and Pads.</a:t>
-            </a:r>
-          </a:p>
-          <a:p>
-            <a:endParaRPr lang="en-US" sz="1200" dirty="0"/>
-          </a:p>
-          <a:p>
-            <a:r>
-              <a:rPr lang="en-US" sz="1200" dirty="0"/>
-              <a:t>In contrast, if you want to use the same three mixer plugins and be able to independently select which mixer plugin the Knobs, Faders, and Pads are actively controlling you must use different </a:t>
+              <a:t>sl_k_pan_i</a:t>
+            </a:r>
+            <a:endParaRPr lang="en-US" sz="1200" dirty="0"/>
+          </a:p>
+          <a:p>
+            <a:endParaRPr lang="en-US" sz="1200" dirty="0"/>
+          </a:p>
+          <a:p>
+            <a:r>
+              <a:rPr lang="en-US" sz="1200" dirty="0"/>
+              <a:t>Indicator Widgets are generally created as Text widgets, most often with the text itself being blank or with the Text Color alpha set to zero so that the text itself does not appear on the Rackspace screen.</a:t>
+            </a:r>
+          </a:p>
+          <a:p>
+            <a:endParaRPr lang="en-US" sz="1200" dirty="0"/>
+          </a:p>
+          <a:p>
+            <a:r>
+              <a:rPr lang="en-US" sz="1200" dirty="0"/>
+              <a:t>When the bank specified is “active” the extension will set the value of the widget to 1, which will raise its visibility on the Rackspace screen.  When the bank is not active the value will be set to 0.3, which will reduce its visibility.  A common use of these widgets is as an outline and background behind the associated set of Control Widgets.</a:t>
+            </a:r>
+          </a:p>
+          <a:p>
+            <a:endParaRPr lang="en-US" sz="1200" dirty="0"/>
+          </a:p>
+          <a:p>
+            <a:r>
+              <a:rPr lang="en-US" sz="1200" dirty="0"/>
+              <a:t>The Caption of Indicator Widgets for knob and button banks controls the text that appears in the label areas on the right-most display on the SL-MK3, or temporarily in the Notify area when bank switching pad banks.  Text for knob and button banks appears on two lines, which should be separated in the Caption by the “_” character.  e.g., a Caption of “</a:t>
             </a:r>
             <a:r>
               <a:rPr lang="en-US" sz="1200" dirty="0" err="1"/>
-              <a:t>bankIDs</a:t>
-            </a:r>
-            <a:r>
-              <a:rPr lang="en-US" sz="1200" dirty="0"/>
-              <a:t> for each widget row.  A simple example would be:</a:t>
-            </a:r>
-          </a:p>
-          <a:p>
-            <a:r>
-              <a:rPr lang="en-US" sz="1200" dirty="0"/>
-              <a:t>	mc_f_volume1_0 … mc_f_volume1_7   and  mc_k_pan1_0 … mc_k_pan1_7   and  mc_mute_mute1_0   etc.</a:t>
-            </a:r>
-          </a:p>
-          <a:p>
-            <a:r>
-              <a:rPr lang="en-US" sz="1200" dirty="0"/>
-              <a:t>	mc_f_volume2_0 … mc_f_volume2_7   and  mc_k_pan2_0 … mc_k_pan2_7   and  mc_mute_mute2_0   etc.</a:t>
-            </a:r>
-          </a:p>
-          <a:p>
-            <a:r>
-              <a:rPr lang="en-US" sz="1200" dirty="0"/>
-              <a:t>	mc_f_volume3_0 … mc_f_volume3_7   and  mc_k_pan3_0 … mc_k_pan3_7   and  mc_mute_mute3_0   etc.</a:t>
-            </a:r>
-          </a:p>
-          <a:p>
-            <a:endParaRPr lang="en-US" sz="1200" dirty="0"/>
-          </a:p>
-          <a:p>
-            <a:endParaRPr lang="en-US" sz="1200" dirty="0"/>
+              <a:t>Solo_Mute</a:t>
+            </a:r>
+            <a:r>
+              <a:rPr lang="en-US" sz="1200" dirty="0"/>
+              <a:t>” for a button bank would show the label “Solo” next to the top row of buttons, and “Mute” next to the bottom row.</a:t>
+            </a:r>
+          </a:p>
+          <a:p>
+            <a:endParaRPr lang="en-US" sz="1200" dirty="0"/>
+          </a:p>
+          <a:p>
+            <a:r>
+              <a:rPr lang="en-US" sz="1200" b="1" dirty="0"/>
+              <a:t>Note</a:t>
+            </a:r>
+            <a:r>
+              <a:rPr lang="en-US" sz="1200" dirty="0"/>
+              <a:t> – </a:t>
+            </a:r>
+            <a:r>
+              <a:rPr lang="en-US" sz="1200" dirty="0" err="1"/>
+              <a:t>GigPerformer</a:t>
+            </a:r>
+            <a:r>
+              <a:rPr lang="en-US" sz="1200" dirty="0"/>
+              <a:t> will remember Indicator Widget values when switching between </a:t>
+            </a:r>
+            <a:r>
+              <a:rPr lang="en-US" sz="1200" dirty="0" err="1"/>
+              <a:t>Rackspaces</a:t>
+            </a:r>
+            <a:r>
+              <a:rPr lang="en-US" sz="1200" dirty="0"/>
+              <a:t>/Variations/etc.  As a result, it will remember which banks you were controlling when you last used or saved a Variation, and when you return to it those same banks will be “active” again on the SL-MK3.</a:t>
+            </a:r>
+          </a:p>
+          <a:p>
+            <a:endParaRPr lang="en-US" sz="1200" dirty="0"/>
+          </a:p>
+          <a:p>
+            <a:r>
+              <a:rPr lang="en-US" sz="1200" b="1" dirty="0"/>
+              <a:t>Note</a:t>
+            </a:r>
+            <a:r>
+              <a:rPr lang="en-US" sz="1200" dirty="0"/>
+              <a:t> – the background color of an Indicator Widget is used for coloring the up/down bank select arrows on the SL-MK3.  If you make each bank a different color, the up/down arrows will indicate which bank is next/previous as you bank select.</a:t>
+            </a:r>
           </a:p>
         </p:txBody>
       </p:sp>
     </p:spTree>
     <p:extLst>
       <p:ext uri="{BB962C8B-B14F-4D97-AF65-F5344CB8AC3E}">
-        <p14:creationId xmlns:p14="http://schemas.microsoft.com/office/powerpoint/2010/main" val="98072306"/>
+        <p14:creationId xmlns:p14="http://schemas.microsoft.com/office/powerpoint/2010/main" val="3928714981"/>
       </p:ext>
     </p:extLst>
   </p:cSld>
@@ -4544,7 +4725,7 @@
         <p:spPr>
           <a:xfrm>
             <a:off x="362992" y="369537"/>
-            <a:ext cx="8095208" cy="4985980"/>
+            <a:ext cx="8095208" cy="4216539"/>
           </a:xfrm>
           <a:prstGeom prst="rect">
             <a:avLst/>
@@ -4558,225 +4739,128 @@
           <a:lstStyle/>
           <a:p>
             <a:r>
+              <a:rPr lang="en-US" sz="1400" b="1" dirty="0" err="1"/>
+              <a:t>BankID</a:t>
+            </a:r>
+            <a:r>
               <a:rPr lang="en-US" sz="1400" b="1" dirty="0"/>
-              <a:t>Additional Controls</a:t>
-            </a:r>
-          </a:p>
-          <a:p>
-            <a:endParaRPr lang="en-US" sz="1400" b="1" dirty="0"/>
-          </a:p>
-          <a:p>
-            <a:r>
-              <a:rPr lang="en-US" sz="1200" dirty="0"/>
-              <a:t>The buttons immediately below the display are always assigned to select </a:t>
+              <a:t> Linking</a:t>
+            </a:r>
+          </a:p>
+          <a:p>
+            <a:endParaRPr lang="en-US" sz="1400" dirty="0"/>
+          </a:p>
+          <a:p>
+            <a:r>
+              <a:rPr lang="en-US" sz="1200" dirty="0"/>
+              <a:t>If the same </a:t>
             </a:r>
             <a:r>
               <a:rPr lang="en-US" sz="1200" dirty="0" err="1"/>
-              <a:t>Rackspaces</a:t>
-            </a:r>
-            <a:r>
-              <a:rPr lang="en-US" sz="1200" dirty="0"/>
-              <a:t>, Variations, Songs, or </a:t>
+              <a:t>bankID</a:t>
+            </a:r>
+            <a:r>
+              <a:rPr lang="en-US" sz="1200" dirty="0"/>
+              <a:t> is used for different control rows (e.g., Faders and Knobs) then when that </a:t>
             </a:r>
             <a:r>
               <a:rPr lang="en-US" sz="1200" dirty="0" err="1"/>
-              <a:t>Songparts</a:t>
-            </a:r>
-            <a:r>
-              <a:rPr lang="en-US" sz="1200" dirty="0"/>
-              <a:t>.  You can scroll through the them using the left and right arrow keys toward the bottom left of the control surface. </a:t>
-            </a:r>
-          </a:p>
-          <a:p>
-            <a:endParaRPr lang="en-US" sz="1200" dirty="0"/>
-          </a:p>
-          <a:p>
-            <a:r>
-              <a:rPr lang="en-US" sz="1200" dirty="0"/>
-              <a:t>Other button assignments are:</a:t>
-            </a:r>
-          </a:p>
-          <a:p>
-            <a:pPr marL="628650" lvl="1" indent="-171450">
-              <a:buFont typeface="Arial" panose="020B0604020202020204" pitchFamily="34" charset="0"/>
-              <a:buChar char="•"/>
-            </a:pPr>
-            <a:r>
-              <a:rPr lang="en-US" sz="1200" dirty="0"/>
-              <a:t>“Play” – starts the </a:t>
+              <a:t>bankID</a:t>
+            </a:r>
+            <a:r>
+              <a:rPr lang="en-US" sz="1200" dirty="0"/>
+              <a:t> is selected to be active for one control row (e.g., Knobs or Faders) it will be selected for all rows that have a </a:t>
             </a:r>
             <a:r>
               <a:rPr lang="en-US" sz="1200" dirty="0" err="1"/>
-              <a:t>playhead</a:t>
-            </a:r>
-            <a:endParaRPr lang="en-US" sz="1200" dirty="0"/>
-          </a:p>
-          <a:p>
-            <a:pPr marL="628650" lvl="1" indent="-171450">
-              <a:buFont typeface="Arial" panose="020B0604020202020204" pitchFamily="34" charset="0"/>
-              <a:buChar char="•"/>
-            </a:pPr>
-            <a:r>
-              <a:rPr lang="en-US" sz="1200" dirty="0"/>
-              <a:t>“Stop” – stops the </a:t>
+              <a:t>bankID</a:t>
+            </a:r>
+            <a:r>
+              <a:rPr lang="en-US" sz="1200" dirty="0"/>
+              <a:t> of that name.</a:t>
+            </a:r>
+          </a:p>
+          <a:p>
+            <a:endParaRPr lang="en-US" sz="1200" dirty="0"/>
+          </a:p>
+          <a:p>
+            <a:r>
+              <a:rPr lang="en-US" sz="1200" dirty="0"/>
+              <a:t>For example, if you want to be able to bank select between three separate 8 channel mixers plugins and have the entire control surface move together between them you would use Widget names like:</a:t>
+            </a:r>
+          </a:p>
+          <a:p>
+            <a:r>
+              <a:rPr lang="en-US" sz="1200" dirty="0"/>
+              <a:t>	mc_f_mix1_[0..7]         mc_k_mix1_[0..7]        mc_p_mix1_[0..15]        mc_b_mix1_[0..15]</a:t>
+            </a:r>
+          </a:p>
+          <a:p>
+            <a:r>
+              <a:rPr lang="en-US" sz="1200" dirty="0"/>
+              <a:t>	mc_f_mix2_[0..7]         mc_k_mix2_[0..7]        mc_p_mix2_[0..15]        mc_b_mix2_[0..15]</a:t>
+            </a:r>
+          </a:p>
+          <a:p>
+            <a:r>
+              <a:rPr lang="en-US" sz="1200" dirty="0"/>
+              <a:t>	mc_f_mix3_[0..7]         mc_k_mix3_[0..7]        mc_p_mix3_[0..15]        mc_b_mix3_[0..15]</a:t>
+            </a:r>
+          </a:p>
+          <a:p>
+            <a:endParaRPr lang="en-US" sz="1200" dirty="0"/>
+          </a:p>
+          <a:p>
+            <a:r>
+              <a:rPr lang="en-US" sz="1200" dirty="0"/>
+              <a:t>Named as such, when you bank select using the Knob bank select keys you will automatically also select the corresponding set of Faders, Pads, and Buttons.</a:t>
+            </a:r>
+          </a:p>
+          <a:p>
+            <a:endParaRPr lang="en-US" sz="1200" dirty="0"/>
+          </a:p>
+          <a:p>
+            <a:r>
+              <a:rPr lang="en-US" sz="1200" dirty="0"/>
+              <a:t>In contrast, if you want to use the same three mixer plugins and be able to independently select which mixer plugin the Knobs, Faders, and Pads are actively controlling you must use different </a:t>
             </a:r>
             <a:r>
               <a:rPr lang="en-US" sz="1200" dirty="0" err="1"/>
-              <a:t>playhead</a:t>
-            </a:r>
-            <a:endParaRPr lang="en-US" sz="1200" dirty="0"/>
-          </a:p>
-          <a:p>
-            <a:pPr marL="628650" lvl="1" indent="-171450">
-              <a:buFont typeface="Arial" panose="020B0604020202020204" pitchFamily="34" charset="0"/>
-              <a:buChar char="•"/>
-            </a:pPr>
-            <a:r>
-              <a:rPr lang="en-US" sz="1200" dirty="0"/>
-              <a:t>“Clear” – toggles in and out of Setlist mode</a:t>
-            </a:r>
-          </a:p>
-          <a:p>
-            <a:pPr marL="628650" lvl="1" indent="-171450">
-              <a:buFont typeface="Arial" panose="020B0604020202020204" pitchFamily="34" charset="0"/>
-              <a:buChar char="•"/>
-            </a:pPr>
-            <a:r>
-              <a:rPr lang="en-US" sz="1200" dirty="0"/>
-              <a:t>“Grid” – toggles between displaying </a:t>
-            </a:r>
-            <a:r>
-              <a:rPr lang="en-US" sz="1200" dirty="0" err="1"/>
-              <a:t>Rackspaces</a:t>
-            </a:r>
-            <a:r>
-              <a:rPr lang="en-US" sz="1200" dirty="0"/>
-              <a:t>/Variation or Songs/</a:t>
-            </a:r>
-            <a:r>
-              <a:rPr lang="en-US" sz="1200" dirty="0" err="1"/>
-              <a:t>Songparts</a:t>
-            </a:r>
-            <a:r>
-              <a:rPr lang="en-US" sz="1200" dirty="0"/>
-              <a:t> if you are in </a:t>
-            </a:r>
-            <a:r>
-              <a:rPr lang="en-US" sz="1200" dirty="0" err="1"/>
-              <a:t>Setlist</a:t>
-            </a:r>
-            <a:r>
-              <a:rPr lang="en-US" sz="1200" dirty="0"/>
-              <a:t> Mode</a:t>
-            </a:r>
-          </a:p>
-          <a:p>
-            <a:pPr marL="628650" lvl="1" indent="-171450">
-              <a:buFont typeface="Arial" panose="020B0604020202020204" pitchFamily="34" charset="0"/>
-              <a:buChar char="•"/>
-            </a:pPr>
-            <a:r>
-              <a:rPr lang="en-US" sz="1200" dirty="0"/>
-              <a:t>“Option” – toggle the SL-MK3 displays between showing Knobs and showing Pad assignments.</a:t>
-            </a:r>
-          </a:p>
-          <a:p>
-            <a:endParaRPr lang="en-US" sz="1200" dirty="0"/>
-          </a:p>
-          <a:p>
-            <a:endParaRPr lang="en-US" sz="1200" dirty="0"/>
-          </a:p>
-          <a:p>
-            <a:r>
-              <a:rPr lang="en-US" sz="1400" b="1" dirty="0"/>
-              <a:t>Fader Controls</a:t>
-            </a:r>
-          </a:p>
-          <a:p>
-            <a:endParaRPr lang="en-US" sz="1200" dirty="0"/>
-          </a:p>
-          <a:p>
-            <a:r>
-              <a:rPr lang="en-US" sz="1200" dirty="0"/>
-              <a:t>The faders on the SL-MK3 are not motorized, which usually means that any time you change a Rackspace, Variation, Song, or </a:t>
-            </a:r>
-            <a:r>
-              <a:rPr lang="en-US" sz="1200" dirty="0" err="1"/>
-              <a:t>Songpart</a:t>
-            </a:r>
-            <a:r>
-              <a:rPr lang="en-US" sz="1200" dirty="0"/>
-              <a:t> the physical position of the faders may not match the widgets they are linked to.</a:t>
-            </a:r>
-          </a:p>
-          <a:p>
-            <a:endParaRPr lang="en-US" sz="1200" dirty="0"/>
-          </a:p>
-          <a:p>
-            <a:r>
-              <a:rPr lang="en-US" sz="1200" dirty="0"/>
-              <a:t>The SL-MK3 extension uses a “catch” approach before establishing a link between an individual fader and the widget that it is controlling.  The LED above each fader indicates the status of each fader.  The color codes are:</a:t>
-            </a:r>
-          </a:p>
-          <a:p>
-            <a:pPr marL="628650" lvl="1" indent="-171450">
-              <a:buFont typeface="Arial" panose="020B0604020202020204" pitchFamily="34" charset="0"/>
-              <a:buChar char="•"/>
-            </a:pPr>
-            <a:r>
-              <a:rPr lang="en-US" sz="1200" dirty="0"/>
-              <a:t>Unlit – following Rackspace/Variation/Song/</a:t>
-            </a:r>
-            <a:r>
-              <a:rPr lang="en-US" sz="1200" dirty="0" err="1"/>
-              <a:t>Songpart</a:t>
-            </a:r>
-            <a:r>
-              <a:rPr lang="en-US" sz="1200" dirty="0"/>
-              <a:t> change it is unknown if the fader is in sync with the widget</a:t>
-            </a:r>
-          </a:p>
-          <a:p>
-            <a:pPr marL="628650" lvl="1" indent="-171450">
-              <a:buFont typeface="Arial" panose="020B0604020202020204" pitchFamily="34" charset="0"/>
-              <a:buChar char="•"/>
-            </a:pPr>
-            <a:r>
-              <a:rPr lang="en-US" sz="1200" dirty="0"/>
-              <a:t>Green – the fader on the SL-MK3 is materially higher than the value of the widget</a:t>
-            </a:r>
-          </a:p>
-          <a:p>
-            <a:pPr marL="628650" lvl="1" indent="-171450">
-              <a:buFont typeface="Arial" panose="020B0604020202020204" pitchFamily="34" charset="0"/>
-              <a:buChar char="•"/>
-            </a:pPr>
-            <a:r>
-              <a:rPr lang="en-US" sz="1200" dirty="0"/>
-              <a:t>Red – the fader is too low relative to the value of the widget</a:t>
-            </a:r>
-          </a:p>
-          <a:p>
-            <a:pPr marL="628650" lvl="1" indent="-171450">
-              <a:buFont typeface="Arial" panose="020B0604020202020204" pitchFamily="34" charset="0"/>
-              <a:buChar char="•"/>
-            </a:pPr>
-            <a:r>
-              <a:rPr lang="en-US" sz="1200" dirty="0"/>
-              <a:t>Other – the light changes to the fader bank color on the Indicator or Parameter widget when fader is in sync</a:t>
-            </a:r>
-          </a:p>
-          <a:p>
-            <a:pPr marL="628650" lvl="1" indent="-171450">
-              <a:buFont typeface="Arial" panose="020B0604020202020204" pitchFamily="34" charset="0"/>
-              <a:buChar char="•"/>
-            </a:pPr>
-            <a:endParaRPr lang="en-US" sz="1200" dirty="0"/>
-          </a:p>
-          <a:p>
-            <a:r>
-              <a:rPr lang="en-US" sz="1200" dirty="0"/>
-              <a:t>Fader bank switching is done using the round Scene buttons between the pads and faders.</a:t>
+              <a:t>bankIDs</a:t>
+            </a:r>
+            <a:r>
+              <a:rPr lang="en-US" sz="1200" dirty="0"/>
+              <a:t> for each widget row.  A simple example would be:</a:t>
+            </a:r>
+          </a:p>
+          <a:p>
+            <a:r>
+              <a:rPr lang="en-US" sz="1200" dirty="0"/>
+              <a:t>	mc_f_volume1_[0..7]          mc_k_pan1_[0..7]            mc_b_mute1_[0…7]</a:t>
+            </a:r>
+          </a:p>
+          <a:p>
+            <a:r>
+              <a:rPr lang="en-US" sz="1200" dirty="0"/>
+              <a:t>	mc_f_volume2_[0..7]          mc_k_pan2_[0..7]            mc_b_mute2_[0…7]</a:t>
+            </a:r>
+          </a:p>
+          <a:p>
+            <a:r>
+              <a:rPr lang="en-US" sz="1200" dirty="0"/>
+              <a:t>	mc_f_volume3_[0..7]          mc_k_pan3_[0..7]            mc_b_mute3_[0…7]</a:t>
+            </a:r>
+          </a:p>
+          <a:p>
+            <a:endParaRPr lang="en-US" sz="1200" dirty="0"/>
+          </a:p>
+          <a:p>
+            <a:endParaRPr lang="en-US" sz="1200" dirty="0"/>
+          </a:p>
+          <a:p>
+            <a:r>
+              <a:rPr lang="en-US" sz="1200" dirty="0"/>
+              <a:t>I sometimes use a mix of both approaches in the same Rackspace.  </a:t>
             </a:r>
           </a:p>
         </p:txBody>
@@ -4784,7 +4868,7 @@
     </p:spTree>
     <p:extLst>
       <p:ext uri="{BB962C8B-B14F-4D97-AF65-F5344CB8AC3E}">
-        <p14:creationId xmlns:p14="http://schemas.microsoft.com/office/powerpoint/2010/main" val="764461086"/>
+        <p14:creationId xmlns:p14="http://schemas.microsoft.com/office/powerpoint/2010/main" val="98072306"/>
       </p:ext>
     </p:extLst>
   </p:cSld>
@@ -4820,6 +4904,282 @@
         <p:spPr>
           <a:xfrm>
             <a:off x="362992" y="369537"/>
+            <a:ext cx="8095208" cy="4985980"/>
+          </a:xfrm>
+          <a:prstGeom prst="rect">
+            <a:avLst/>
+          </a:prstGeom>
+          <a:noFill/>
+        </p:spPr>
+        <p:txBody>
+          <a:bodyPr wrap="square" rtlCol="0">
+            <a:spAutoFit/>
+          </a:bodyPr>
+          <a:lstStyle/>
+          <a:p>
+            <a:r>
+              <a:rPr lang="en-US" sz="1400" b="1" dirty="0"/>
+              <a:t>Additional Controls</a:t>
+            </a:r>
+          </a:p>
+          <a:p>
+            <a:endParaRPr lang="en-US" sz="1400" b="1" dirty="0"/>
+          </a:p>
+          <a:p>
+            <a:r>
+              <a:rPr lang="en-US" sz="1200" dirty="0"/>
+              <a:t>The buttons immediately below the display are always assigned to select </a:t>
+            </a:r>
+            <a:r>
+              <a:rPr lang="en-US" sz="1200" dirty="0" err="1"/>
+              <a:t>Rackspaces</a:t>
+            </a:r>
+            <a:r>
+              <a:rPr lang="en-US" sz="1200" dirty="0"/>
+              <a:t>, Variations, Songs, or </a:t>
+            </a:r>
+            <a:r>
+              <a:rPr lang="en-US" sz="1200" dirty="0" err="1"/>
+              <a:t>Songparts</a:t>
+            </a:r>
+            <a:r>
+              <a:rPr lang="en-US" sz="1200" dirty="0"/>
+              <a:t>.  You can scroll through the them using the left and right arrow keys toward the bottom left of the control surface. </a:t>
+            </a:r>
+          </a:p>
+          <a:p>
+            <a:endParaRPr lang="en-US" sz="1200" dirty="0"/>
+          </a:p>
+          <a:p>
+            <a:r>
+              <a:rPr lang="en-US" sz="1200" dirty="0"/>
+              <a:t>Other button assignments are:</a:t>
+            </a:r>
+          </a:p>
+          <a:p>
+            <a:pPr marL="628650" lvl="1" indent="-171450">
+              <a:buFont typeface="Arial" panose="020B0604020202020204" pitchFamily="34" charset="0"/>
+              <a:buChar char="•"/>
+            </a:pPr>
+            <a:r>
+              <a:rPr lang="en-US" sz="1200" dirty="0"/>
+              <a:t>“Play” – starts the </a:t>
+            </a:r>
+            <a:r>
+              <a:rPr lang="en-US" sz="1200" dirty="0" err="1"/>
+              <a:t>playhead</a:t>
+            </a:r>
+            <a:endParaRPr lang="en-US" sz="1200" dirty="0"/>
+          </a:p>
+          <a:p>
+            <a:pPr marL="628650" lvl="1" indent="-171450">
+              <a:buFont typeface="Arial" panose="020B0604020202020204" pitchFamily="34" charset="0"/>
+              <a:buChar char="•"/>
+            </a:pPr>
+            <a:r>
+              <a:rPr lang="en-US" sz="1200" dirty="0"/>
+              <a:t>“Stop” – stops the </a:t>
+            </a:r>
+            <a:r>
+              <a:rPr lang="en-US" sz="1200" dirty="0" err="1"/>
+              <a:t>playhead</a:t>
+            </a:r>
+            <a:endParaRPr lang="en-US" sz="1200" dirty="0"/>
+          </a:p>
+          <a:p>
+            <a:pPr marL="628650" lvl="1" indent="-171450">
+              <a:buFont typeface="Arial" panose="020B0604020202020204" pitchFamily="34" charset="0"/>
+              <a:buChar char="•"/>
+            </a:pPr>
+            <a:r>
+              <a:rPr lang="en-US" sz="1200" dirty="0"/>
+              <a:t>“Clear” – toggles in and out of Setlist mode</a:t>
+            </a:r>
+          </a:p>
+          <a:p>
+            <a:pPr marL="628650" lvl="1" indent="-171450">
+              <a:buFont typeface="Arial" panose="020B0604020202020204" pitchFamily="34" charset="0"/>
+              <a:buChar char="•"/>
+            </a:pPr>
+            <a:r>
+              <a:rPr lang="en-US" sz="1200" dirty="0"/>
+              <a:t>“Grid” – toggles between displaying </a:t>
+            </a:r>
+            <a:r>
+              <a:rPr lang="en-US" sz="1200" dirty="0" err="1"/>
+              <a:t>Rackspaces</a:t>
+            </a:r>
+            <a:r>
+              <a:rPr lang="en-US" sz="1200" dirty="0"/>
+              <a:t>/Variation or Songs/</a:t>
+            </a:r>
+            <a:r>
+              <a:rPr lang="en-US" sz="1200" dirty="0" err="1"/>
+              <a:t>Songparts</a:t>
+            </a:r>
+            <a:r>
+              <a:rPr lang="en-US" sz="1200" dirty="0"/>
+              <a:t> if you are in </a:t>
+            </a:r>
+            <a:r>
+              <a:rPr lang="en-US" sz="1200" dirty="0" err="1"/>
+              <a:t>Setlist</a:t>
+            </a:r>
+            <a:r>
+              <a:rPr lang="en-US" sz="1200" dirty="0"/>
+              <a:t> Mode</a:t>
+            </a:r>
+          </a:p>
+          <a:p>
+            <a:pPr marL="628650" lvl="1" indent="-171450">
+              <a:buFont typeface="Arial" panose="020B0604020202020204" pitchFamily="34" charset="0"/>
+              <a:buChar char="•"/>
+            </a:pPr>
+            <a:r>
+              <a:rPr lang="en-US" sz="1200" dirty="0"/>
+              <a:t>“Option” – toggle the SL-MK3 displays between showing Knobs and showing Pad assignments.</a:t>
+            </a:r>
+          </a:p>
+          <a:p>
+            <a:endParaRPr lang="en-US" sz="1200" dirty="0"/>
+          </a:p>
+          <a:p>
+            <a:endParaRPr lang="en-US" sz="1200" dirty="0"/>
+          </a:p>
+          <a:p>
+            <a:r>
+              <a:rPr lang="en-US" sz="1400" b="1" dirty="0"/>
+              <a:t>Fader Controls</a:t>
+            </a:r>
+          </a:p>
+          <a:p>
+            <a:endParaRPr lang="en-US" sz="1200" dirty="0"/>
+          </a:p>
+          <a:p>
+            <a:r>
+              <a:rPr lang="en-US" sz="1200" dirty="0"/>
+              <a:t>The faders on the SL-MK3 are not motorized, which usually means that any time you change a Rackspace, Variation, Song, or </a:t>
+            </a:r>
+            <a:r>
+              <a:rPr lang="en-US" sz="1200" dirty="0" err="1"/>
+              <a:t>Songpart</a:t>
+            </a:r>
+            <a:r>
+              <a:rPr lang="en-US" sz="1200" dirty="0"/>
+              <a:t> the physical position of the faders will most likely not match the widgets they are linked to.</a:t>
+            </a:r>
+          </a:p>
+          <a:p>
+            <a:endParaRPr lang="en-US" sz="1200" dirty="0"/>
+          </a:p>
+          <a:p>
+            <a:r>
+              <a:rPr lang="en-US" sz="1200" dirty="0"/>
+              <a:t>The SL-MK3 extension uses a “catch” approach before establishing a link between an individual fader and the widget that it is controlling.  The LED above each fader indicates the status of each fader.  The color codes are:</a:t>
+            </a:r>
+          </a:p>
+          <a:p>
+            <a:pPr marL="628650" lvl="1" indent="-171450">
+              <a:buFont typeface="Arial" panose="020B0604020202020204" pitchFamily="34" charset="0"/>
+              <a:buChar char="•"/>
+            </a:pPr>
+            <a:r>
+              <a:rPr lang="en-US" sz="1200" dirty="0"/>
+              <a:t>Unlit – following Rackspace/Variation/Song/</a:t>
+            </a:r>
+            <a:r>
+              <a:rPr lang="en-US" sz="1200" dirty="0" err="1"/>
+              <a:t>Songpart</a:t>
+            </a:r>
+            <a:r>
+              <a:rPr lang="en-US" sz="1200" dirty="0"/>
+              <a:t> change it is unknown if the fader is in sync with the widget</a:t>
+            </a:r>
+          </a:p>
+          <a:p>
+            <a:pPr marL="628650" lvl="1" indent="-171450">
+              <a:buFont typeface="Arial" panose="020B0604020202020204" pitchFamily="34" charset="0"/>
+              <a:buChar char="•"/>
+            </a:pPr>
+            <a:r>
+              <a:rPr lang="en-US" sz="1200" dirty="0"/>
+              <a:t>Green – the fader on the SL-MK3 is materially higher than the value of the widget</a:t>
+            </a:r>
+          </a:p>
+          <a:p>
+            <a:pPr marL="628650" lvl="1" indent="-171450">
+              <a:buFont typeface="Arial" panose="020B0604020202020204" pitchFamily="34" charset="0"/>
+              <a:buChar char="•"/>
+            </a:pPr>
+            <a:r>
+              <a:rPr lang="en-US" sz="1200" dirty="0"/>
+              <a:t>Red – the fader is too low relative to the value of the widget</a:t>
+            </a:r>
+          </a:p>
+          <a:p>
+            <a:pPr marL="628650" lvl="1" indent="-171450">
+              <a:buFont typeface="Arial" panose="020B0604020202020204" pitchFamily="34" charset="0"/>
+              <a:buChar char="•"/>
+            </a:pPr>
+            <a:r>
+              <a:rPr lang="en-US" sz="1200" dirty="0"/>
+              <a:t>Other – the light changes to the fader bank color on the Indicator or Parameter widget when fader is in sync</a:t>
+            </a:r>
+          </a:p>
+          <a:p>
+            <a:pPr marL="628650" lvl="1" indent="-171450">
+              <a:buFont typeface="Arial" panose="020B0604020202020204" pitchFamily="34" charset="0"/>
+              <a:buChar char="•"/>
+            </a:pPr>
+            <a:endParaRPr lang="en-US" sz="1200" dirty="0"/>
+          </a:p>
+          <a:p>
+            <a:r>
+              <a:rPr lang="en-US" sz="1200" dirty="0"/>
+              <a:t>Fader bank switching is done using the round Scene buttons between the pads and faders.</a:t>
+            </a:r>
+          </a:p>
+        </p:txBody>
+      </p:sp>
+    </p:spTree>
+    <p:extLst>
+      <p:ext uri="{BB962C8B-B14F-4D97-AF65-F5344CB8AC3E}">
+        <p14:creationId xmlns:p14="http://schemas.microsoft.com/office/powerpoint/2010/main" val="764461086"/>
+      </p:ext>
+    </p:extLst>
+  </p:cSld>
+  <p:clrMapOvr>
+    <a:masterClrMapping/>
+  </p:clrMapOvr>
+</p:sld>
+</file>
+
+<file path=ppt/slides/slide8.xml><?xml version="1.0" encoding="utf-8"?>
+<p:sld xmlns:a="http://schemas.openxmlformats.org/drawingml/2006/main" xmlns:r="http://schemas.openxmlformats.org/officeDocument/2006/relationships" xmlns:p="http://schemas.openxmlformats.org/presentationml/2006/main">
+  <p:cSld>
+    <p:spTree>
+      <p:nvGrpSpPr>
+        <p:cNvPr id="1" name=""/>
+        <p:cNvGrpSpPr/>
+        <p:nvPr/>
+      </p:nvGrpSpPr>
+      <p:grpSpPr>
+        <a:xfrm>
+          <a:off x="0" y="0"/>
+          <a:ext cx="0" cy="0"/>
+          <a:chOff x="0" y="0"/>
+          <a:chExt cx="0" cy="0"/>
+        </a:xfrm>
+      </p:grpSpPr>
+      <p:sp>
+        <p:nvSpPr>
+          <p:cNvPr id="4" name="TextBox 3"/>
+          <p:cNvSpPr txBox="1"/>
+          <p:nvPr/>
+        </p:nvSpPr>
+        <p:spPr>
+          <a:xfrm>
+            <a:off x="362992" y="369537"/>
             <a:ext cx="8095208" cy="4955203"/>
           </a:xfrm>
           <a:prstGeom prst="rect">
@@ -4945,6 +5305,115 @@
     <p:extLst>
       <p:ext uri="{BB962C8B-B14F-4D97-AF65-F5344CB8AC3E}">
         <p14:creationId xmlns:p14="http://schemas.microsoft.com/office/powerpoint/2010/main" val="1412992480"/>
+      </p:ext>
+    </p:extLst>
+  </p:cSld>
+  <p:clrMapOvr>
+    <a:masterClrMapping/>
+  </p:clrMapOvr>
+</p:sld>
+</file>
+
+<file path=ppt/slides/slide9.xml><?xml version="1.0" encoding="utf-8"?>
+<p:sld xmlns:a="http://schemas.openxmlformats.org/drawingml/2006/main" xmlns:r="http://schemas.openxmlformats.org/officeDocument/2006/relationships" xmlns:p="http://schemas.openxmlformats.org/presentationml/2006/main">
+  <p:cSld>
+    <p:spTree>
+      <p:nvGrpSpPr>
+        <p:cNvPr id="1" name=""/>
+        <p:cNvGrpSpPr/>
+        <p:nvPr/>
+      </p:nvGrpSpPr>
+      <p:grpSpPr>
+        <a:xfrm>
+          <a:off x="0" y="0"/>
+          <a:ext cx="0" cy="0"/>
+          <a:chOff x="0" y="0"/>
+          <a:chExt cx="0" cy="0"/>
+        </a:xfrm>
+      </p:grpSpPr>
+      <p:sp>
+        <p:nvSpPr>
+          <p:cNvPr id="4" name="TextBox 3"/>
+          <p:cNvSpPr txBox="1"/>
+          <p:nvPr/>
+        </p:nvSpPr>
+        <p:spPr>
+          <a:xfrm>
+            <a:off x="362992" y="369537"/>
+            <a:ext cx="8095208" cy="2739211"/>
+          </a:xfrm>
+          <a:prstGeom prst="rect">
+            <a:avLst/>
+          </a:prstGeom>
+          <a:noFill/>
+        </p:spPr>
+        <p:txBody>
+          <a:bodyPr wrap="square" rtlCol="0">
+            <a:spAutoFit/>
+          </a:bodyPr>
+          <a:lstStyle/>
+          <a:p>
+            <a:r>
+              <a:rPr lang="en-US" sz="1400" b="1" dirty="0"/>
+              <a:t>Additional Comments</a:t>
+            </a:r>
+          </a:p>
+          <a:p>
+            <a:endParaRPr lang="en-US" sz="1400" b="1" dirty="0"/>
+          </a:p>
+          <a:p>
+            <a:r>
+              <a:rPr lang="en-US" sz="1200" dirty="0"/>
+              <a:t>The only Transport buttons integrated into the extension are the Play and Stop buttons.  The others are not used.</a:t>
+            </a:r>
+          </a:p>
+          <a:p>
+            <a:endParaRPr lang="en-US" sz="1200" dirty="0"/>
+          </a:p>
+          <a:p>
+            <a:r>
+              <a:rPr lang="en-US" sz="1200" dirty="0"/>
+              <a:t>You can open the Script Logger window in GP and see some level of debugging detail that might help if you encounter odd behavior.  Probably not, though, because I try to keep it to a minimum in the released versions.</a:t>
+            </a:r>
+          </a:p>
+          <a:p>
+            <a:endParaRPr lang="en-US" sz="1200" dirty="0"/>
+          </a:p>
+          <a:p>
+            <a:r>
+              <a:rPr lang="en-US" sz="1200" dirty="0"/>
+              <a:t>Configuring the details of how things are displayed can take a lot of extra widgets.  I usually hide these in my </a:t>
+            </a:r>
+            <a:r>
+              <a:rPr lang="en-US" sz="1200" dirty="0" err="1"/>
+              <a:t>rackspaces</a:t>
+            </a:r>
+            <a:r>
+              <a:rPr lang="en-US" sz="1200" dirty="0"/>
+              <a:t>, which means they’re only visible in Edit mode.  I tend to put them near (or even right on top of) the widgets they’re associated with.</a:t>
+            </a:r>
+          </a:p>
+          <a:p>
+            <a:endParaRPr lang="en-US" sz="1200" dirty="0"/>
+          </a:p>
+          <a:p>
+            <a:r>
+              <a:rPr lang="en-US" sz="1200" dirty="0"/>
+              <a:t>At times I’ve considered storing the configuration data in a separate file rather than extra widgets.  I always conclude that this would make things less reliable, more confusing, more difficult for the user, and require more user effort to keep files in sync.</a:t>
+            </a:r>
+          </a:p>
+          <a:p>
+            <a:endParaRPr lang="en-US" sz="1200"/>
+          </a:p>
+          <a:p>
+            <a:endParaRPr lang="en-US" sz="1200" dirty="0"/>
+          </a:p>
+        </p:txBody>
+      </p:sp>
+    </p:spTree>
+    <p:extLst>
+      <p:ext uri="{BB962C8B-B14F-4D97-AF65-F5344CB8AC3E}">
+        <p14:creationId xmlns:p14="http://schemas.microsoft.com/office/powerpoint/2010/main" val="1060359456"/>
       </p:ext>
     </p:extLst>
   </p:cSld>

</xml_diff>

<commit_message>
Allow momentary contact setting for pads
</commit_message>
<xml_diff>
--- a/SL-MK3 Extension.pptx
+++ b/SL-MK3 Extension.pptx
@@ -16,7 +16,7 @@
     <p:sldId id="269" r:id="rId10"/>
   </p:sldIdLst>
   <p:sldSz cx="9144000" cy="6858000" type="screen4x3"/>
-  <p:notesSz cx="6858000" cy="9144000"/>
+  <p:notesSz cx="7315200" cy="9601200"/>
   <p:defaultTextStyle>
     <a:defPPr>
       <a:defRPr lang="en-US"/>
@@ -251,7 +251,7 @@
           <a:p>
             <a:fld id="{95339B3D-D54B-4A71-BAD3-52665AB11A2C}" type="datetimeFigureOut">
               <a:rPr lang="en-US" smtClean="0"/>
-              <a:t>3/28/2023</a:t>
+              <a:t>8/23/2025</a:t>
             </a:fld>
             <a:endParaRPr lang="en-US"/>
           </a:p>
@@ -421,7 +421,7 @@
           <a:p>
             <a:fld id="{95339B3D-D54B-4A71-BAD3-52665AB11A2C}" type="datetimeFigureOut">
               <a:rPr lang="en-US" smtClean="0"/>
-              <a:t>3/28/2023</a:t>
+              <a:t>8/23/2025</a:t>
             </a:fld>
             <a:endParaRPr lang="en-US"/>
           </a:p>
@@ -601,7 +601,7 @@
           <a:p>
             <a:fld id="{95339B3D-D54B-4A71-BAD3-52665AB11A2C}" type="datetimeFigureOut">
               <a:rPr lang="en-US" smtClean="0"/>
-              <a:t>3/28/2023</a:t>
+              <a:t>8/23/2025</a:t>
             </a:fld>
             <a:endParaRPr lang="en-US"/>
           </a:p>
@@ -771,7 +771,7 @@
           <a:p>
             <a:fld id="{95339B3D-D54B-4A71-BAD3-52665AB11A2C}" type="datetimeFigureOut">
               <a:rPr lang="en-US" smtClean="0"/>
-              <a:t>3/28/2023</a:t>
+              <a:t>8/23/2025</a:t>
             </a:fld>
             <a:endParaRPr lang="en-US"/>
           </a:p>
@@ -1015,7 +1015,7 @@
           <a:p>
             <a:fld id="{95339B3D-D54B-4A71-BAD3-52665AB11A2C}" type="datetimeFigureOut">
               <a:rPr lang="en-US" smtClean="0"/>
-              <a:t>3/28/2023</a:t>
+              <a:t>8/23/2025</a:t>
             </a:fld>
             <a:endParaRPr lang="en-US"/>
           </a:p>
@@ -1247,7 +1247,7 @@
           <a:p>
             <a:fld id="{95339B3D-D54B-4A71-BAD3-52665AB11A2C}" type="datetimeFigureOut">
               <a:rPr lang="en-US" smtClean="0"/>
-              <a:t>3/28/2023</a:t>
+              <a:t>8/23/2025</a:t>
             </a:fld>
             <a:endParaRPr lang="en-US"/>
           </a:p>
@@ -1614,7 +1614,7 @@
           <a:p>
             <a:fld id="{95339B3D-D54B-4A71-BAD3-52665AB11A2C}" type="datetimeFigureOut">
               <a:rPr lang="en-US" smtClean="0"/>
-              <a:t>3/28/2023</a:t>
+              <a:t>8/23/2025</a:t>
             </a:fld>
             <a:endParaRPr lang="en-US"/>
           </a:p>
@@ -1732,7 +1732,7 @@
           <a:p>
             <a:fld id="{95339B3D-D54B-4A71-BAD3-52665AB11A2C}" type="datetimeFigureOut">
               <a:rPr lang="en-US" smtClean="0"/>
-              <a:t>3/28/2023</a:t>
+              <a:t>8/23/2025</a:t>
             </a:fld>
             <a:endParaRPr lang="en-US"/>
           </a:p>
@@ -1827,7 +1827,7 @@
           <a:p>
             <a:fld id="{95339B3D-D54B-4A71-BAD3-52665AB11A2C}" type="datetimeFigureOut">
               <a:rPr lang="en-US" smtClean="0"/>
-              <a:t>3/28/2023</a:t>
+              <a:t>8/23/2025</a:t>
             </a:fld>
             <a:endParaRPr lang="en-US"/>
           </a:p>
@@ -2104,7 +2104,7 @@
           <a:p>
             <a:fld id="{95339B3D-D54B-4A71-BAD3-52665AB11A2C}" type="datetimeFigureOut">
               <a:rPr lang="en-US" smtClean="0"/>
-              <a:t>3/28/2023</a:t>
+              <a:t>8/23/2025</a:t>
             </a:fld>
             <a:endParaRPr lang="en-US"/>
           </a:p>
@@ -2361,7 +2361,7 @@
           <a:p>
             <a:fld id="{95339B3D-D54B-4A71-BAD3-52665AB11A2C}" type="datetimeFigureOut">
               <a:rPr lang="en-US" smtClean="0"/>
-              <a:t>3/28/2023</a:t>
+              <a:t>8/23/2025</a:t>
             </a:fld>
             <a:endParaRPr lang="en-US"/>
           </a:p>
@@ -2574,7 +2574,7 @@
           <a:p>
             <a:fld id="{95339B3D-D54B-4A71-BAD3-52665AB11A2C}" type="datetimeFigureOut">
               <a:rPr lang="en-US" smtClean="0"/>
-              <a:t>3/28/2023</a:t>
+              <a:t>8/23/2025</a:t>
             </a:fld>
             <a:endParaRPr lang="en-US"/>
           </a:p>
@@ -4276,7 +4276,7 @@
         <p:spPr>
           <a:xfrm>
             <a:off x="362992" y="369537"/>
-            <a:ext cx="8095208" cy="6432530"/>
+            <a:ext cx="8095208" cy="6617196"/>
           </a:xfrm>
           <a:prstGeom prst="rect">
             <a:avLst/>
@@ -4467,6 +4467,24 @@
             <a:r>
               <a:rPr lang="en-US" sz="1200" dirty="0"/>
               <a:t>Knob resolution – for knob widgets you can change the resolution by appending an “_” after the label in the Caption field followed by an integer.  e.g., a Caption of “Volume_200” would result in a knob label of “Volume” and a resolution of 200 “ticks” to move the widget from 0.0 to 1.0.  The default resolution is 1000.</a:t>
+            </a:r>
+          </a:p>
+          <a:p>
+            <a:pPr marL="628650" lvl="1" indent="-171450">
+              <a:buFont typeface="Arial" panose="020B0604020202020204" pitchFamily="34" charset="0"/>
+              <a:buChar char="•"/>
+            </a:pPr>
+            <a:r>
+              <a:rPr lang="en-US" sz="1200" dirty="0"/>
+              <a:t>Pad – Caption format is “</a:t>
+            </a:r>
+            <a:r>
+              <a:rPr lang="en-US" sz="1200" dirty="0" err="1"/>
+              <a:t>Label_OnText_OffText</a:t>
+            </a:r>
+            <a:r>
+              <a:rPr lang="en-US" sz="1200" dirty="0"/>
+              <a:t>” with optional “_m” appended make it momentary contact</a:t>
             </a:r>
           </a:p>
           <a:p>

</xml_diff>

<commit_message>
Updated documentation, moved "_m" momentary flag to 4th position in widget Caption
</commit_message>
<xml_diff>
--- a/SL-MK3 Extension.pptx
+++ b/SL-MK3 Extension.pptx
@@ -5,15 +5,16 @@
     <p:sldMasterId id="2147483660" r:id="rId1"/>
   </p:sldMasterIdLst>
   <p:sldIdLst>
-    <p:sldId id="268" r:id="rId2"/>
-    <p:sldId id="262" r:id="rId3"/>
-    <p:sldId id="258" r:id="rId4"/>
-    <p:sldId id="263" r:id="rId5"/>
-    <p:sldId id="265" r:id="rId6"/>
-    <p:sldId id="267" r:id="rId7"/>
-    <p:sldId id="264" r:id="rId8"/>
-    <p:sldId id="266" r:id="rId9"/>
-    <p:sldId id="269" r:id="rId10"/>
+    <p:sldId id="262" r:id="rId2"/>
+    <p:sldId id="268" r:id="rId3"/>
+    <p:sldId id="271" r:id="rId4"/>
+    <p:sldId id="258" r:id="rId5"/>
+    <p:sldId id="263" r:id="rId6"/>
+    <p:sldId id="265" r:id="rId7"/>
+    <p:sldId id="267" r:id="rId8"/>
+    <p:sldId id="264" r:id="rId9"/>
+    <p:sldId id="266" r:id="rId10"/>
+    <p:sldId id="269" r:id="rId11"/>
   </p:sldIdLst>
   <p:sldSz cx="9144000" cy="6858000" type="screen4x3"/>
   <p:notesSz cx="7315200" cy="9601200"/>
@@ -251,7 +252,7 @@
           <a:p>
             <a:fld id="{95339B3D-D54B-4A71-BAD3-52665AB11A2C}" type="datetimeFigureOut">
               <a:rPr lang="en-US" smtClean="0"/>
-              <a:t>8/23/2025</a:t>
+              <a:t>12/27/2025</a:t>
             </a:fld>
             <a:endParaRPr lang="en-US"/>
           </a:p>
@@ -421,7 +422,7 @@
           <a:p>
             <a:fld id="{95339B3D-D54B-4A71-BAD3-52665AB11A2C}" type="datetimeFigureOut">
               <a:rPr lang="en-US" smtClean="0"/>
-              <a:t>8/23/2025</a:t>
+              <a:t>12/27/2025</a:t>
             </a:fld>
             <a:endParaRPr lang="en-US"/>
           </a:p>
@@ -601,7 +602,7 @@
           <a:p>
             <a:fld id="{95339B3D-D54B-4A71-BAD3-52665AB11A2C}" type="datetimeFigureOut">
               <a:rPr lang="en-US" smtClean="0"/>
-              <a:t>8/23/2025</a:t>
+              <a:t>12/27/2025</a:t>
             </a:fld>
             <a:endParaRPr lang="en-US"/>
           </a:p>
@@ -771,7 +772,7 @@
           <a:p>
             <a:fld id="{95339B3D-D54B-4A71-BAD3-52665AB11A2C}" type="datetimeFigureOut">
               <a:rPr lang="en-US" smtClean="0"/>
-              <a:t>8/23/2025</a:t>
+              <a:t>12/27/2025</a:t>
             </a:fld>
             <a:endParaRPr lang="en-US"/>
           </a:p>
@@ -1015,7 +1016,7 @@
           <a:p>
             <a:fld id="{95339B3D-D54B-4A71-BAD3-52665AB11A2C}" type="datetimeFigureOut">
               <a:rPr lang="en-US" smtClean="0"/>
-              <a:t>8/23/2025</a:t>
+              <a:t>12/27/2025</a:t>
             </a:fld>
             <a:endParaRPr lang="en-US"/>
           </a:p>
@@ -1247,7 +1248,7 @@
           <a:p>
             <a:fld id="{95339B3D-D54B-4A71-BAD3-52665AB11A2C}" type="datetimeFigureOut">
               <a:rPr lang="en-US" smtClean="0"/>
-              <a:t>8/23/2025</a:t>
+              <a:t>12/27/2025</a:t>
             </a:fld>
             <a:endParaRPr lang="en-US"/>
           </a:p>
@@ -1614,7 +1615,7 @@
           <a:p>
             <a:fld id="{95339B3D-D54B-4A71-BAD3-52665AB11A2C}" type="datetimeFigureOut">
               <a:rPr lang="en-US" smtClean="0"/>
-              <a:t>8/23/2025</a:t>
+              <a:t>12/27/2025</a:t>
             </a:fld>
             <a:endParaRPr lang="en-US"/>
           </a:p>
@@ -1732,7 +1733,7 @@
           <a:p>
             <a:fld id="{95339B3D-D54B-4A71-BAD3-52665AB11A2C}" type="datetimeFigureOut">
               <a:rPr lang="en-US" smtClean="0"/>
-              <a:t>8/23/2025</a:t>
+              <a:t>12/27/2025</a:t>
             </a:fld>
             <a:endParaRPr lang="en-US"/>
           </a:p>
@@ -1827,7 +1828,7 @@
           <a:p>
             <a:fld id="{95339B3D-D54B-4A71-BAD3-52665AB11A2C}" type="datetimeFigureOut">
               <a:rPr lang="en-US" smtClean="0"/>
-              <a:t>8/23/2025</a:t>
+              <a:t>12/27/2025</a:t>
             </a:fld>
             <a:endParaRPr lang="en-US"/>
           </a:p>
@@ -2104,7 +2105,7 @@
           <a:p>
             <a:fld id="{95339B3D-D54B-4A71-BAD3-52665AB11A2C}" type="datetimeFigureOut">
               <a:rPr lang="en-US" smtClean="0"/>
-              <a:t>8/23/2025</a:t>
+              <a:t>12/27/2025</a:t>
             </a:fld>
             <a:endParaRPr lang="en-US"/>
           </a:p>
@@ -2361,7 +2362,7 @@
           <a:p>
             <a:fld id="{95339B3D-D54B-4A71-BAD3-52665AB11A2C}" type="datetimeFigureOut">
               <a:rPr lang="en-US" smtClean="0"/>
-              <a:t>8/23/2025</a:t>
+              <a:t>12/27/2025</a:t>
             </a:fld>
             <a:endParaRPr lang="en-US"/>
           </a:p>
@@ -2574,7 +2575,7 @@
           <a:p>
             <a:fld id="{95339B3D-D54B-4A71-BAD3-52665AB11A2C}" type="datetimeFigureOut">
               <a:rPr lang="en-US" smtClean="0"/>
-              <a:t>8/23/2025</a:t>
+              <a:t>12/27/2025</a:t>
             </a:fld>
             <a:endParaRPr lang="en-US"/>
           </a:p>
@@ -2988,7 +2989,7 @@
         <p:spPr>
           <a:xfrm>
             <a:off x="362992" y="369537"/>
-            <a:ext cx="8095208" cy="5724644"/>
+            <a:ext cx="8095208" cy="2739211"/>
           </a:xfrm>
           <a:prstGeom prst="rect">
             <a:avLst/>
@@ -3003,156 +3004,38 @@
           <a:p>
             <a:r>
               <a:rPr lang="en-US" sz="1400" b="1" dirty="0"/>
-              <a:t>Getting Started with the SL-MK3 Extension</a:t>
-            </a:r>
-          </a:p>
-          <a:p>
-            <a:r>
-              <a:rPr lang="en-US" sz="1200" dirty="0"/>
-              <a:t>Follow these simple steps to get started:</a:t>
-            </a:r>
-          </a:p>
-          <a:p>
-            <a:pPr marL="628650" lvl="1" indent="-171450">
-              <a:buFont typeface="Arial" panose="020B0604020202020204" pitchFamily="34" charset="0"/>
-              <a:buChar char="•"/>
-            </a:pPr>
-            <a:r>
-              <a:rPr lang="en-US" sz="1200" dirty="0"/>
-              <a:t>Download the zip file for your platform (Mac or Windows) from </a:t>
-            </a:r>
-            <a:r>
-              <a:rPr lang="en-US" sz="1200" dirty="0">
-                <a:hlinkClick r:id="rId2"/>
-              </a:rPr>
-              <a:t>Releases · </a:t>
-            </a:r>
-            <a:r>
-              <a:rPr lang="en-US" sz="1200" dirty="0" err="1">
-                <a:hlinkClick r:id="rId2"/>
-              </a:rPr>
-              <a:t>WidnerM</a:t>
-            </a:r>
-            <a:r>
-              <a:rPr lang="en-US" sz="1200" dirty="0">
-                <a:hlinkClick r:id="rId2"/>
-              </a:rPr>
-              <a:t>/GP-SL-MK3 (github.com)</a:t>
-            </a:r>
+              <a:t>Overview of the Novation SL-MK3 Extension</a:t>
+            </a:r>
+          </a:p>
+          <a:p>
             <a:endParaRPr lang="en-US" sz="1200" dirty="0"/>
           </a:p>
           <a:p>
-            <a:pPr marL="628650" lvl="1" indent="-171450">
-              <a:buFont typeface="Arial" panose="020B0604020202020204" pitchFamily="34" charset="0"/>
-              <a:buChar char="•"/>
-            </a:pPr>
-            <a:r>
-              <a:rPr lang="en-US" sz="1200" dirty="0"/>
-              <a:t>From the zip file install the extension (.</a:t>
-            </a:r>
-            <a:r>
-              <a:rPr lang="en-US" sz="1200" dirty="0" err="1"/>
-              <a:t>dylib</a:t>
-            </a:r>
-            <a:r>
-              <a:rPr lang="en-US" sz="1200" dirty="0"/>
-              <a:t> for Mac, .</a:t>
-            </a:r>
-            <a:r>
-              <a:rPr lang="en-US" sz="1200" dirty="0" err="1"/>
-              <a:t>dll</a:t>
-            </a:r>
-            <a:r>
-              <a:rPr lang="en-US" sz="1200" dirty="0"/>
-              <a:t> for Windows) to the appropriate </a:t>
-            </a:r>
-            <a:r>
-              <a:rPr lang="en-US" sz="1200" dirty="0" err="1"/>
-              <a:t>GigPerformer</a:t>
-            </a:r>
-            <a:r>
-              <a:rPr lang="en-US" sz="1200" dirty="0"/>
-              <a:t> folder</a:t>
-            </a:r>
-          </a:p>
-          <a:p>
-            <a:pPr marL="1085850" lvl="2" indent="-171450">
-              <a:buFont typeface="Arial" panose="020B0604020202020204" pitchFamily="34" charset="0"/>
-              <a:buChar char="•"/>
-            </a:pPr>
-            <a:r>
-              <a:rPr lang="en-US" sz="1200" dirty="0"/>
-              <a:t>/Users/Shared/Gig Performer/Extensions on Mac</a:t>
-            </a:r>
-          </a:p>
-          <a:p>
-            <a:pPr marL="1085850" lvl="2" indent="-171450">
-              <a:buFont typeface="Arial" panose="020B0604020202020204" pitchFamily="34" charset="0"/>
-              <a:buChar char="•"/>
-            </a:pPr>
-            <a:r>
-              <a:rPr lang="en-US" sz="1200" dirty="0"/>
-              <a:t>C:/Users/Public/Documents/Gig Performer/Extensions on Windows</a:t>
-            </a:r>
-          </a:p>
-          <a:p>
-            <a:pPr marL="628650" lvl="1" indent="-171450">
-              <a:buFont typeface="Arial" panose="020B0604020202020204" pitchFamily="34" charset="0"/>
-              <a:buChar char="•"/>
-            </a:pPr>
-            <a:r>
-              <a:rPr lang="en-US" sz="1200" dirty="0"/>
-              <a:t>Load the Demo </a:t>
-            </a:r>
-            <a:r>
-              <a:rPr lang="en-US" sz="1200" dirty="0" err="1"/>
-              <a:t>gigfile</a:t>
-            </a:r>
-            <a:r>
-              <a:rPr lang="en-US" sz="1200" dirty="0"/>
-              <a:t> from the zip file in </a:t>
-            </a:r>
-            <a:r>
-              <a:rPr lang="en-US" sz="1200" dirty="0" err="1"/>
-              <a:t>GigPerformer</a:t>
+            <a:r>
+              <a:rPr lang="en-US" sz="1200" dirty="0"/>
+              <a:t>This extension works with the SL-MK3 by taking control of the displays, buttons, and pads when “InControl” mode is enabled using the “InControl” button on the SL-MK3.</a:t>
+            </a:r>
+          </a:p>
+          <a:p>
+            <a:endParaRPr lang="en-US" sz="1200" b="1" dirty="0"/>
+          </a:p>
+          <a:p>
+            <a:endParaRPr lang="en-US" sz="1200" b="1" dirty="0"/>
+          </a:p>
+          <a:p>
+            <a:r>
+              <a:rPr lang="en-US" sz="1400" b="1" dirty="0"/>
+              <a:t>Control Organization</a:t>
             </a:r>
             <a:endParaRPr lang="en-US" sz="1200" dirty="0"/>
           </a:p>
           <a:p>
-            <a:pPr marL="628650" lvl="1" indent="-171450">
-              <a:buFont typeface="Arial" panose="020B0604020202020204" pitchFamily="34" charset="0"/>
-              <a:buChar char="•"/>
-            </a:pPr>
-            <a:r>
-              <a:rPr lang="en-US" sz="1200" dirty="0"/>
-              <a:t>Make sure your controller is in InControl mode by pressing the InControl button</a:t>
-            </a:r>
-          </a:p>
-          <a:p>
-            <a:pPr marL="628650" lvl="1" indent="-171450">
-              <a:buFont typeface="Arial" panose="020B0604020202020204" pitchFamily="34" charset="0"/>
-              <a:buChar char="•"/>
-            </a:pPr>
-            <a:r>
-              <a:rPr lang="en-US" sz="1200" dirty="0"/>
-              <a:t>You may need to exit and restart </a:t>
-            </a:r>
-            <a:r>
-              <a:rPr lang="en-US" sz="1200" dirty="0" err="1"/>
-              <a:t>GigPerformer</a:t>
-            </a:r>
-            <a:r>
-              <a:rPr lang="en-US" sz="1200" dirty="0"/>
-              <a:t> after the first time you enable the extension</a:t>
-            </a:r>
-          </a:p>
-          <a:p>
             <a:endParaRPr lang="en-US" sz="1200" dirty="0"/>
           </a:p>
           <a:p>
             <a:r>
-              <a:rPr lang="en-US" sz="1400" b="1" dirty="0"/>
-              <a:t>Setting the MIDI Ports</a:t>
+              <a:rPr lang="en-US" sz="1200" dirty="0"/>
+              <a:t>The SL-MK3 extension works with control surface items in groups by type:  knobs, buttons, pads, and faders.</a:t>
             </a:r>
           </a:p>
           <a:p>
@@ -3161,79 +3044,16 @@
           <a:p>
             <a:r>
               <a:rPr lang="en-US" sz="1200" dirty="0"/>
-              <a:t>The extension should automatically find your controller’s MIDI ports using their default names. If it does not, you can tell the extension which MIDI ports to use by creating two text widgets in the global </a:t>
-            </a:r>
-            <a:r>
-              <a:rPr lang="en-US" sz="1200" dirty="0" err="1"/>
-              <a:t>rackspace</a:t>
-            </a:r>
-            <a:r>
-              <a:rPr lang="en-US" sz="1200" dirty="0"/>
-              <a:t> and setting them appropriately</a:t>
-            </a:r>
-            <a:r>
-              <a:rPr lang="sv-SE" sz="1200" dirty="0"/>
-              <a:t>.</a:t>
-            </a:r>
-          </a:p>
-          <a:p>
-            <a:endParaRPr lang="sv-SE" sz="1200" dirty="0"/>
-          </a:p>
-          <a:p>
-            <a:r>
-              <a:rPr lang="en-US" sz="1200" dirty="0"/>
-              <a:t>These widgets must be named “</a:t>
-            </a:r>
-            <a:r>
-              <a:rPr lang="en-US" sz="1200" dirty="0" err="1"/>
-              <a:t>sl_midiin</a:t>
-            </a:r>
-            <a:r>
-              <a:rPr lang="en-US" sz="1200" dirty="0"/>
-              <a:t>” and “</a:t>
-            </a:r>
-            <a:r>
-              <a:rPr lang="en-US" sz="1200" dirty="0" err="1"/>
-              <a:t>sl_midiout</a:t>
-            </a:r>
-            <a:r>
-              <a:rPr lang="en-US" sz="1200" dirty="0"/>
-              <a:t>” (using the Advanced tab in the “OSC/</a:t>
-            </a:r>
-            <a:r>
-              <a:rPr lang="en-US" sz="1200" dirty="0" err="1"/>
-              <a:t>GPScript</a:t>
-            </a:r>
-            <a:r>
-              <a:rPr lang="en-US" sz="1200" dirty="0"/>
-              <a:t> Name” field).</a:t>
-            </a:r>
-          </a:p>
-          <a:p>
-            <a:r>
-              <a:rPr lang="en-US" sz="1200" dirty="0"/>
-              <a:t>Set the Caption for these widgets (on the General tab) to the MIDI port names exactly as they appear in the GP MIDI ports list.</a:t>
+              <a:t>The extension is built around the concept of “banks” of each control group.  You can have multiple knob banks, pad banks, etc.</a:t>
             </a:r>
           </a:p>
           <a:p>
             <a:endParaRPr lang="en-US" sz="1200" dirty="0"/>
           </a:p>
           <a:p>
-            <a:endParaRPr lang="sv-SE" sz="1200" dirty="0"/>
-          </a:p>
-          <a:p>
-            <a:r>
-              <a:rPr lang="en-US" sz="1400" b="1" dirty="0"/>
-              <a:t>Basic Operations and Troubleshooting</a:t>
-            </a:r>
-          </a:p>
-          <a:p>
-            <a:endParaRPr lang="sv-SE" sz="1200" dirty="0"/>
-          </a:p>
-          <a:p>
-            <a:r>
-              <a:rPr lang="en-US" sz="1200" dirty="0"/>
-              <a:t>Without any widgets configured you should see your </a:t>
+            <a:r>
+              <a:rPr lang="en-US" sz="1200" dirty="0"/>
+              <a:t>Next to each row of controls there are up/down arrows, which the extension can utilize to “bank switch” through as many banks of such controls as you care to have in your </a:t>
             </a:r>
             <a:r>
               <a:rPr lang="en-US" sz="1200" dirty="0" err="1"/>
@@ -3241,66 +3061,831 @@
             </a:r>
             <a:r>
               <a:rPr lang="en-US" sz="1200" dirty="0"/>
-              <a:t> / Variations / Songs / </a:t>
-            </a:r>
-            <a:r>
-              <a:rPr lang="en-US" sz="1200" dirty="0" err="1"/>
+              <a:t>.</a:t>
+            </a:r>
+          </a:p>
+        </p:txBody>
+      </p:sp>
+      <p:pic>
+        <p:nvPicPr>
+          <p:cNvPr id="2" name="Picture 1">
+            <a:extLst>
+              <a:ext uri="{FF2B5EF4-FFF2-40B4-BE49-F238E27FC236}">
+                <a16:creationId xmlns:a16="http://schemas.microsoft.com/office/drawing/2014/main" id="{9CEC50BB-4137-25C9-D075-E6873975561C}"/>
+              </a:ext>
+            </a:extLst>
+          </p:cNvPr>
+          <p:cNvPicPr>
+            <a:picLocks noChangeAspect="1"/>
+          </p:cNvPicPr>
+          <p:nvPr/>
+        </p:nvPicPr>
+        <p:blipFill>
+          <a:blip r:embed="rId2"/>
+          <a:stretch>
+            <a:fillRect/>
+          </a:stretch>
+        </p:blipFill>
+        <p:spPr>
+          <a:xfrm>
+            <a:off x="1552034" y="4584248"/>
+            <a:ext cx="7155049" cy="1278095"/>
+          </a:xfrm>
+          <a:prstGeom prst="rect">
+            <a:avLst/>
+          </a:prstGeom>
+        </p:spPr>
+      </p:pic>
+      <p:cxnSp>
+        <p:nvCxnSpPr>
+          <p:cNvPr id="3" name="Straight Arrow Connector 2">
+            <a:extLst>
+              <a:ext uri="{FF2B5EF4-FFF2-40B4-BE49-F238E27FC236}">
+                <a16:creationId xmlns:a16="http://schemas.microsoft.com/office/drawing/2014/main" id="{E0F027CB-CCC1-8EDF-0F90-0315F2E5C9E0}"/>
+              </a:ext>
+            </a:extLst>
+          </p:cNvPr>
+          <p:cNvCxnSpPr>
+            <a:cxnSpLocks/>
+          </p:cNvCxnSpPr>
+          <p:nvPr/>
+        </p:nvCxnSpPr>
+        <p:spPr>
+          <a:xfrm>
+            <a:off x="1935535" y="4365843"/>
+            <a:ext cx="1422046" cy="793455"/>
+          </a:xfrm>
+          <a:prstGeom prst="straightConnector1">
+            <a:avLst/>
+          </a:prstGeom>
+          <a:ln>
+            <a:tailEnd type="triangle"/>
+          </a:ln>
+        </p:spPr>
+        <p:style>
+          <a:lnRef idx="2">
+            <a:schemeClr val="accent4"/>
+          </a:lnRef>
+          <a:fillRef idx="0">
+            <a:schemeClr val="accent4"/>
+          </a:fillRef>
+          <a:effectRef idx="1">
+            <a:schemeClr val="accent4"/>
+          </a:effectRef>
+          <a:fontRef idx="minor">
+            <a:schemeClr val="tx1"/>
+          </a:fontRef>
+        </p:style>
+      </p:cxnSp>
+      <p:sp>
+        <p:nvSpPr>
+          <p:cNvPr id="5" name="TextBox 4">
+            <a:extLst>
+              <a:ext uri="{FF2B5EF4-FFF2-40B4-BE49-F238E27FC236}">
+                <a16:creationId xmlns:a16="http://schemas.microsoft.com/office/drawing/2014/main" id="{5FD5EA65-F7F2-D75C-2F4E-6DABDEC1F24B}"/>
+              </a:ext>
+            </a:extLst>
+          </p:cNvPr>
+          <p:cNvSpPr txBox="1"/>
+          <p:nvPr/>
+        </p:nvSpPr>
+        <p:spPr>
+          <a:xfrm>
+            <a:off x="414667" y="3534846"/>
+            <a:ext cx="1926618" cy="830997"/>
+          </a:xfrm>
+          <a:prstGeom prst="rect">
+            <a:avLst/>
+          </a:prstGeom>
+          <a:noFill/>
+        </p:spPr>
+        <p:txBody>
+          <a:bodyPr wrap="none" rtlCol="0">
+            <a:spAutoFit/>
+          </a:bodyPr>
+          <a:lstStyle/>
+          <a:p>
+            <a:pPr algn="ctr"/>
+            <a:r>
+              <a:rPr lang="en-US" sz="1600" dirty="0"/>
+              <a:t>Toggle Showing</a:t>
+            </a:r>
+          </a:p>
+          <a:p>
+            <a:pPr algn="ctr"/>
+            <a:r>
+              <a:rPr lang="en-US" sz="1600" dirty="0"/>
+              <a:t>Racks/Songs or</a:t>
+            </a:r>
+          </a:p>
+          <a:p>
+            <a:pPr algn="ctr"/>
+            <a:r>
+              <a:rPr lang="en-US" sz="1600" dirty="0"/>
+              <a:t>Variations/</a:t>
+            </a:r>
+            <a:r>
+              <a:rPr lang="en-US" sz="1600" dirty="0" err="1"/>
               <a:t>Songparts</a:t>
             </a:r>
-            <a:r>
-              <a:rPr lang="en-US" sz="1200" dirty="0"/>
-              <a:t> listed on the bottom row of the display.</a:t>
-            </a:r>
-            <a:r>
-              <a:rPr lang="sv-SE" sz="1200" dirty="0"/>
-              <a:t>  You can switch between them using the Grid and Clear keys and cycle through using the arrows toward the lower left of the keyboard.</a:t>
-            </a:r>
-          </a:p>
-          <a:p>
-            <a:endParaRPr lang="sv-SE" sz="1200" dirty="0"/>
-          </a:p>
-          <a:p>
-            <a:r>
-              <a:rPr lang="sv-SE" sz="1200" dirty="0"/>
-              <a:t>The naming conventions for other widgets is the main subject of the remainder of this document.</a:t>
-            </a:r>
-            <a:endParaRPr lang="en-US" sz="1200" dirty="0"/>
-          </a:p>
-          <a:p>
-            <a:endParaRPr lang="sv-SE" sz="1200" dirty="0"/>
-          </a:p>
-          <a:p>
-            <a:r>
-              <a:rPr lang="en-US" sz="1200" b="1" i="1" dirty="0"/>
-              <a:t>To sync your Rackspace with the SL-MK3 after adding new control widgets you should change </a:t>
-            </a:r>
-            <a:r>
-              <a:rPr lang="en-US" sz="1200" b="1" i="1" dirty="0" err="1"/>
-              <a:t>Rackspaces</a:t>
-            </a:r>
-            <a:r>
-              <a:rPr lang="en-US" sz="1200" b="1" i="1" dirty="0"/>
-              <a:t>, then come back</a:t>
-            </a:r>
-            <a:r>
-              <a:rPr lang="en-US" sz="1200" dirty="0"/>
-              <a:t>.  This is necessary because the extension scans widget names upon Rackspace entry.  It doesn’t know you renamed widgets until you change </a:t>
-            </a:r>
-            <a:r>
-              <a:rPr lang="en-US" sz="1200" dirty="0" err="1"/>
-              <a:t>Rackspaces</a:t>
-            </a:r>
-            <a:r>
-              <a:rPr lang="en-US" sz="1200" dirty="0"/>
-              <a:t> and return.</a:t>
-            </a:r>
-          </a:p>
-        </p:txBody>
-      </p:sp>
+            <a:endParaRPr lang="en-US" sz="1600" dirty="0"/>
+          </a:p>
+        </p:txBody>
+      </p:sp>
+      <p:cxnSp>
+        <p:nvCxnSpPr>
+          <p:cNvPr id="6" name="Straight Arrow Connector 5">
+            <a:extLst>
+              <a:ext uri="{FF2B5EF4-FFF2-40B4-BE49-F238E27FC236}">
+                <a16:creationId xmlns:a16="http://schemas.microsoft.com/office/drawing/2014/main" id="{31A2EB5B-B8B6-315C-ED9E-45C2EAC05E1E}"/>
+              </a:ext>
+            </a:extLst>
+          </p:cNvPr>
+          <p:cNvCxnSpPr>
+            <a:cxnSpLocks/>
+            <a:stCxn id="7" idx="2"/>
+          </p:cNvCxnSpPr>
+          <p:nvPr/>
+        </p:nvCxnSpPr>
+        <p:spPr>
+          <a:xfrm>
+            <a:off x="8170925" y="4180985"/>
+            <a:ext cx="390367" cy="487462"/>
+          </a:xfrm>
+          <a:prstGeom prst="straightConnector1">
+            <a:avLst/>
+          </a:prstGeom>
+          <a:ln>
+            <a:tailEnd type="triangle"/>
+          </a:ln>
+        </p:spPr>
+        <p:style>
+          <a:lnRef idx="2">
+            <a:schemeClr val="accent4"/>
+          </a:lnRef>
+          <a:fillRef idx="0">
+            <a:schemeClr val="accent4"/>
+          </a:fillRef>
+          <a:effectRef idx="1">
+            <a:schemeClr val="accent4"/>
+          </a:effectRef>
+          <a:fontRef idx="minor">
+            <a:schemeClr val="tx1"/>
+          </a:fontRef>
+        </p:style>
+      </p:cxnSp>
+      <p:sp>
+        <p:nvSpPr>
+          <p:cNvPr id="7" name="TextBox 6">
+            <a:extLst>
+              <a:ext uri="{FF2B5EF4-FFF2-40B4-BE49-F238E27FC236}">
+                <a16:creationId xmlns:a16="http://schemas.microsoft.com/office/drawing/2014/main" id="{48F573CB-9472-A566-2A2F-ADD4707A363A}"/>
+              </a:ext>
+            </a:extLst>
+          </p:cNvPr>
+          <p:cNvSpPr txBox="1"/>
+          <p:nvPr/>
+        </p:nvSpPr>
+        <p:spPr>
+          <a:xfrm>
+            <a:off x="7461532" y="3596210"/>
+            <a:ext cx="1418786" cy="584775"/>
+          </a:xfrm>
+          <a:prstGeom prst="rect">
+            <a:avLst/>
+          </a:prstGeom>
+          <a:noFill/>
+        </p:spPr>
+        <p:txBody>
+          <a:bodyPr wrap="none" rtlCol="0">
+            <a:spAutoFit/>
+          </a:bodyPr>
+          <a:lstStyle/>
+          <a:p>
+            <a:r>
+              <a:rPr lang="en-US" sz="1600" dirty="0"/>
+              <a:t>Change Button</a:t>
+            </a:r>
+          </a:p>
+          <a:p>
+            <a:pPr algn="ctr"/>
+            <a:r>
+              <a:rPr lang="en-US" sz="1600" dirty="0"/>
+              <a:t>banks</a:t>
+            </a:r>
+          </a:p>
+        </p:txBody>
+      </p:sp>
+      <p:cxnSp>
+        <p:nvCxnSpPr>
+          <p:cNvPr id="8" name="Straight Arrow Connector 7">
+            <a:extLst>
+              <a:ext uri="{FF2B5EF4-FFF2-40B4-BE49-F238E27FC236}">
+                <a16:creationId xmlns:a16="http://schemas.microsoft.com/office/drawing/2014/main" id="{AE8F3224-882F-EC4C-7FCE-BC614A157C07}"/>
+              </a:ext>
+            </a:extLst>
+          </p:cNvPr>
+          <p:cNvCxnSpPr>
+            <a:cxnSpLocks/>
+            <a:stCxn id="9" idx="0"/>
+          </p:cNvCxnSpPr>
+          <p:nvPr/>
+        </p:nvCxnSpPr>
+        <p:spPr>
+          <a:xfrm flipH="1" flipV="1">
+            <a:off x="3587086" y="5790732"/>
+            <a:ext cx="501257" cy="322347"/>
+          </a:xfrm>
+          <a:prstGeom prst="straightConnector1">
+            <a:avLst/>
+          </a:prstGeom>
+          <a:ln>
+            <a:tailEnd type="triangle"/>
+          </a:ln>
+        </p:spPr>
+        <p:style>
+          <a:lnRef idx="2">
+            <a:schemeClr val="accent4"/>
+          </a:lnRef>
+          <a:fillRef idx="0">
+            <a:schemeClr val="accent4"/>
+          </a:fillRef>
+          <a:effectRef idx="1">
+            <a:schemeClr val="accent4"/>
+          </a:effectRef>
+          <a:fontRef idx="minor">
+            <a:schemeClr val="tx1"/>
+          </a:fontRef>
+        </p:style>
+      </p:cxnSp>
+      <p:sp>
+        <p:nvSpPr>
+          <p:cNvPr id="9" name="TextBox 8">
+            <a:extLst>
+              <a:ext uri="{FF2B5EF4-FFF2-40B4-BE49-F238E27FC236}">
+                <a16:creationId xmlns:a16="http://schemas.microsoft.com/office/drawing/2014/main" id="{589EB16E-6738-899B-12D7-D93769E47280}"/>
+              </a:ext>
+            </a:extLst>
+          </p:cNvPr>
+          <p:cNvSpPr txBox="1"/>
+          <p:nvPr/>
+        </p:nvSpPr>
+        <p:spPr>
+          <a:xfrm>
+            <a:off x="3245035" y="6113079"/>
+            <a:ext cx="1686616" cy="338554"/>
+          </a:xfrm>
+          <a:prstGeom prst="rect">
+            <a:avLst/>
+          </a:prstGeom>
+          <a:noFill/>
+        </p:spPr>
+        <p:txBody>
+          <a:bodyPr wrap="none" rtlCol="0">
+            <a:spAutoFit/>
+          </a:bodyPr>
+          <a:lstStyle/>
+          <a:p>
+            <a:r>
+              <a:rPr lang="en-US" sz="1600" dirty="0"/>
+              <a:t>Change Pad banks</a:t>
+            </a:r>
+          </a:p>
+        </p:txBody>
+      </p:sp>
+      <p:cxnSp>
+        <p:nvCxnSpPr>
+          <p:cNvPr id="10" name="Straight Arrow Connector 9">
+            <a:extLst>
+              <a:ext uri="{FF2B5EF4-FFF2-40B4-BE49-F238E27FC236}">
+                <a16:creationId xmlns:a16="http://schemas.microsoft.com/office/drawing/2014/main" id="{863743DB-0859-EEA5-6737-538A89D6434D}"/>
+              </a:ext>
+            </a:extLst>
+          </p:cNvPr>
+          <p:cNvCxnSpPr>
+            <a:cxnSpLocks/>
+            <a:stCxn id="11" idx="0"/>
+          </p:cNvCxnSpPr>
+          <p:nvPr/>
+        </p:nvCxnSpPr>
+        <p:spPr>
+          <a:xfrm flipH="1" flipV="1">
+            <a:off x="6013678" y="5769938"/>
+            <a:ext cx="201801" cy="310810"/>
+          </a:xfrm>
+          <a:prstGeom prst="straightConnector1">
+            <a:avLst/>
+          </a:prstGeom>
+          <a:ln>
+            <a:tailEnd type="triangle"/>
+          </a:ln>
+        </p:spPr>
+        <p:style>
+          <a:lnRef idx="2">
+            <a:schemeClr val="accent4"/>
+          </a:lnRef>
+          <a:fillRef idx="0">
+            <a:schemeClr val="accent4"/>
+          </a:fillRef>
+          <a:effectRef idx="1">
+            <a:schemeClr val="accent4"/>
+          </a:effectRef>
+          <a:fontRef idx="minor">
+            <a:schemeClr val="tx1"/>
+          </a:fontRef>
+        </p:style>
+      </p:cxnSp>
+      <p:sp>
+        <p:nvSpPr>
+          <p:cNvPr id="11" name="TextBox 10">
+            <a:extLst>
+              <a:ext uri="{FF2B5EF4-FFF2-40B4-BE49-F238E27FC236}">
+                <a16:creationId xmlns:a16="http://schemas.microsoft.com/office/drawing/2014/main" id="{714D4DED-0100-88ED-C079-6E508C2149ED}"/>
+              </a:ext>
+            </a:extLst>
+          </p:cNvPr>
+          <p:cNvSpPr txBox="1"/>
+          <p:nvPr/>
+        </p:nvSpPr>
+        <p:spPr>
+          <a:xfrm>
+            <a:off x="5290963" y="6080748"/>
+            <a:ext cx="1849032" cy="338554"/>
+          </a:xfrm>
+          <a:prstGeom prst="rect">
+            <a:avLst/>
+          </a:prstGeom>
+          <a:noFill/>
+        </p:spPr>
+        <p:txBody>
+          <a:bodyPr wrap="none" rtlCol="0">
+            <a:spAutoFit/>
+          </a:bodyPr>
+          <a:lstStyle/>
+          <a:p>
+            <a:r>
+              <a:rPr lang="en-US" sz="1600" dirty="0"/>
+              <a:t>Change Fader banks</a:t>
+            </a:r>
+          </a:p>
+        </p:txBody>
+      </p:sp>
+      <p:sp>
+        <p:nvSpPr>
+          <p:cNvPr id="12" name="TextBox 11">
+            <a:extLst>
+              <a:ext uri="{FF2B5EF4-FFF2-40B4-BE49-F238E27FC236}">
+                <a16:creationId xmlns:a16="http://schemas.microsoft.com/office/drawing/2014/main" id="{8C33C157-8EAA-D9C2-DE05-A1EE25C659A8}"/>
+              </a:ext>
+            </a:extLst>
+          </p:cNvPr>
+          <p:cNvSpPr txBox="1"/>
+          <p:nvPr/>
+        </p:nvSpPr>
+        <p:spPr>
+          <a:xfrm>
+            <a:off x="1148056" y="6071505"/>
+            <a:ext cx="1944314" cy="584775"/>
+          </a:xfrm>
+          <a:prstGeom prst="rect">
+            <a:avLst/>
+          </a:prstGeom>
+          <a:noFill/>
+        </p:spPr>
+        <p:txBody>
+          <a:bodyPr wrap="none" rtlCol="0">
+            <a:spAutoFit/>
+          </a:bodyPr>
+          <a:lstStyle/>
+          <a:p>
+            <a:pPr algn="ctr"/>
+            <a:r>
+              <a:rPr lang="en-US" sz="1600" dirty="0"/>
+              <a:t>Scroll Racks/Songs or</a:t>
+            </a:r>
+          </a:p>
+          <a:p>
+            <a:pPr algn="ctr"/>
+            <a:r>
+              <a:rPr lang="en-US" sz="1600" dirty="0"/>
+              <a:t>Variations/</a:t>
+            </a:r>
+            <a:r>
+              <a:rPr lang="en-US" sz="1600" dirty="0" err="1"/>
+              <a:t>Songparts</a:t>
+            </a:r>
+            <a:endParaRPr lang="en-US" sz="1600" dirty="0"/>
+          </a:p>
+        </p:txBody>
+      </p:sp>
+      <p:cxnSp>
+        <p:nvCxnSpPr>
+          <p:cNvPr id="13" name="Straight Arrow Connector 12">
+            <a:extLst>
+              <a:ext uri="{FF2B5EF4-FFF2-40B4-BE49-F238E27FC236}">
+                <a16:creationId xmlns:a16="http://schemas.microsoft.com/office/drawing/2014/main" id="{11B738EA-1508-F319-5639-6C3EC3E95FAE}"/>
+              </a:ext>
+            </a:extLst>
+          </p:cNvPr>
+          <p:cNvCxnSpPr>
+            <a:cxnSpLocks/>
+          </p:cNvCxnSpPr>
+          <p:nvPr/>
+        </p:nvCxnSpPr>
+        <p:spPr>
+          <a:xfrm flipV="1">
+            <a:off x="1874257" y="5769938"/>
+            <a:ext cx="0" cy="310810"/>
+          </a:xfrm>
+          <a:prstGeom prst="straightConnector1">
+            <a:avLst/>
+          </a:prstGeom>
+          <a:ln>
+            <a:tailEnd type="triangle"/>
+          </a:ln>
+        </p:spPr>
+        <p:style>
+          <a:lnRef idx="2">
+            <a:schemeClr val="accent4"/>
+          </a:lnRef>
+          <a:fillRef idx="0">
+            <a:schemeClr val="accent4"/>
+          </a:fillRef>
+          <a:effectRef idx="1">
+            <a:schemeClr val="accent4"/>
+          </a:effectRef>
+          <a:fontRef idx="minor">
+            <a:schemeClr val="tx1"/>
+          </a:fontRef>
+        </p:style>
+      </p:cxnSp>
+      <p:cxnSp>
+        <p:nvCxnSpPr>
+          <p:cNvPr id="14" name="Straight Arrow Connector 13">
+            <a:extLst>
+              <a:ext uri="{FF2B5EF4-FFF2-40B4-BE49-F238E27FC236}">
+                <a16:creationId xmlns:a16="http://schemas.microsoft.com/office/drawing/2014/main" id="{EFC8BB09-4FE1-A046-0BD9-06C41139582F}"/>
+              </a:ext>
+            </a:extLst>
+          </p:cNvPr>
+          <p:cNvCxnSpPr>
+            <a:cxnSpLocks/>
+            <a:stCxn id="15" idx="2"/>
+          </p:cNvCxnSpPr>
+          <p:nvPr/>
+        </p:nvCxnSpPr>
+        <p:spPr>
+          <a:xfrm flipH="1">
+            <a:off x="5905195" y="4385587"/>
+            <a:ext cx="108483" cy="664171"/>
+          </a:xfrm>
+          <a:prstGeom prst="straightConnector1">
+            <a:avLst/>
+          </a:prstGeom>
+          <a:ln>
+            <a:tailEnd type="triangle"/>
+          </a:ln>
+        </p:spPr>
+        <p:style>
+          <a:lnRef idx="2">
+            <a:schemeClr val="accent4"/>
+          </a:lnRef>
+          <a:fillRef idx="0">
+            <a:schemeClr val="accent4"/>
+          </a:fillRef>
+          <a:effectRef idx="1">
+            <a:schemeClr val="accent4"/>
+          </a:effectRef>
+          <a:fontRef idx="minor">
+            <a:schemeClr val="tx1"/>
+          </a:fontRef>
+        </p:style>
+      </p:cxnSp>
+      <p:sp>
+        <p:nvSpPr>
+          <p:cNvPr id="15" name="TextBox 14">
+            <a:extLst>
+              <a:ext uri="{FF2B5EF4-FFF2-40B4-BE49-F238E27FC236}">
+                <a16:creationId xmlns:a16="http://schemas.microsoft.com/office/drawing/2014/main" id="{C9633E22-82C8-138D-1501-90CBFF458A47}"/>
+              </a:ext>
+            </a:extLst>
+          </p:cNvPr>
+          <p:cNvSpPr txBox="1"/>
+          <p:nvPr/>
+        </p:nvSpPr>
+        <p:spPr>
+          <a:xfrm>
+            <a:off x="5029434" y="3800812"/>
+            <a:ext cx="1968488" cy="584775"/>
+          </a:xfrm>
+          <a:prstGeom prst="rect">
+            <a:avLst/>
+          </a:prstGeom>
+          <a:noFill/>
+        </p:spPr>
+        <p:txBody>
+          <a:bodyPr wrap="none" rtlCol="0">
+            <a:spAutoFit/>
+          </a:bodyPr>
+          <a:lstStyle/>
+          <a:p>
+            <a:pPr algn="ctr"/>
+            <a:r>
+              <a:rPr lang="en-US" sz="1600" dirty="0"/>
+              <a:t>Toggle Screen Display</a:t>
+            </a:r>
+          </a:p>
+          <a:p>
+            <a:pPr algn="ctr"/>
+            <a:r>
+              <a:rPr lang="en-US" sz="1600" dirty="0"/>
+              <a:t>Between Knobs/Pads</a:t>
+            </a:r>
+          </a:p>
+        </p:txBody>
+      </p:sp>
+      <p:cxnSp>
+        <p:nvCxnSpPr>
+          <p:cNvPr id="16" name="Straight Arrow Connector 15">
+            <a:extLst>
+              <a:ext uri="{FF2B5EF4-FFF2-40B4-BE49-F238E27FC236}">
+                <a16:creationId xmlns:a16="http://schemas.microsoft.com/office/drawing/2014/main" id="{9F5DEDA1-3EAE-21EE-CFBC-D88522CE260D}"/>
+              </a:ext>
+            </a:extLst>
+          </p:cNvPr>
+          <p:cNvCxnSpPr>
+            <a:cxnSpLocks/>
+            <a:stCxn id="17" idx="2"/>
+          </p:cNvCxnSpPr>
+          <p:nvPr/>
+        </p:nvCxnSpPr>
+        <p:spPr>
+          <a:xfrm flipH="1">
+            <a:off x="3580674" y="3811729"/>
+            <a:ext cx="6412" cy="801630"/>
+          </a:xfrm>
+          <a:prstGeom prst="straightConnector1">
+            <a:avLst/>
+          </a:prstGeom>
+          <a:ln>
+            <a:tailEnd type="triangle"/>
+          </a:ln>
+        </p:spPr>
+        <p:style>
+          <a:lnRef idx="2">
+            <a:schemeClr val="accent4"/>
+          </a:lnRef>
+          <a:fillRef idx="0">
+            <a:schemeClr val="accent4"/>
+          </a:fillRef>
+          <a:effectRef idx="1">
+            <a:schemeClr val="accent4"/>
+          </a:effectRef>
+          <a:fontRef idx="minor">
+            <a:schemeClr val="tx1"/>
+          </a:fontRef>
+        </p:style>
+      </p:cxnSp>
+      <p:sp>
+        <p:nvSpPr>
+          <p:cNvPr id="17" name="TextBox 16">
+            <a:extLst>
+              <a:ext uri="{FF2B5EF4-FFF2-40B4-BE49-F238E27FC236}">
+                <a16:creationId xmlns:a16="http://schemas.microsoft.com/office/drawing/2014/main" id="{E1D28148-E118-642F-B744-49146AA527DF}"/>
+              </a:ext>
+            </a:extLst>
+          </p:cNvPr>
+          <p:cNvSpPr txBox="1"/>
+          <p:nvPr/>
+        </p:nvSpPr>
+        <p:spPr>
+          <a:xfrm>
+            <a:off x="2683056" y="3473175"/>
+            <a:ext cx="1808059" cy="338554"/>
+          </a:xfrm>
+          <a:prstGeom prst="rect">
+            <a:avLst/>
+          </a:prstGeom>
+          <a:noFill/>
+        </p:spPr>
+        <p:txBody>
+          <a:bodyPr wrap="square" rtlCol="0">
+            <a:spAutoFit/>
+          </a:bodyPr>
+          <a:lstStyle/>
+          <a:p>
+            <a:r>
+              <a:rPr lang="en-US" sz="1600" dirty="0"/>
+              <a:t>Change Knob banks</a:t>
+            </a:r>
+          </a:p>
+        </p:txBody>
+      </p:sp>
+      <p:sp>
+        <p:nvSpPr>
+          <p:cNvPr id="23" name="TextBox 22">
+            <a:extLst>
+              <a:ext uri="{FF2B5EF4-FFF2-40B4-BE49-F238E27FC236}">
+                <a16:creationId xmlns:a16="http://schemas.microsoft.com/office/drawing/2014/main" id="{2AAA303B-E4CB-E894-A44F-BB7F1E684AD0}"/>
+              </a:ext>
+            </a:extLst>
+          </p:cNvPr>
+          <p:cNvSpPr txBox="1"/>
+          <p:nvPr/>
+        </p:nvSpPr>
+        <p:spPr>
+          <a:xfrm>
+            <a:off x="362992" y="4807796"/>
+            <a:ext cx="718210" cy="830997"/>
+          </a:xfrm>
+          <a:prstGeom prst="rect">
+            <a:avLst/>
+          </a:prstGeom>
+          <a:noFill/>
+        </p:spPr>
+        <p:txBody>
+          <a:bodyPr wrap="none" rtlCol="0">
+            <a:spAutoFit/>
+          </a:bodyPr>
+          <a:lstStyle/>
+          <a:p>
+            <a:pPr algn="ctr"/>
+            <a:r>
+              <a:rPr lang="en-US" sz="1600" dirty="0"/>
+              <a:t>Toggle</a:t>
+            </a:r>
+          </a:p>
+          <a:p>
+            <a:pPr algn="ctr"/>
+            <a:r>
+              <a:rPr lang="en-US" sz="1600" dirty="0"/>
+              <a:t>Setlist</a:t>
+            </a:r>
+          </a:p>
+          <a:p>
+            <a:pPr algn="ctr"/>
+            <a:r>
+              <a:rPr lang="en-US" sz="1600" dirty="0"/>
+              <a:t>Mode</a:t>
+            </a:r>
+          </a:p>
+        </p:txBody>
+      </p:sp>
+      <p:cxnSp>
+        <p:nvCxnSpPr>
+          <p:cNvPr id="24" name="Straight Arrow Connector 23">
+            <a:extLst>
+              <a:ext uri="{FF2B5EF4-FFF2-40B4-BE49-F238E27FC236}">
+                <a16:creationId xmlns:a16="http://schemas.microsoft.com/office/drawing/2014/main" id="{7E8082A9-4600-B06B-30DE-5C58C7779766}"/>
+              </a:ext>
+            </a:extLst>
+          </p:cNvPr>
+          <p:cNvCxnSpPr>
+            <a:cxnSpLocks/>
+            <a:stCxn id="23" idx="3"/>
+          </p:cNvCxnSpPr>
+          <p:nvPr/>
+        </p:nvCxnSpPr>
+        <p:spPr>
+          <a:xfrm>
+            <a:off x="1081202" y="5223295"/>
+            <a:ext cx="489940" cy="272678"/>
+          </a:xfrm>
+          <a:prstGeom prst="straightConnector1">
+            <a:avLst/>
+          </a:prstGeom>
+          <a:ln>
+            <a:tailEnd type="triangle"/>
+          </a:ln>
+        </p:spPr>
+        <p:style>
+          <a:lnRef idx="2">
+            <a:schemeClr val="accent4"/>
+          </a:lnRef>
+          <a:fillRef idx="0">
+            <a:schemeClr val="accent4"/>
+          </a:fillRef>
+          <a:effectRef idx="1">
+            <a:schemeClr val="accent4"/>
+          </a:effectRef>
+          <a:fontRef idx="minor">
+            <a:schemeClr val="tx1"/>
+          </a:fontRef>
+        </p:style>
+      </p:cxnSp>
     </p:spTree>
     <p:extLst>
       <p:ext uri="{BB962C8B-B14F-4D97-AF65-F5344CB8AC3E}">
-        <p14:creationId xmlns:p14="http://schemas.microsoft.com/office/powerpoint/2010/main" val="3146490023"/>
+        <p14:creationId xmlns:p14="http://schemas.microsoft.com/office/powerpoint/2010/main" val="3430763154"/>
+      </p:ext>
+    </p:extLst>
+  </p:cSld>
+  <p:clrMapOvr>
+    <a:masterClrMapping/>
+  </p:clrMapOvr>
+</p:sld>
+</file>
+
+<file path=ppt/slides/slide10.xml><?xml version="1.0" encoding="utf-8"?>
+<p:sld xmlns:a="http://schemas.openxmlformats.org/drawingml/2006/main" xmlns:r="http://schemas.openxmlformats.org/officeDocument/2006/relationships" xmlns:p="http://schemas.openxmlformats.org/presentationml/2006/main">
+  <p:cSld>
+    <p:spTree>
+      <p:nvGrpSpPr>
+        <p:cNvPr id="1" name=""/>
+        <p:cNvGrpSpPr/>
+        <p:nvPr/>
+      </p:nvGrpSpPr>
+      <p:grpSpPr>
+        <a:xfrm>
+          <a:off x="0" y="0"/>
+          <a:ext cx="0" cy="0"/>
+          <a:chOff x="0" y="0"/>
+          <a:chExt cx="0" cy="0"/>
+        </a:xfrm>
+      </p:grpSpPr>
+      <p:sp>
+        <p:nvSpPr>
+          <p:cNvPr id="4" name="TextBox 3"/>
+          <p:cNvSpPr txBox="1"/>
+          <p:nvPr/>
+        </p:nvSpPr>
+        <p:spPr>
+          <a:xfrm>
+            <a:off x="362992" y="369537"/>
+            <a:ext cx="8095208" cy="2739211"/>
+          </a:xfrm>
+          <a:prstGeom prst="rect">
+            <a:avLst/>
+          </a:prstGeom>
+          <a:noFill/>
+        </p:spPr>
+        <p:txBody>
+          <a:bodyPr wrap="square" rtlCol="0">
+            <a:spAutoFit/>
+          </a:bodyPr>
+          <a:lstStyle/>
+          <a:p>
+            <a:r>
+              <a:rPr lang="en-US" sz="1400" b="1" dirty="0"/>
+              <a:t>Additional Comments</a:t>
+            </a:r>
+          </a:p>
+          <a:p>
+            <a:endParaRPr lang="en-US" sz="1400" b="1" dirty="0"/>
+          </a:p>
+          <a:p>
+            <a:r>
+              <a:rPr lang="en-US" sz="1200" dirty="0"/>
+              <a:t>The only Transport buttons integrated into the extension are the Play and Stop buttons.  The others are not used.</a:t>
+            </a:r>
+          </a:p>
+          <a:p>
+            <a:endParaRPr lang="en-US" sz="1200" dirty="0"/>
+          </a:p>
+          <a:p>
+            <a:r>
+              <a:rPr lang="en-US" sz="1200" dirty="0"/>
+              <a:t>You can open the Script Logger window in GP and see some level of debugging detail that might help if you encounter odd behavior.  Probably not, though, because I try to keep it to a minimum in the released versions.</a:t>
+            </a:r>
+          </a:p>
+          <a:p>
+            <a:endParaRPr lang="en-US" sz="1200" dirty="0"/>
+          </a:p>
+          <a:p>
+            <a:r>
+              <a:rPr lang="en-US" sz="1200" dirty="0"/>
+              <a:t>Configuring the details of how things are displayed can take a lot of extra widgets.  I usually hide these in my </a:t>
+            </a:r>
+            <a:r>
+              <a:rPr lang="en-US" sz="1200" dirty="0" err="1"/>
+              <a:t>rackspaces</a:t>
+            </a:r>
+            <a:r>
+              <a:rPr lang="en-US" sz="1200" dirty="0"/>
+              <a:t>, which means they’re only visible in Edit mode.  I tend to put them near (or even right on top of) the widgets they’re associated with.</a:t>
+            </a:r>
+          </a:p>
+          <a:p>
+            <a:endParaRPr lang="en-US" sz="1200" dirty="0"/>
+          </a:p>
+          <a:p>
+            <a:r>
+              <a:rPr lang="en-US" sz="1200" dirty="0"/>
+              <a:t>At times I’ve considered storing the configuration data in a separate file rather than extra widgets.  I always conclude that this would make things less reliable, more confusing, more difficult for the user, and require more user effort to keep files in sync.</a:t>
+            </a:r>
+          </a:p>
+          <a:p>
+            <a:endParaRPr lang="en-US" sz="1200"/>
+          </a:p>
+          <a:p>
+            <a:endParaRPr lang="en-US" sz="1200" dirty="0"/>
+          </a:p>
+        </p:txBody>
+      </p:sp>
+    </p:spTree>
+    <p:extLst>
+      <p:ext uri="{BB962C8B-B14F-4D97-AF65-F5344CB8AC3E}">
+        <p14:creationId xmlns:p14="http://schemas.microsoft.com/office/powerpoint/2010/main" val="1060359456"/>
       </p:ext>
     </p:extLst>
   </p:cSld>
@@ -3336,7 +3921,7 @@
         <p:spPr>
           <a:xfrm>
             <a:off x="362992" y="369537"/>
-            <a:ext cx="8095208" cy="5909310"/>
+            <a:ext cx="8095208" cy="5724644"/>
           </a:xfrm>
           <a:prstGeom prst="rect">
             <a:avLst/>
@@ -3351,153 +3936,13 @@
           <a:p>
             <a:r>
               <a:rPr lang="en-US" sz="1400" b="1" dirty="0"/>
-              <a:t>Overview of the Novation SL-MK3 Extension</a:t>
-            </a:r>
-          </a:p>
-          <a:p>
-            <a:endParaRPr lang="en-US" sz="1200" dirty="0"/>
-          </a:p>
-          <a:p>
-            <a:r>
-              <a:rPr lang="en-US" sz="1200" dirty="0"/>
-              <a:t>This extension works with the SL-MK3 by taking control of the displays, buttons, and pads when “InControl” mode is enabled using the “InControl” button on the SL-MK3.</a:t>
-            </a:r>
-          </a:p>
-          <a:p>
-            <a:endParaRPr lang="en-US" sz="1200" b="1" dirty="0"/>
-          </a:p>
-          <a:p>
-            <a:endParaRPr lang="en-US" sz="1200" b="1" dirty="0"/>
-          </a:p>
-          <a:p>
-            <a:r>
-              <a:rPr lang="en-US" sz="1400" b="1" dirty="0"/>
-              <a:t>Control Organization</a:t>
-            </a:r>
-            <a:endParaRPr lang="en-US" sz="1200" dirty="0"/>
-          </a:p>
-          <a:p>
-            <a:endParaRPr lang="en-US" sz="1200" dirty="0"/>
-          </a:p>
-          <a:p>
-            <a:r>
-              <a:rPr lang="en-US" sz="1200" dirty="0"/>
-              <a:t>The SL-MK3 extension works with control surface items in groups by type:  knobs, buttons, pads, and faders.</a:t>
-            </a:r>
-          </a:p>
-          <a:p>
-            <a:endParaRPr lang="en-US" sz="1200" dirty="0"/>
-          </a:p>
-          <a:p>
-            <a:r>
-              <a:rPr lang="en-US" sz="1200" dirty="0"/>
-              <a:t>The extension is built around the concept of “banks” of each control group.  You can have multiple knob banks, pad banks, etc.</a:t>
-            </a:r>
-          </a:p>
-          <a:p>
-            <a:endParaRPr lang="en-US" sz="1200" dirty="0"/>
-          </a:p>
-          <a:p>
-            <a:r>
-              <a:rPr lang="en-US" sz="1200" dirty="0"/>
-              <a:t>Next to each row of controls there are up/down arrows, which the extension can utilize to “bank switch” through as many banks of such controls as you care to have in your </a:t>
-            </a:r>
-            <a:r>
-              <a:rPr lang="en-US" sz="1200" dirty="0" err="1"/>
-              <a:t>Rackspaces</a:t>
-            </a:r>
-            <a:r>
-              <a:rPr lang="en-US" sz="1200" dirty="0"/>
-              <a:t>.</a:t>
-            </a:r>
-          </a:p>
-          <a:p>
-            <a:endParaRPr lang="en-US" sz="1200" b="1" dirty="0"/>
-          </a:p>
-          <a:p>
-            <a:endParaRPr lang="en-US" sz="1200" b="1" dirty="0"/>
-          </a:p>
-          <a:p>
-            <a:r>
-              <a:rPr lang="en-US" sz="1400" b="1" dirty="0"/>
-              <a:t>Controlling </a:t>
-            </a:r>
-            <a:r>
-              <a:rPr lang="en-US" sz="1400" b="1" dirty="0" err="1"/>
-              <a:t>GigPerformer</a:t>
-            </a:r>
-            <a:r>
-              <a:rPr lang="en-US" sz="1400" b="1" dirty="0"/>
-              <a:t> with the SL-MK3 Extension</a:t>
-            </a:r>
-            <a:endParaRPr lang="en-US" sz="1200" dirty="0"/>
-          </a:p>
-          <a:p>
-            <a:endParaRPr lang="en-US" sz="1200" dirty="0"/>
-          </a:p>
-          <a:p>
-            <a:r>
-              <a:rPr lang="en-US" sz="1200" dirty="0"/>
-              <a:t>Configuration of how </a:t>
-            </a:r>
-            <a:r>
-              <a:rPr lang="en-US" sz="1200" dirty="0" err="1"/>
-              <a:t>GigPerformer</a:t>
-            </a:r>
-            <a:r>
-              <a:rPr lang="en-US" sz="1200" dirty="0"/>
-              <a:t> interacts with the SL-MK3 is done through widgets.</a:t>
-            </a:r>
-          </a:p>
-          <a:p>
-            <a:endParaRPr lang="en-US" sz="1200" dirty="0"/>
-          </a:p>
-          <a:p>
-            <a:r>
-              <a:rPr lang="en-US" sz="1200" dirty="0"/>
-              <a:t>On the “Advanced” tab of each </a:t>
-            </a:r>
-            <a:r>
-              <a:rPr lang="en-US" sz="1200" dirty="0" err="1"/>
-              <a:t>GigPerformer</a:t>
-            </a:r>
-            <a:r>
-              <a:rPr lang="en-US" sz="1200" dirty="0"/>
-              <a:t> widget there is a field called “OSC/</a:t>
-            </a:r>
-            <a:r>
-              <a:rPr lang="en-US" sz="1200" dirty="0" err="1"/>
-              <a:t>GPScript</a:t>
-            </a:r>
-            <a:r>
-              <a:rPr lang="en-US" sz="1200" dirty="0"/>
-              <a:t> Name”.  Any widget with a name that begins with “</a:t>
-            </a:r>
-            <a:r>
-              <a:rPr lang="en-US" sz="1200" dirty="0" err="1"/>
-              <a:t>sl</a:t>
-            </a:r>
-            <a:r>
-              <a:rPr lang="en-US" sz="1200" dirty="0"/>
-              <a:t>_” will be examined by the extension for information about how it should be utilized by the extension.</a:t>
-            </a:r>
-          </a:p>
-          <a:p>
-            <a:endParaRPr lang="en-US" sz="1200" dirty="0"/>
-          </a:p>
-          <a:p>
-            <a:r>
-              <a:rPr lang="en-US" sz="1200" dirty="0"/>
-              <a:t>Every button, pad, display section, and LED on the SL-MK3 can be programmed with RGB colors.  Because only so much information can be attached to a knob widget, for example, the extension will look for information on additional widgets to control how they are displayed on the SL-MK3.</a:t>
-            </a:r>
-          </a:p>
-          <a:p>
-            <a:endParaRPr lang="en-US" sz="1200" dirty="0"/>
-          </a:p>
-          <a:p>
-            <a:r>
-              <a:rPr lang="en-US" sz="1200" dirty="0"/>
-              <a:t>Widgets utilized by this extension fall into three broad categories:</a:t>
+              <a:t>Getting Started with the SL-MK3 Extension</a:t>
+            </a:r>
+          </a:p>
+          <a:p>
+            <a:r>
+              <a:rPr lang="en-US" sz="1200" dirty="0"/>
+              <a:t>Follow these simple steps to get started:</a:t>
             </a:r>
           </a:p>
           <a:p>
@@ -3507,8 +3952,27 @@
             </a:pPr>
             <a:r>
               <a:rPr lang="en-US" sz="1200" dirty="0"/>
-              <a:t>Control Widgets – knobs, button, etc. widgets typically linked to plugin parameters or system functions</a:t>
-            </a:r>
+              <a:t>Download the zip file for your platform (Mac or Windows) from </a:t>
+            </a:r>
+            <a:r>
+              <a:rPr lang="en-US" sz="1200" dirty="0">
+                <a:hlinkClick r:id="rId2"/>
+              </a:rPr>
+              <a:t>Releases · </a:t>
+            </a:r>
+            <a:r>
+              <a:rPr lang="en-US" sz="1200" dirty="0" err="1">
+                <a:hlinkClick r:id="rId2"/>
+              </a:rPr>
+              <a:t>WidnerM</a:t>
+            </a:r>
+            <a:r>
+              <a:rPr lang="en-US" sz="1200" dirty="0">
+                <a:hlinkClick r:id="rId2"/>
+              </a:rPr>
+              <a:t>/GP-SL-MK3 (github.com)</a:t>
+            </a:r>
+            <a:endParaRPr lang="en-US" sz="1200" dirty="0"/>
           </a:p>
           <a:p>
             <a:pPr marL="628650" lvl="1" indent="-171450">
@@ -3517,7 +3981,51 @@
             </a:pPr>
             <a:r>
               <a:rPr lang="en-US" sz="1200" dirty="0"/>
-              <a:t>Parameter Widgets – used primarily to determine how Control Widgets are displayed on the SL-MK3 (e.g., colors)</a:t>
+              <a:t>From the zip file install the extension (.</a:t>
+            </a:r>
+            <a:r>
+              <a:rPr lang="en-US" sz="1200" dirty="0" err="1"/>
+              <a:t>dylib</a:t>
+            </a:r>
+            <a:r>
+              <a:rPr lang="en-US" sz="1200" dirty="0"/>
+              <a:t> for Mac, .</a:t>
+            </a:r>
+            <a:r>
+              <a:rPr lang="en-US" sz="1200" dirty="0" err="1"/>
+              <a:t>dll</a:t>
+            </a:r>
+            <a:r>
+              <a:rPr lang="en-US" sz="1200" dirty="0"/>
+              <a:t> for Windows) to the appropriate </a:t>
+            </a:r>
+            <a:r>
+              <a:rPr lang="en-US" sz="1200" dirty="0" err="1"/>
+              <a:t>GigPerformer</a:t>
+            </a:r>
+            <a:r>
+              <a:rPr lang="en-US" sz="1200" dirty="0"/>
+              <a:t> folder</a:t>
+            </a:r>
+          </a:p>
+          <a:p>
+            <a:pPr marL="1085850" lvl="2" indent="-171450">
+              <a:buFont typeface="Arial" panose="020B0604020202020204" pitchFamily="34" charset="0"/>
+              <a:buChar char="•"/>
+            </a:pPr>
+            <a:r>
+              <a:rPr lang="en-US" sz="1200" dirty="0"/>
+              <a:t>/Users/Shared/Gig Performer/Extensions on Mac</a:t>
+            </a:r>
+          </a:p>
+          <a:p>
+            <a:pPr marL="1085850" lvl="2" indent="-171450">
+              <a:buFont typeface="Arial" panose="020B0604020202020204" pitchFamily="34" charset="0"/>
+              <a:buChar char="•"/>
+            </a:pPr>
+            <a:r>
+              <a:rPr lang="en-US" sz="1200" dirty="0"/>
+              <a:t>C:/Users/Public/Documents/Gig Performer/Extensions on Windows</a:t>
             </a:r>
           </a:p>
           <a:p>
@@ -3527,7 +4035,197 @@
             </a:pPr>
             <a:r>
               <a:rPr lang="en-US" sz="1200" dirty="0"/>
-              <a:t>Indicator Widgets – provide feedback in GP showing which banks of Control Widgets the SL-MK3 is actively controlling</a:t>
+              <a:t>Load the Demo </a:t>
+            </a:r>
+            <a:r>
+              <a:rPr lang="en-US" sz="1200" dirty="0" err="1"/>
+              <a:t>gigfile</a:t>
+            </a:r>
+            <a:r>
+              <a:rPr lang="en-US" sz="1200" dirty="0"/>
+              <a:t> from the zip file in </a:t>
+            </a:r>
+            <a:r>
+              <a:rPr lang="en-US" sz="1200" dirty="0" err="1"/>
+              <a:t>GigPerformer</a:t>
+            </a:r>
+            <a:endParaRPr lang="en-US" sz="1200" dirty="0"/>
+          </a:p>
+          <a:p>
+            <a:pPr marL="628650" lvl="1" indent="-171450">
+              <a:buFont typeface="Arial" panose="020B0604020202020204" pitchFamily="34" charset="0"/>
+              <a:buChar char="•"/>
+            </a:pPr>
+            <a:r>
+              <a:rPr lang="en-US" sz="1200" dirty="0"/>
+              <a:t>Make sure your controller is in InControl mode by pressing the InControl button</a:t>
+            </a:r>
+          </a:p>
+          <a:p>
+            <a:pPr marL="628650" lvl="1" indent="-171450">
+              <a:buFont typeface="Arial" panose="020B0604020202020204" pitchFamily="34" charset="0"/>
+              <a:buChar char="•"/>
+            </a:pPr>
+            <a:r>
+              <a:rPr lang="en-US" sz="1200" dirty="0"/>
+              <a:t>You may need to exit and restart </a:t>
+            </a:r>
+            <a:r>
+              <a:rPr lang="en-US" sz="1200" dirty="0" err="1"/>
+              <a:t>GigPerformer</a:t>
+            </a:r>
+            <a:r>
+              <a:rPr lang="en-US" sz="1200" dirty="0"/>
+              <a:t> after the first time you enable the extension</a:t>
+            </a:r>
+          </a:p>
+          <a:p>
+            <a:endParaRPr lang="en-US" sz="1200" dirty="0"/>
+          </a:p>
+          <a:p>
+            <a:r>
+              <a:rPr lang="en-US" sz="1400" b="1" dirty="0"/>
+              <a:t>Setting the MIDI Ports</a:t>
+            </a:r>
+          </a:p>
+          <a:p>
+            <a:endParaRPr lang="en-US" sz="1200" dirty="0"/>
+          </a:p>
+          <a:p>
+            <a:r>
+              <a:rPr lang="en-US" sz="1200" dirty="0"/>
+              <a:t>The extension should automatically find your controller’s MIDI ports using their default names. If it does not, you can tell the extension which MIDI ports to use by creating two text widgets in the global </a:t>
+            </a:r>
+            <a:r>
+              <a:rPr lang="en-US" sz="1200" dirty="0" err="1"/>
+              <a:t>rackspace</a:t>
+            </a:r>
+            <a:r>
+              <a:rPr lang="en-US" sz="1200" dirty="0"/>
+              <a:t> and setting them appropriately</a:t>
+            </a:r>
+            <a:r>
+              <a:rPr lang="sv-SE" sz="1200" dirty="0"/>
+              <a:t>.</a:t>
+            </a:r>
+          </a:p>
+          <a:p>
+            <a:endParaRPr lang="sv-SE" sz="1200" dirty="0"/>
+          </a:p>
+          <a:p>
+            <a:r>
+              <a:rPr lang="en-US" sz="1200" dirty="0"/>
+              <a:t>These widgets must be named “</a:t>
+            </a:r>
+            <a:r>
+              <a:rPr lang="en-US" sz="1200" dirty="0" err="1"/>
+              <a:t>sl_midiin</a:t>
+            </a:r>
+            <a:r>
+              <a:rPr lang="en-US" sz="1200" dirty="0"/>
+              <a:t>” and “</a:t>
+            </a:r>
+            <a:r>
+              <a:rPr lang="en-US" sz="1200" dirty="0" err="1"/>
+              <a:t>sl_midiout</a:t>
+            </a:r>
+            <a:r>
+              <a:rPr lang="en-US" sz="1200" dirty="0"/>
+              <a:t>” (using the Advanced tab in the “OSC/</a:t>
+            </a:r>
+            <a:r>
+              <a:rPr lang="en-US" sz="1200" dirty="0" err="1"/>
+              <a:t>GPScript</a:t>
+            </a:r>
+            <a:r>
+              <a:rPr lang="en-US" sz="1200" dirty="0"/>
+              <a:t> Name” field).</a:t>
+            </a:r>
+          </a:p>
+          <a:p>
+            <a:r>
+              <a:rPr lang="en-US" sz="1200" dirty="0"/>
+              <a:t>Set the Caption for these widgets (on the General tab) to the MIDI port names exactly as they appear in the GP MIDI ports list.</a:t>
+            </a:r>
+          </a:p>
+          <a:p>
+            <a:endParaRPr lang="en-US" sz="1200" dirty="0"/>
+          </a:p>
+          <a:p>
+            <a:endParaRPr lang="sv-SE" sz="1200" dirty="0"/>
+          </a:p>
+          <a:p>
+            <a:r>
+              <a:rPr lang="en-US" sz="1400" b="1" dirty="0"/>
+              <a:t>Basic Operations and Troubleshooting</a:t>
+            </a:r>
+          </a:p>
+          <a:p>
+            <a:endParaRPr lang="sv-SE" sz="1200" dirty="0"/>
+          </a:p>
+          <a:p>
+            <a:r>
+              <a:rPr lang="en-US" sz="1200" dirty="0"/>
+              <a:t>Without any widgets configured you should see your </a:t>
+            </a:r>
+            <a:r>
+              <a:rPr lang="en-US" sz="1200" dirty="0" err="1"/>
+              <a:t>Rackspaces</a:t>
+            </a:r>
+            <a:r>
+              <a:rPr lang="en-US" sz="1200" dirty="0"/>
+              <a:t> / Variations / Songs / </a:t>
+            </a:r>
+            <a:r>
+              <a:rPr lang="en-US" sz="1200" dirty="0" err="1"/>
+              <a:t>Songparts</a:t>
+            </a:r>
+            <a:r>
+              <a:rPr lang="en-US" sz="1200" dirty="0"/>
+              <a:t> listed on the bottom row of the display.</a:t>
+            </a:r>
+            <a:r>
+              <a:rPr lang="sv-SE" sz="1200" dirty="0"/>
+              <a:t>  You can switch between them using the Grid and Clear keys and cycle through using the arrows toward the lower left of the keyboard.</a:t>
+            </a:r>
+          </a:p>
+          <a:p>
+            <a:endParaRPr lang="sv-SE" sz="1200" dirty="0"/>
+          </a:p>
+          <a:p>
+            <a:r>
+              <a:rPr lang="sv-SE" sz="1200" dirty="0"/>
+              <a:t>The naming conventions for other widgets is the main subject of the remainder of this document.</a:t>
+            </a:r>
+            <a:endParaRPr lang="en-US" sz="1200" dirty="0"/>
+          </a:p>
+          <a:p>
+            <a:endParaRPr lang="sv-SE" sz="1200" dirty="0"/>
+          </a:p>
+          <a:p>
+            <a:r>
+              <a:rPr lang="en-US" sz="1200" b="1" i="1" dirty="0"/>
+              <a:t>To sync your Rackspace with the SL-MK3 after adding new control widgets you should change </a:t>
+            </a:r>
+            <a:r>
+              <a:rPr lang="en-US" sz="1200" b="1" i="1" dirty="0" err="1"/>
+              <a:t>Rackspaces</a:t>
+            </a:r>
+            <a:r>
+              <a:rPr lang="en-US" sz="1200" b="1" i="1" dirty="0"/>
+              <a:t>, then come back</a:t>
+            </a:r>
+            <a:r>
+              <a:rPr lang="en-US" sz="1200" dirty="0"/>
+              <a:t>.  This is necessary because the extension scans widget names upon Rackspace entry.  It doesn’t know you renamed widgets until you change </a:t>
+            </a:r>
+            <a:r>
+              <a:rPr lang="en-US" sz="1200" dirty="0" err="1"/>
+              <a:t>Rackspaces</a:t>
+            </a:r>
+            <a:r>
+              <a:rPr lang="en-US" sz="1200" dirty="0"/>
+              <a:t> and return.</a:t>
             </a:r>
           </a:p>
         </p:txBody>
@@ -3535,7 +4233,7 @@
     </p:spTree>
     <p:extLst>
       <p:ext uri="{BB962C8B-B14F-4D97-AF65-F5344CB8AC3E}">
-        <p14:creationId xmlns:p14="http://schemas.microsoft.com/office/powerpoint/2010/main" val="3430763154"/>
+        <p14:creationId xmlns:p14="http://schemas.microsoft.com/office/powerpoint/2010/main" val="3146490023"/>
       </p:ext>
     </p:extLst>
   </p:cSld>
@@ -3546,6 +4244,484 @@
 </file>
 
 <file path=ppt/slides/slide3.xml><?xml version="1.0" encoding="utf-8"?>
+<p:sld xmlns:a="http://schemas.openxmlformats.org/drawingml/2006/main" xmlns:r="http://schemas.openxmlformats.org/officeDocument/2006/relationships" xmlns:p="http://schemas.openxmlformats.org/presentationml/2006/main">
+  <p:cSld>
+    <p:spTree>
+      <p:nvGrpSpPr>
+        <p:cNvPr id="1" name=""/>
+        <p:cNvGrpSpPr/>
+        <p:nvPr/>
+      </p:nvGrpSpPr>
+      <p:grpSpPr>
+        <a:xfrm>
+          <a:off x="0" y="0"/>
+          <a:ext cx="0" cy="0"/>
+          <a:chOff x="0" y="0"/>
+          <a:chExt cx="0" cy="0"/>
+        </a:xfrm>
+      </p:grpSpPr>
+      <p:sp>
+        <p:nvSpPr>
+          <p:cNvPr id="19" name="Rectangle 18">
+            <a:extLst>
+              <a:ext uri="{FF2B5EF4-FFF2-40B4-BE49-F238E27FC236}">
+                <a16:creationId xmlns:a16="http://schemas.microsoft.com/office/drawing/2014/main" id="{EFFACD90-A52C-FF43-A9E1-53AE5469F120}"/>
+              </a:ext>
+            </a:extLst>
+          </p:cNvPr>
+          <p:cNvSpPr/>
+          <p:nvPr/>
+        </p:nvSpPr>
+        <p:spPr>
+          <a:xfrm>
+            <a:off x="252760" y="4989239"/>
+            <a:ext cx="8722546" cy="1790702"/>
+          </a:xfrm>
+          <a:prstGeom prst="rect">
+            <a:avLst/>
+          </a:prstGeom>
+        </p:spPr>
+        <p:style>
+          <a:lnRef idx="2">
+            <a:schemeClr val="accent3">
+              <a:shade val="15000"/>
+            </a:schemeClr>
+          </a:lnRef>
+          <a:fillRef idx="1">
+            <a:schemeClr val="accent3"/>
+          </a:fillRef>
+          <a:effectRef idx="0">
+            <a:schemeClr val="accent3"/>
+          </a:effectRef>
+          <a:fontRef idx="minor">
+            <a:schemeClr val="lt1"/>
+          </a:fontRef>
+        </p:style>
+        <p:txBody>
+          <a:bodyPr rtlCol="0" anchor="ctr"/>
+          <a:lstStyle/>
+          <a:p>
+            <a:pPr algn="ctr"/>
+            <a:endParaRPr lang="en-US"/>
+          </a:p>
+        </p:txBody>
+      </p:sp>
+      <p:sp>
+        <p:nvSpPr>
+          <p:cNvPr id="17" name="Rectangle 16">
+            <a:extLst>
+              <a:ext uri="{FF2B5EF4-FFF2-40B4-BE49-F238E27FC236}">
+                <a16:creationId xmlns:a16="http://schemas.microsoft.com/office/drawing/2014/main" id="{F99CDF13-55B7-EF0E-BBE0-84914C5A5A4B}"/>
+              </a:ext>
+            </a:extLst>
+          </p:cNvPr>
+          <p:cNvSpPr/>
+          <p:nvPr/>
+        </p:nvSpPr>
+        <p:spPr>
+          <a:xfrm>
+            <a:off x="252760" y="3531216"/>
+            <a:ext cx="8722546" cy="1338147"/>
+          </a:xfrm>
+          <a:prstGeom prst="rect">
+            <a:avLst/>
+          </a:prstGeom>
+        </p:spPr>
+        <p:style>
+          <a:lnRef idx="2">
+            <a:schemeClr val="accent3">
+              <a:shade val="15000"/>
+            </a:schemeClr>
+          </a:lnRef>
+          <a:fillRef idx="1">
+            <a:schemeClr val="accent3"/>
+          </a:fillRef>
+          <a:effectRef idx="0">
+            <a:schemeClr val="accent3"/>
+          </a:effectRef>
+          <a:fontRef idx="minor">
+            <a:schemeClr val="lt1"/>
+          </a:fontRef>
+        </p:style>
+        <p:txBody>
+          <a:bodyPr rtlCol="0" anchor="ctr"/>
+          <a:lstStyle/>
+          <a:p>
+            <a:pPr algn="ctr"/>
+            <a:endParaRPr lang="en-US"/>
+          </a:p>
+        </p:txBody>
+      </p:sp>
+      <p:sp>
+        <p:nvSpPr>
+          <p:cNvPr id="4" name="TextBox 3"/>
+          <p:cNvSpPr txBox="1"/>
+          <p:nvPr/>
+        </p:nvSpPr>
+        <p:spPr>
+          <a:xfrm>
+            <a:off x="362992" y="369537"/>
+            <a:ext cx="8095208" cy="2893100"/>
+          </a:xfrm>
+          <a:prstGeom prst="rect">
+            <a:avLst/>
+          </a:prstGeom>
+          <a:noFill/>
+        </p:spPr>
+        <p:txBody>
+          <a:bodyPr wrap="square" rtlCol="0">
+            <a:spAutoFit/>
+          </a:bodyPr>
+          <a:lstStyle/>
+          <a:p>
+            <a:r>
+              <a:rPr lang="en-US" sz="1400" b="1" dirty="0"/>
+              <a:t>Controlling </a:t>
+            </a:r>
+            <a:r>
+              <a:rPr lang="en-US" sz="1400" b="1" dirty="0" err="1"/>
+              <a:t>GigPerformer</a:t>
+            </a:r>
+            <a:r>
+              <a:rPr lang="en-US" sz="1400" b="1" dirty="0"/>
+              <a:t> with the SL-MK3 Extension</a:t>
+            </a:r>
+            <a:endParaRPr lang="en-US" sz="1200" dirty="0"/>
+          </a:p>
+          <a:p>
+            <a:endParaRPr lang="en-US" sz="1200" dirty="0"/>
+          </a:p>
+          <a:p>
+            <a:r>
+              <a:rPr lang="en-US" sz="1200" dirty="0"/>
+              <a:t>Configuration of how the SL-MK3 interacts with </a:t>
+            </a:r>
+            <a:r>
+              <a:rPr lang="en-US" sz="1200" dirty="0" err="1"/>
+              <a:t>GigPerformer</a:t>
+            </a:r>
+            <a:r>
+              <a:rPr lang="en-US" sz="1200" dirty="0"/>
+              <a:t> is done through widgets.</a:t>
+            </a:r>
+          </a:p>
+          <a:p>
+            <a:endParaRPr lang="en-US" sz="1200" dirty="0"/>
+          </a:p>
+          <a:p>
+            <a:r>
+              <a:rPr lang="en-US" sz="1200" dirty="0"/>
+              <a:t>On the “Advanced” tab of each </a:t>
+            </a:r>
+            <a:r>
+              <a:rPr lang="en-US" sz="1200" dirty="0" err="1"/>
+              <a:t>GigPerformer</a:t>
+            </a:r>
+            <a:r>
+              <a:rPr lang="en-US" sz="1200" dirty="0"/>
+              <a:t> widget there is a field called “OSC/</a:t>
+            </a:r>
+            <a:r>
+              <a:rPr lang="en-US" sz="1200" dirty="0" err="1"/>
+              <a:t>GPScript</a:t>
+            </a:r>
+            <a:r>
+              <a:rPr lang="en-US" sz="1200" dirty="0"/>
+              <a:t> Name”.  Any widget with a name that begins with “</a:t>
+            </a:r>
+            <a:r>
+              <a:rPr lang="en-US" sz="1200" dirty="0" err="1"/>
+              <a:t>sl</a:t>
+            </a:r>
+            <a:r>
+              <a:rPr lang="en-US" sz="1200" dirty="0"/>
+              <a:t>_” will be examined by the extension for information about how it should be utilized by the extension.</a:t>
+            </a:r>
+          </a:p>
+          <a:p>
+            <a:endParaRPr lang="en-US" sz="1200" dirty="0"/>
+          </a:p>
+          <a:p>
+            <a:r>
+              <a:rPr lang="en-US" sz="1200" dirty="0"/>
+              <a:t>Every button, pad, display section, and LED on the SL-MK3 can be programmed with RGB colors.  Because only so much information can be attached to a knob widget, for example, the extension will also look for information on “parameter widgets” to control how they are displayed on the SL-MK3.</a:t>
+            </a:r>
+          </a:p>
+          <a:p>
+            <a:endParaRPr lang="en-US" sz="1200" dirty="0"/>
+          </a:p>
+          <a:p>
+            <a:r>
+              <a:rPr lang="en-US" sz="1200" dirty="0"/>
+              <a:t>Widgets utilized by this extension fall into three broad categories:</a:t>
+            </a:r>
+          </a:p>
+          <a:p>
+            <a:pPr marL="628650" lvl="1" indent="-171450">
+              <a:buFont typeface="Arial" panose="020B0604020202020204" pitchFamily="34" charset="0"/>
+              <a:buChar char="•"/>
+            </a:pPr>
+            <a:r>
+              <a:rPr lang="en-US" sz="1200" dirty="0"/>
+              <a:t>Control Widgets – knobs, button, etc. widgets typically linked to plugin parameters or system functions</a:t>
+            </a:r>
+          </a:p>
+          <a:p>
+            <a:pPr marL="628650" lvl="1" indent="-171450">
+              <a:buFont typeface="Arial" panose="020B0604020202020204" pitchFamily="34" charset="0"/>
+              <a:buChar char="•"/>
+            </a:pPr>
+            <a:r>
+              <a:rPr lang="en-US" sz="1200" dirty="0"/>
+              <a:t>Parameter Widgets – used primarily to determine how Control Widgets are displayed on the SL-MK3 (e.g., colors)</a:t>
+            </a:r>
+          </a:p>
+          <a:p>
+            <a:pPr marL="628650" lvl="1" indent="-171450">
+              <a:buFont typeface="Arial" panose="020B0604020202020204" pitchFamily="34" charset="0"/>
+              <a:buChar char="•"/>
+            </a:pPr>
+            <a:r>
+              <a:rPr lang="en-US" sz="1200" dirty="0"/>
+              <a:t>Indicator Widgets – provide feedback in GP showing which banks of Control Widgets the SL-MK3 is actively controlling</a:t>
+            </a:r>
+          </a:p>
+        </p:txBody>
+      </p:sp>
+      <p:pic>
+        <p:nvPicPr>
+          <p:cNvPr id="8" name="Picture 7">
+            <a:extLst>
+              <a:ext uri="{FF2B5EF4-FFF2-40B4-BE49-F238E27FC236}">
+                <a16:creationId xmlns:a16="http://schemas.microsoft.com/office/drawing/2014/main" id="{3D6CC676-28C2-9345-1696-66BBBEC8C970}"/>
+              </a:ext>
+            </a:extLst>
+          </p:cNvPr>
+          <p:cNvPicPr>
+            <a:picLocks noChangeAspect="1"/>
+          </p:cNvPicPr>
+          <p:nvPr/>
+        </p:nvPicPr>
+        <p:blipFill>
+          <a:blip r:embed="rId2"/>
+          <a:stretch>
+            <a:fillRect/>
+          </a:stretch>
+        </p:blipFill>
+        <p:spPr>
+          <a:xfrm>
+            <a:off x="1165034" y="3609352"/>
+            <a:ext cx="7726206" cy="1173904"/>
+          </a:xfrm>
+          <a:prstGeom prst="rect">
+            <a:avLst/>
+          </a:prstGeom>
+        </p:spPr>
+      </p:pic>
+      <p:pic>
+        <p:nvPicPr>
+          <p:cNvPr id="10" name="Picture 9">
+            <a:extLst>
+              <a:ext uri="{FF2B5EF4-FFF2-40B4-BE49-F238E27FC236}">
+                <a16:creationId xmlns:a16="http://schemas.microsoft.com/office/drawing/2014/main" id="{0625A947-5EFD-0356-71EC-6C6B6B5ACA90}"/>
+              </a:ext>
+            </a:extLst>
+          </p:cNvPr>
+          <p:cNvPicPr>
+            <a:picLocks noChangeAspect="1"/>
+          </p:cNvPicPr>
+          <p:nvPr/>
+        </p:nvPicPr>
+        <p:blipFill>
+          <a:blip r:embed="rId3"/>
+          <a:stretch>
+            <a:fillRect/>
+          </a:stretch>
+        </p:blipFill>
+        <p:spPr>
+          <a:xfrm>
+            <a:off x="457080" y="3745309"/>
+            <a:ext cx="617273" cy="853514"/>
+          </a:xfrm>
+          <a:prstGeom prst="rect">
+            <a:avLst/>
+          </a:prstGeom>
+        </p:spPr>
+      </p:pic>
+      <p:pic>
+        <p:nvPicPr>
+          <p:cNvPr id="12" name="Picture 11">
+            <a:extLst>
+              <a:ext uri="{FF2B5EF4-FFF2-40B4-BE49-F238E27FC236}">
+                <a16:creationId xmlns:a16="http://schemas.microsoft.com/office/drawing/2014/main" id="{5C131AF0-0507-7E9C-F7D1-B49C4209B33B}"/>
+              </a:ext>
+            </a:extLst>
+          </p:cNvPr>
+          <p:cNvPicPr>
+            <a:picLocks noChangeAspect="1"/>
+          </p:cNvPicPr>
+          <p:nvPr/>
+        </p:nvPicPr>
+        <p:blipFill>
+          <a:blip r:embed="rId4"/>
+          <a:stretch>
+            <a:fillRect/>
+          </a:stretch>
+        </p:blipFill>
+        <p:spPr>
+          <a:xfrm>
+            <a:off x="836882" y="5758184"/>
+            <a:ext cx="3367475" cy="976368"/>
+          </a:xfrm>
+          <a:prstGeom prst="rect">
+            <a:avLst/>
+          </a:prstGeom>
+        </p:spPr>
+      </p:pic>
+      <p:pic>
+        <p:nvPicPr>
+          <p:cNvPr id="14" name="Picture 13">
+            <a:extLst>
+              <a:ext uri="{FF2B5EF4-FFF2-40B4-BE49-F238E27FC236}">
+                <a16:creationId xmlns:a16="http://schemas.microsoft.com/office/drawing/2014/main" id="{1A43D917-B565-7482-5FF0-6146A3B7781E}"/>
+              </a:ext>
+            </a:extLst>
+          </p:cNvPr>
+          <p:cNvPicPr>
+            <a:picLocks noChangeAspect="1"/>
+          </p:cNvPicPr>
+          <p:nvPr/>
+        </p:nvPicPr>
+        <p:blipFill>
+          <a:blip r:embed="rId5"/>
+          <a:stretch>
+            <a:fillRect/>
+          </a:stretch>
+        </p:blipFill>
+        <p:spPr>
+          <a:xfrm>
+            <a:off x="4753436" y="5033959"/>
+            <a:ext cx="4137804" cy="1711281"/>
+          </a:xfrm>
+          <a:prstGeom prst="rect">
+            <a:avLst/>
+          </a:prstGeom>
+        </p:spPr>
+      </p:pic>
+      <p:pic>
+        <p:nvPicPr>
+          <p:cNvPr id="16" name="Picture 15">
+            <a:extLst>
+              <a:ext uri="{FF2B5EF4-FFF2-40B4-BE49-F238E27FC236}">
+                <a16:creationId xmlns:a16="http://schemas.microsoft.com/office/drawing/2014/main" id="{0740D438-C802-AADB-5979-8D6772794E96}"/>
+              </a:ext>
+            </a:extLst>
+          </p:cNvPr>
+          <p:cNvPicPr>
+            <a:picLocks noChangeAspect="1"/>
+          </p:cNvPicPr>
+          <p:nvPr/>
+        </p:nvPicPr>
+        <p:blipFill>
+          <a:blip r:embed="rId6"/>
+          <a:stretch>
+            <a:fillRect/>
+          </a:stretch>
+        </p:blipFill>
+        <p:spPr>
+          <a:xfrm>
+            <a:off x="1888177" y="5272562"/>
+            <a:ext cx="1163003" cy="440233"/>
+          </a:xfrm>
+          <a:prstGeom prst="rect">
+            <a:avLst/>
+          </a:prstGeom>
+        </p:spPr>
+      </p:pic>
+      <p:sp>
+        <p:nvSpPr>
+          <p:cNvPr id="18" name="TextBox 17">
+            <a:extLst>
+              <a:ext uri="{FF2B5EF4-FFF2-40B4-BE49-F238E27FC236}">
+                <a16:creationId xmlns:a16="http://schemas.microsoft.com/office/drawing/2014/main" id="{095F049A-0143-A03A-5D15-E8ACEBECE967}"/>
+              </a:ext>
+            </a:extLst>
+          </p:cNvPr>
+          <p:cNvSpPr txBox="1"/>
+          <p:nvPr/>
+        </p:nvSpPr>
+        <p:spPr>
+          <a:xfrm>
+            <a:off x="168694" y="3290500"/>
+            <a:ext cx="1694823" cy="276999"/>
+          </a:xfrm>
+          <a:prstGeom prst="rect">
+            <a:avLst/>
+          </a:prstGeom>
+          <a:noFill/>
+        </p:spPr>
+        <p:txBody>
+          <a:bodyPr wrap="none" rtlCol="0">
+            <a:spAutoFit/>
+          </a:bodyPr>
+          <a:lstStyle/>
+          <a:p>
+            <a:r>
+              <a:rPr lang="en-US" sz="1200" i="1" dirty="0"/>
+              <a:t>Control Widget example</a:t>
+            </a:r>
+          </a:p>
+        </p:txBody>
+      </p:sp>
+      <p:sp>
+        <p:nvSpPr>
+          <p:cNvPr id="20" name="TextBox 19">
+            <a:extLst>
+              <a:ext uri="{FF2B5EF4-FFF2-40B4-BE49-F238E27FC236}">
+                <a16:creationId xmlns:a16="http://schemas.microsoft.com/office/drawing/2014/main" id="{B73220C9-D0BA-CB85-1C7A-BD78F808FBBA}"/>
+              </a:ext>
+            </a:extLst>
+          </p:cNvPr>
+          <p:cNvSpPr txBox="1"/>
+          <p:nvPr/>
+        </p:nvSpPr>
+        <p:spPr>
+          <a:xfrm>
+            <a:off x="235505" y="4959780"/>
+            <a:ext cx="3679982" cy="276999"/>
+          </a:xfrm>
+          <a:prstGeom prst="rect">
+            <a:avLst/>
+          </a:prstGeom>
+          <a:noFill/>
+        </p:spPr>
+        <p:txBody>
+          <a:bodyPr wrap="none" rtlCol="0">
+            <a:spAutoFit/>
+          </a:bodyPr>
+          <a:lstStyle/>
+          <a:p>
+            <a:r>
+              <a:rPr lang="en-US" sz="1200" i="1" dirty="0"/>
+              <a:t>Parameter Widget associated with above control widget</a:t>
+            </a:r>
+          </a:p>
+        </p:txBody>
+      </p:sp>
+    </p:spTree>
+    <p:extLst>
+      <p:ext uri="{BB962C8B-B14F-4D97-AF65-F5344CB8AC3E}">
+        <p14:creationId xmlns:p14="http://schemas.microsoft.com/office/powerpoint/2010/main" val="3424802175"/>
+      </p:ext>
+    </p:extLst>
+  </p:cSld>
+  <p:clrMapOvr>
+    <a:masterClrMapping/>
+  </p:clrMapOvr>
+</p:sld>
+</file>
+
+<file path=ppt/slides/slide4.xml><?xml version="1.0" encoding="utf-8"?>
 <p:sld xmlns:a="http://schemas.openxmlformats.org/drawingml/2006/main" xmlns:r="http://schemas.openxmlformats.org/officeDocument/2006/relationships" xmlns:p="http://schemas.openxmlformats.org/presentationml/2006/main">
   <p:cSld>
     <p:spTree>
@@ -4250,283 +5426,6 @@
 </p:sld>
 </file>
 
-<file path=ppt/slides/slide4.xml><?xml version="1.0" encoding="utf-8"?>
-<p:sld xmlns:a="http://schemas.openxmlformats.org/drawingml/2006/main" xmlns:r="http://schemas.openxmlformats.org/officeDocument/2006/relationships" xmlns:p="http://schemas.openxmlformats.org/presentationml/2006/main">
-  <p:cSld>
-    <p:spTree>
-      <p:nvGrpSpPr>
-        <p:cNvPr id="1" name=""/>
-        <p:cNvGrpSpPr/>
-        <p:nvPr/>
-      </p:nvGrpSpPr>
-      <p:grpSpPr>
-        <a:xfrm>
-          <a:off x="0" y="0"/>
-          <a:ext cx="0" cy="0"/>
-          <a:chOff x="0" y="0"/>
-          <a:chExt cx="0" cy="0"/>
-        </a:xfrm>
-      </p:grpSpPr>
-      <p:sp>
-        <p:nvSpPr>
-          <p:cNvPr id="4" name="TextBox 3"/>
-          <p:cNvSpPr txBox="1"/>
-          <p:nvPr/>
-        </p:nvSpPr>
-        <p:spPr>
-          <a:xfrm>
-            <a:off x="362992" y="369537"/>
-            <a:ext cx="8095208" cy="6617196"/>
-          </a:xfrm>
-          <a:prstGeom prst="rect">
-            <a:avLst/>
-          </a:prstGeom>
-          <a:noFill/>
-        </p:spPr>
-        <p:txBody>
-          <a:bodyPr wrap="square" rtlCol="0">
-            <a:spAutoFit/>
-          </a:bodyPr>
-          <a:lstStyle/>
-          <a:p>
-            <a:r>
-              <a:rPr lang="en-US" sz="1400" b="1" dirty="0"/>
-              <a:t>Parameter Widgets</a:t>
-            </a:r>
-          </a:p>
-          <a:p>
-            <a:endParaRPr lang="en-US" sz="1400" b="1" dirty="0"/>
-          </a:p>
-          <a:p>
-            <a:r>
-              <a:rPr lang="en-US" sz="1200" dirty="0"/>
-              <a:t>“Parameter Widgets” can be used to specify how “Control Widgets” appear on the SL-MK3.  Parameter Widgets are not strictly necessary, but without them everything will appear using default colors and labels on the SL-MK3.</a:t>
-            </a:r>
-          </a:p>
-          <a:p>
-            <a:endParaRPr lang="en-US" sz="1200" dirty="0"/>
-          </a:p>
-          <a:p>
-            <a:r>
-              <a:rPr lang="en-US" sz="1200" dirty="0"/>
-              <a:t>Parameter Widgets associated with buttons and pads control the RGB “on” and “off” colors on the SL-MK3.  Parameter Widgets for knobs control the knob color, the bar color above the knob, and optionally the resolution of the knobs.</a:t>
-            </a:r>
-          </a:p>
-          <a:p>
-            <a:endParaRPr lang="en-US" sz="1200" dirty="0"/>
-          </a:p>
-          <a:p>
-            <a:r>
-              <a:rPr lang="en-US" sz="1200" dirty="0"/>
-              <a:t>Parameter Widgets can be created at the bank level (for controlling colors of the entire bank) or at the individual widget level.</a:t>
-            </a:r>
-          </a:p>
-          <a:p>
-            <a:endParaRPr lang="en-US" sz="1200" dirty="0"/>
-          </a:p>
-          <a:p>
-            <a:r>
-              <a:rPr lang="en-US" sz="1200" dirty="0"/>
-              <a:t>Parameter Widgets use the same general naming format as Control Widgets, but append a “p” to the “type” field.</a:t>
-            </a:r>
-          </a:p>
-          <a:p>
-            <a:r>
-              <a:rPr lang="en-US" sz="1200" dirty="0"/>
-              <a:t>	e.g., Control Widget “sl_k_pan_0” can have an associated Parameter Widget “sl_k</a:t>
-            </a:r>
-            <a:r>
-              <a:rPr lang="en-US" sz="1200" b="1" dirty="0">
-                <a:solidFill>
-                  <a:srgbClr val="FF0000"/>
-                </a:solidFill>
-              </a:rPr>
-              <a:t>p</a:t>
-            </a:r>
-            <a:r>
-              <a:rPr lang="en-US" sz="1200" dirty="0"/>
-              <a:t>_pan_0”</a:t>
-            </a:r>
-          </a:p>
-          <a:p>
-            <a:endParaRPr lang="en-US" sz="1200" dirty="0"/>
-          </a:p>
-          <a:p>
-            <a:r>
-              <a:rPr lang="en-US" sz="1200" dirty="0"/>
-              <a:t>Parameter Widgets intended to operate at the bank level append “p” to the “type” and drop the “_position” part of the name</a:t>
-            </a:r>
-          </a:p>
-          <a:p>
-            <a:r>
-              <a:rPr lang="en-US" sz="1200" dirty="0"/>
-              <a:t>	e.g., Parameter Widget “</a:t>
-            </a:r>
-            <a:r>
-              <a:rPr lang="en-US" sz="1200" dirty="0" err="1"/>
-              <a:t>sl_kp_pan</a:t>
-            </a:r>
-            <a:r>
-              <a:rPr lang="en-US" sz="1200" dirty="0"/>
-              <a:t>” would apply to all of the knobs with </a:t>
-            </a:r>
-            <a:r>
-              <a:rPr lang="en-US" sz="1200" dirty="0" err="1"/>
-              <a:t>BankID</a:t>
-            </a:r>
-            <a:r>
-              <a:rPr lang="en-US" sz="1200" dirty="0"/>
-              <a:t> “pan”</a:t>
-            </a:r>
-          </a:p>
-          <a:p>
-            <a:endParaRPr lang="en-US" sz="1200" dirty="0"/>
-          </a:p>
-          <a:p>
-            <a:r>
-              <a:rPr lang="en-US" sz="1200" dirty="0"/>
-              <a:t>Individual parameter widgets take priority over bank parameter widgets if both exist</a:t>
-            </a:r>
-          </a:p>
-          <a:p>
-            <a:pPr marL="457200" indent="-457200"/>
-            <a:r>
-              <a:rPr lang="en-US" sz="1200" dirty="0"/>
-              <a:t>	e.g., widget “</a:t>
-            </a:r>
-            <a:r>
-              <a:rPr lang="en-US" sz="1200" dirty="0" err="1"/>
-              <a:t>sl_kp_pan</a:t>
-            </a:r>
-            <a:r>
-              <a:rPr lang="en-US" sz="1200" dirty="0"/>
-              <a:t>” will control the default knob color for the “pan” knob bank, but widget “sl_kp_pan_3” can be used to override that color for that knob</a:t>
-            </a:r>
-          </a:p>
-          <a:p>
-            <a:endParaRPr lang="en-US" sz="1200" dirty="0"/>
-          </a:p>
-          <a:p>
-            <a:r>
-              <a:rPr lang="en-US" sz="1200" dirty="0"/>
-              <a:t>Parameter Widgets should generally be created as Text Widgets in </a:t>
-            </a:r>
-            <a:r>
-              <a:rPr lang="en-US" sz="1200" dirty="0" err="1"/>
-              <a:t>GigPerformer</a:t>
-            </a:r>
-            <a:r>
-              <a:rPr lang="en-US" sz="1200" dirty="0"/>
-              <a:t>, and often should be hidden.</a:t>
-            </a:r>
-          </a:p>
-          <a:p>
-            <a:endParaRPr lang="en-US" sz="1200" dirty="0"/>
-          </a:p>
-          <a:p>
-            <a:r>
-              <a:rPr lang="en-US" sz="1200" dirty="0"/>
-              <a:t>The information the SL-MK3 extension looks for in Parameter Widgets is:</a:t>
-            </a:r>
-          </a:p>
-          <a:p>
-            <a:pPr marL="628650" lvl="1" indent="-171450">
-              <a:buFont typeface="Arial" panose="020B0604020202020204" pitchFamily="34" charset="0"/>
-              <a:buChar char="•"/>
-            </a:pPr>
-            <a:r>
-              <a:rPr lang="en-US" sz="1200" dirty="0"/>
-              <a:t>Caption – sets the label that will appear on the SL-MK3 display for the widget</a:t>
-            </a:r>
-          </a:p>
-          <a:p>
-            <a:pPr marL="628650" lvl="1" indent="-171450">
-              <a:buFont typeface="Arial" panose="020B0604020202020204" pitchFamily="34" charset="0"/>
-              <a:buChar char="•"/>
-            </a:pPr>
-            <a:r>
-              <a:rPr lang="en-US" sz="1200" dirty="0"/>
-              <a:t>Fill Color – controls the “on” color of buttons/pads or the color of knobs on the display</a:t>
-            </a:r>
-          </a:p>
-          <a:p>
-            <a:pPr marL="628650" lvl="1" indent="-171450">
-              <a:buFont typeface="Arial" panose="020B0604020202020204" pitchFamily="34" charset="0"/>
-              <a:buChar char="•"/>
-            </a:pPr>
-            <a:r>
-              <a:rPr lang="en-US" sz="1200" dirty="0"/>
-              <a:t>Outline Color – controls the “off” color of buttons/pads or the top bar color above knobs</a:t>
-            </a:r>
-          </a:p>
-          <a:p>
-            <a:pPr marL="628650" lvl="1" indent="-171450">
-              <a:buFont typeface="Arial" panose="020B0604020202020204" pitchFamily="34" charset="0"/>
-              <a:buChar char="•"/>
-            </a:pPr>
-            <a:r>
-              <a:rPr lang="en-US" sz="1200" dirty="0"/>
-              <a:t>Knob resolution – for knob widgets you can change the resolution by appending an “_” after the label in the Caption field followed by an integer.  e.g., a Caption of “Volume_200” would result in a knob label of “Volume” and a resolution of 200 “ticks” to move the widget from 0.0 to 1.0.  The default resolution is 1000.</a:t>
-            </a:r>
-          </a:p>
-          <a:p>
-            <a:pPr marL="628650" lvl="1" indent="-171450">
-              <a:buFont typeface="Arial" panose="020B0604020202020204" pitchFamily="34" charset="0"/>
-              <a:buChar char="•"/>
-            </a:pPr>
-            <a:r>
-              <a:rPr lang="en-US" sz="1200" dirty="0"/>
-              <a:t>Pad – Caption format is “</a:t>
-            </a:r>
-            <a:r>
-              <a:rPr lang="en-US" sz="1200" dirty="0" err="1"/>
-              <a:t>Label_OnText_OffText</a:t>
-            </a:r>
-            <a:r>
-              <a:rPr lang="en-US" sz="1200" dirty="0"/>
-              <a:t>” with optional “_m” appended make it momentary contact</a:t>
-            </a:r>
-          </a:p>
-          <a:p>
-            <a:pPr marL="628650" lvl="1" indent="-171450">
-              <a:buFont typeface="Arial" panose="020B0604020202020204" pitchFamily="34" charset="0"/>
-              <a:buChar char="•"/>
-            </a:pPr>
-            <a:r>
-              <a:rPr lang="en-US" sz="1200" dirty="0"/>
-              <a:t>Note that the alpha (transparency) of the Fill and Outline color is not used by the extension.  Setting the Fill and Outline alphas to zero in </a:t>
-            </a:r>
-            <a:r>
-              <a:rPr lang="en-US" sz="1200" dirty="0" err="1"/>
-              <a:t>GigPerfomer</a:t>
-            </a:r>
-            <a:r>
-              <a:rPr lang="en-US" sz="1200" dirty="0"/>
-              <a:t> is an alternative to hiding these widgets.  This can be useful if you want to see the label on the Rackspace but not the color.  This can also be very confusing when you’re trying to remember where you set the color, so I usually hide them instead.</a:t>
-            </a:r>
-          </a:p>
-          <a:p>
-            <a:pPr marL="628650" lvl="1" indent="-171450">
-              <a:buFont typeface="Arial" panose="020B0604020202020204" pitchFamily="34" charset="0"/>
-              <a:buChar char="•"/>
-            </a:pPr>
-            <a:endParaRPr lang="en-US" sz="1200" dirty="0"/>
-          </a:p>
-        </p:txBody>
-      </p:sp>
-    </p:spTree>
-    <p:extLst>
-      <p:ext uri="{BB962C8B-B14F-4D97-AF65-F5344CB8AC3E}">
-        <p14:creationId xmlns:p14="http://schemas.microsoft.com/office/powerpoint/2010/main" val="2034193139"/>
-      </p:ext>
-    </p:extLst>
-  </p:cSld>
-  <p:clrMapOvr>
-    <a:masterClrMapping/>
-  </p:clrMapOvr>
-</p:sld>
-</file>
-
 <file path=ppt/slides/slide5.xml><?xml version="1.0" encoding="utf-8"?>
 <p:sld xmlns:a="http://schemas.openxmlformats.org/drawingml/2006/main" xmlns:r="http://schemas.openxmlformats.org/officeDocument/2006/relationships" xmlns:p="http://schemas.openxmlformats.org/presentationml/2006/main">
   <p:cSld>
@@ -4553,7 +5452,7 @@
         <p:spPr>
           <a:xfrm>
             <a:off x="362992" y="369537"/>
-            <a:ext cx="8095208" cy="5878532"/>
+            <a:ext cx="8095208" cy="6617196"/>
           </a:xfrm>
           <a:prstGeom prst="rect">
             <a:avLst/>
@@ -4568,7 +5467,7 @@
           <a:p>
             <a:r>
               <a:rPr lang="en-US" sz="1400" b="1" dirty="0"/>
-              <a:t>Indicator Widgets</a:t>
+              <a:t>Parameter Widgets</a:t>
             </a:r>
           </a:p>
           <a:p>
@@ -4577,7 +5476,7 @@
           <a:p>
             <a:r>
               <a:rPr lang="en-US" sz="1200" dirty="0"/>
-              <a:t>“Indicator Widgets” are similar to Parameter Widgets, but instead of controlling the colors of widgets on the SL-MK3 they are used to show on the Rackspace screen which widget banks are actively being controlled by the SL-MK3.</a:t>
+              <a:t>“Parameter Widgets” can be used to specify how “Control Widgets” appear on the SL-MK3.  Parameter Widgets are not strictly necessary, but without them everything will appear using default colors and labels on the SL-MK3.</a:t>
             </a:r>
           </a:p>
           <a:p>
@@ -4586,7 +5485,107 @@
           <a:p>
             <a:r>
               <a:rPr lang="en-US" sz="1200" dirty="0"/>
-              <a:t>For example, if you have three separate banks of knobs in a Rackspace (e.g., instrument parameters, reverb parameters, and pans) it can be helpful to see on the </a:t>
+              <a:t>Parameter Widgets associated with buttons and pads control the RGB “on” and “off” colors on the SL-MK3.  Parameter Widgets for knobs control the knob color, the bar color above the knob, and optionally the resolution of the knobs.</a:t>
+            </a:r>
+          </a:p>
+          <a:p>
+            <a:endParaRPr lang="en-US" sz="1200" dirty="0"/>
+          </a:p>
+          <a:p>
+            <a:r>
+              <a:rPr lang="en-US" sz="1200" dirty="0"/>
+              <a:t>Parameter Widgets can be created at the bank level (for controlling colors of the entire bank) or at the individual widget level.</a:t>
+            </a:r>
+          </a:p>
+          <a:p>
+            <a:endParaRPr lang="en-US" sz="1200" dirty="0"/>
+          </a:p>
+          <a:p>
+            <a:r>
+              <a:rPr lang="en-US" sz="1200" dirty="0"/>
+              <a:t>Parameter Widgets use the same general naming format as Control Widgets, but append a “p” to the “type” field.</a:t>
+            </a:r>
+          </a:p>
+          <a:p>
+            <a:r>
+              <a:rPr lang="en-US" sz="1200" dirty="0"/>
+              <a:t>	e.g., Control Widget “sl_k_pan_0” can have an associated Parameter Widget “sl_k</a:t>
+            </a:r>
+            <a:r>
+              <a:rPr lang="en-US" sz="1200" b="1" dirty="0">
+                <a:solidFill>
+                  <a:srgbClr val="FF0000"/>
+                </a:solidFill>
+              </a:rPr>
+              <a:t>p</a:t>
+            </a:r>
+            <a:r>
+              <a:rPr lang="en-US" sz="1200" dirty="0"/>
+              <a:t>_pan_0”</a:t>
+            </a:r>
+          </a:p>
+          <a:p>
+            <a:endParaRPr lang="en-US" sz="1200" dirty="0"/>
+          </a:p>
+          <a:p>
+            <a:r>
+              <a:rPr lang="en-US" sz="1200" dirty="0"/>
+              <a:t>Parameter Widgets intended to operate at the bank level append “p” to the “type” and drop the “_position” part of the name</a:t>
+            </a:r>
+          </a:p>
+          <a:p>
+            <a:r>
+              <a:rPr lang="en-US" sz="1200" dirty="0"/>
+              <a:t>	e.g., Parameter Widget “</a:t>
+            </a:r>
+            <a:r>
+              <a:rPr lang="en-US" sz="1200" dirty="0" err="1"/>
+              <a:t>sl_kp_pan</a:t>
+            </a:r>
+            <a:r>
+              <a:rPr lang="en-US" sz="1200" dirty="0"/>
+              <a:t>” would apply to all of the knobs with </a:t>
+            </a:r>
+            <a:r>
+              <a:rPr lang="en-US" sz="1200" dirty="0" err="1"/>
+              <a:t>BankID</a:t>
+            </a:r>
+            <a:r>
+              <a:rPr lang="en-US" sz="1200" dirty="0"/>
+              <a:t> “pan”</a:t>
+            </a:r>
+          </a:p>
+          <a:p>
+            <a:endParaRPr lang="en-US" sz="1200" dirty="0"/>
+          </a:p>
+          <a:p>
+            <a:r>
+              <a:rPr lang="en-US" sz="1200" dirty="0"/>
+              <a:t>Individual parameter widgets take priority over bank parameter widgets if both exist</a:t>
+            </a:r>
+          </a:p>
+          <a:p>
+            <a:pPr marL="457200" indent="-457200"/>
+            <a:r>
+              <a:rPr lang="en-US" sz="1200" dirty="0"/>
+              <a:t>	e.g., widget “</a:t>
+            </a:r>
+            <a:r>
+              <a:rPr lang="en-US" sz="1200" dirty="0" err="1"/>
+              <a:t>sl_kp_pan</a:t>
+            </a:r>
+            <a:r>
+              <a:rPr lang="en-US" sz="1200" dirty="0"/>
+              <a:t>” will control the default knob color for the “pan” knob bank, but widget “sl_kp_pan_3” can be used to override that color for that knob</a:t>
+            </a:r>
+          </a:p>
+          <a:p>
+            <a:endParaRPr lang="en-US" sz="1200" dirty="0"/>
+          </a:p>
+          <a:p>
+            <a:r>
+              <a:rPr lang="en-US" sz="1200" dirty="0"/>
+              <a:t>Parameter Widgets should generally be created as Text Widgets in </a:t>
             </a:r>
             <a:r>
               <a:rPr lang="en-US" sz="1200" dirty="0" err="1"/>
@@ -4594,7 +5593,7 @@
             </a:r>
             <a:r>
               <a:rPr lang="en-US" sz="1200" dirty="0"/>
-              <a:t> screen which ones are actively linked to the knobs on the SL-MK3.  You can change banks using the up/down arrow keys next to the control row on the SL-MK3 and the Indicator Widgets will reflect which bank is currently active</a:t>
+              <a:t>, and often should be hidden.</a:t>
             </a:r>
           </a:p>
           <a:p>
@@ -4603,111 +5602,98 @@
           <a:p>
             <a:r>
               <a:rPr lang="en-US" sz="1200" dirty="0"/>
-              <a:t>Indicator Widgets are named with the same format as Control and Parameter widgets but with “_</a:t>
+              <a:t>The information the SL-MK3 extension looks for in Parameter Widgets is:</a:t>
+            </a:r>
+          </a:p>
+          <a:p>
+            <a:pPr marL="628650" lvl="1" indent="-171450">
+              <a:buFont typeface="Arial" panose="020B0604020202020204" pitchFamily="34" charset="0"/>
+              <a:buChar char="•"/>
+            </a:pPr>
+            <a:r>
+              <a:rPr lang="en-US" sz="1200" dirty="0"/>
+              <a:t>Caption – sets the label that will appear on the SL-MK3 display for the widget</a:t>
+            </a:r>
+          </a:p>
+          <a:p>
+            <a:pPr marL="628650" lvl="1" indent="-171450">
+              <a:buFont typeface="Arial" panose="020B0604020202020204" pitchFamily="34" charset="0"/>
+              <a:buChar char="•"/>
+            </a:pPr>
+            <a:r>
+              <a:rPr lang="en-US" sz="1200" dirty="0"/>
+              <a:t>Fill Color – controls the “on” color of buttons/pads or the color of knobs on the display</a:t>
+            </a:r>
+          </a:p>
+          <a:p>
+            <a:pPr marL="628650" lvl="1" indent="-171450">
+              <a:buFont typeface="Arial" panose="020B0604020202020204" pitchFamily="34" charset="0"/>
+              <a:buChar char="•"/>
+            </a:pPr>
+            <a:r>
+              <a:rPr lang="en-US" sz="1200" dirty="0"/>
+              <a:t>Outline Color – controls the “off” color of buttons/pads or the top bar color above knobs</a:t>
+            </a:r>
+          </a:p>
+          <a:p>
+            <a:pPr marL="628650" lvl="1" indent="-171450">
+              <a:buFont typeface="Arial" panose="020B0604020202020204" pitchFamily="34" charset="0"/>
+              <a:buChar char="•"/>
+            </a:pPr>
+            <a:r>
+              <a:rPr lang="en-US" sz="1200" dirty="0"/>
+              <a:t>Knob resolution – for knob widgets you can change the resolution by appending an “_” after the label in the Caption field followed by an integer.  e.g., a Caption of “Volume_200” would result in a knob label of “Volume” and a resolution of 200 “ticks” to move the widget from 0.0 to 1.0.  The default resolution is 1000.</a:t>
+            </a:r>
+          </a:p>
+          <a:p>
+            <a:pPr marL="628650" lvl="1" indent="-171450">
+              <a:buFont typeface="Arial" panose="020B0604020202020204" pitchFamily="34" charset="0"/>
+              <a:buChar char="•"/>
+            </a:pPr>
+            <a:r>
+              <a:rPr lang="en-US" sz="1200" dirty="0"/>
+              <a:t>Pad &amp; Button Caption - format is “</a:t>
             </a:r>
             <a:r>
               <a:rPr lang="en-US" sz="1200" dirty="0" err="1"/>
-              <a:t>i</a:t>
-            </a:r>
-            <a:r>
-              <a:rPr lang="en-US" sz="1200" dirty="0"/>
-              <a:t>” in place of the _position.</a:t>
-            </a:r>
-          </a:p>
-          <a:p>
-            <a:r>
-              <a:rPr lang="en-US" sz="1200" dirty="0"/>
-              <a:t>	e.g., </a:t>
+              <a:t>Label_OffText_OnText</a:t>
+            </a:r>
+            <a:r>
+              <a:rPr lang="en-US" sz="1200" dirty="0"/>
+              <a:t>” with optional “_m” appended make it momentary contact</a:t>
+            </a:r>
+          </a:p>
+          <a:p>
+            <a:pPr marL="628650" lvl="1" indent="-171450">
+              <a:buFont typeface="Arial" panose="020B0604020202020204" pitchFamily="34" charset="0"/>
+              <a:buChar char="•"/>
+            </a:pPr>
+            <a:r>
+              <a:rPr lang="en-US" sz="1200" dirty="0"/>
+              <a:t>Note that the alpha (transparency) of the Fill and Outline color is not used by the extension.  Setting the Fill and Outline alphas to zero in </a:t>
             </a:r>
             <a:r>
               <a:rPr lang="en-US" sz="1200" dirty="0" err="1"/>
-              <a:t>sl_k_pan_i</a:t>
-            </a:r>
+              <a:t>GigPerfomer</a:t>
+            </a:r>
+            <a:r>
+              <a:rPr lang="en-US" sz="1200" dirty="0"/>
+              <a:t> is an alternative to hiding these widgets.  This can be useful if you want to see the label on the Rackspace but not the color.  This can also be very confusing when you’re trying to remember where you set the color, so I usually hide them instead.</a:t>
+            </a:r>
+          </a:p>
+          <a:p>
+            <a:pPr marL="628650" lvl="1" indent="-171450">
+              <a:buFont typeface="Arial" panose="020B0604020202020204" pitchFamily="34" charset="0"/>
+              <a:buChar char="•"/>
+            </a:pPr>
             <a:endParaRPr lang="en-US" sz="1200" dirty="0"/>
-          </a:p>
-          <a:p>
-            <a:endParaRPr lang="en-US" sz="1200" dirty="0"/>
-          </a:p>
-          <a:p>
-            <a:r>
-              <a:rPr lang="en-US" sz="1200" dirty="0"/>
-              <a:t>Indicator Widgets are generally created as Text widgets, most often with the text itself being blank or with the Text Color alpha set to zero so that the text itself does not appear on the Rackspace screen.</a:t>
-            </a:r>
-          </a:p>
-          <a:p>
-            <a:endParaRPr lang="en-US" sz="1200" dirty="0"/>
-          </a:p>
-          <a:p>
-            <a:r>
-              <a:rPr lang="en-US" sz="1200" dirty="0"/>
-              <a:t>When the bank specified is “active” the extension will set the value of the widget to 1, which will raise its visibility on the Rackspace screen.  When the bank is not active the value will be set to 0.3, which will reduce its visibility.  A common use of these widgets is as an outline and background behind the associated set of Control Widgets.</a:t>
-            </a:r>
-          </a:p>
-          <a:p>
-            <a:endParaRPr lang="en-US" sz="1200" dirty="0"/>
-          </a:p>
-          <a:p>
-            <a:r>
-              <a:rPr lang="en-US" sz="1200" dirty="0"/>
-              <a:t>The Caption of Indicator Widgets for knob and button banks controls the text that appears in the label areas on the right-most display on the SL-MK3, or temporarily in the Notify area when bank switching pad banks.  Text for knob and button banks appears on two lines, which should be separated in the Caption by the “_” character.  e.g., a Caption of “</a:t>
-            </a:r>
-            <a:r>
-              <a:rPr lang="en-US" sz="1200" dirty="0" err="1"/>
-              <a:t>Solo_Mute</a:t>
-            </a:r>
-            <a:r>
-              <a:rPr lang="en-US" sz="1200" dirty="0"/>
-              <a:t>” for a button bank would show the label “Solo” next to the top row of buttons, and “Mute” next to the bottom row.</a:t>
-            </a:r>
-          </a:p>
-          <a:p>
-            <a:endParaRPr lang="en-US" sz="1200" dirty="0"/>
-          </a:p>
-          <a:p>
-            <a:r>
-              <a:rPr lang="en-US" sz="1200" b="1" dirty="0"/>
-              <a:t>Note</a:t>
-            </a:r>
-            <a:r>
-              <a:rPr lang="en-US" sz="1200" dirty="0"/>
-              <a:t> – </a:t>
-            </a:r>
-            <a:r>
-              <a:rPr lang="en-US" sz="1200" dirty="0" err="1"/>
-              <a:t>GigPerformer</a:t>
-            </a:r>
-            <a:r>
-              <a:rPr lang="en-US" sz="1200" dirty="0"/>
-              <a:t> will remember Indicator Widget values when switching between </a:t>
-            </a:r>
-            <a:r>
-              <a:rPr lang="en-US" sz="1200" dirty="0" err="1"/>
-              <a:t>Rackspaces</a:t>
-            </a:r>
-            <a:r>
-              <a:rPr lang="en-US" sz="1200" dirty="0"/>
-              <a:t>/Variations/etc.  As a result, it will remember which banks you were controlling when you last used or saved a Variation, and when you return to it those same banks will be “active” again on the SL-MK3.</a:t>
-            </a:r>
-          </a:p>
-          <a:p>
-            <a:endParaRPr lang="en-US" sz="1200" dirty="0"/>
-          </a:p>
-          <a:p>
-            <a:r>
-              <a:rPr lang="en-US" sz="1200" b="1" dirty="0"/>
-              <a:t>Note</a:t>
-            </a:r>
-            <a:r>
-              <a:rPr lang="en-US" sz="1200" dirty="0"/>
-              <a:t> – the background color of an Indicator Widget is used for coloring the up/down bank select arrows on the SL-MK3.  If you make each bank a different color, the up/down arrows will indicate which bank is next/previous as you bank select.</a:t>
-            </a:r>
           </a:p>
         </p:txBody>
       </p:sp>
     </p:spTree>
     <p:extLst>
       <p:ext uri="{BB962C8B-B14F-4D97-AF65-F5344CB8AC3E}">
-        <p14:creationId xmlns:p14="http://schemas.microsoft.com/office/powerpoint/2010/main" val="3928714981"/>
+        <p14:creationId xmlns:p14="http://schemas.microsoft.com/office/powerpoint/2010/main" val="2034193139"/>
       </p:ext>
     </p:extLst>
   </p:cSld>
@@ -4743,7 +5729,7 @@
         <p:spPr>
           <a:xfrm>
             <a:off x="362992" y="369537"/>
-            <a:ext cx="8095208" cy="4216539"/>
+            <a:ext cx="8095208" cy="5878532"/>
           </a:xfrm>
           <a:prstGeom prst="rect">
             <a:avLst/>
@@ -4757,81 +5743,71 @@
           <a:lstStyle/>
           <a:p>
             <a:r>
-              <a:rPr lang="en-US" sz="1400" b="1" dirty="0" err="1"/>
-              <a:t>BankID</a:t>
-            </a:r>
-            <a:r>
               <a:rPr lang="en-US" sz="1400" b="1" dirty="0"/>
-              <a:t> Linking</a:t>
-            </a:r>
-          </a:p>
-          <a:p>
-            <a:endParaRPr lang="en-US" sz="1400" dirty="0"/>
-          </a:p>
-          <a:p>
-            <a:r>
-              <a:rPr lang="en-US" sz="1200" dirty="0"/>
-              <a:t>If the same </a:t>
+              <a:t>Indicator Widgets</a:t>
+            </a:r>
+          </a:p>
+          <a:p>
+            <a:endParaRPr lang="en-US" sz="1400" b="1" dirty="0"/>
+          </a:p>
+          <a:p>
+            <a:r>
+              <a:rPr lang="en-US" sz="1200" dirty="0"/>
+              <a:t>“Indicator Widgets” are similar to Parameter Widgets, but instead of controlling the colors of widgets on the SL-MK3 they are used to show on the Rackspace screen which widget banks are actively being controlled by the SL-MK3.</a:t>
+            </a:r>
+          </a:p>
+          <a:p>
+            <a:endParaRPr lang="en-US" sz="1200" dirty="0"/>
+          </a:p>
+          <a:p>
+            <a:r>
+              <a:rPr lang="en-US" sz="1200" dirty="0"/>
+              <a:t>For example, if you have three separate banks of knobs in a Rackspace (e.g., instrument parameters, reverb parameters, and pans) it can be helpful to see on the </a:t>
             </a:r>
             <a:r>
               <a:rPr lang="en-US" sz="1200" dirty="0" err="1"/>
-              <a:t>bankID</a:t>
-            </a:r>
-            <a:r>
-              <a:rPr lang="en-US" sz="1200" dirty="0"/>
-              <a:t> is used for different control rows (e.g., Faders and Knobs) then when that </a:t>
+              <a:t>GigPerformer</a:t>
+            </a:r>
+            <a:r>
+              <a:rPr lang="en-US" sz="1200" dirty="0"/>
+              <a:t> screen which ones are actively linked to the knobs on the SL-MK3.  You can change banks using the up/down arrow keys next to the control row on the SL-MK3 and the Indicator Widgets will reflect which bank is currently active</a:t>
+            </a:r>
+          </a:p>
+          <a:p>
+            <a:endParaRPr lang="en-US" sz="1200" dirty="0"/>
+          </a:p>
+          <a:p>
+            <a:r>
+              <a:rPr lang="en-US" sz="1200" dirty="0"/>
+              <a:t>Indicator Widgets are named with the same format as Control and Parameter widgets but with “_</a:t>
             </a:r>
             <a:r>
               <a:rPr lang="en-US" sz="1200" dirty="0" err="1"/>
-              <a:t>bankID</a:t>
-            </a:r>
-            <a:r>
-              <a:rPr lang="en-US" sz="1200" dirty="0"/>
-              <a:t> is selected to be active for one control row (e.g., Knobs or Faders) it will be selected for all rows that have a </a:t>
+              <a:t>i</a:t>
+            </a:r>
+            <a:r>
+              <a:rPr lang="en-US" sz="1200" dirty="0"/>
+              <a:t>” in place of the _position.</a:t>
+            </a:r>
+          </a:p>
+          <a:p>
+            <a:r>
+              <a:rPr lang="en-US" sz="1200" dirty="0"/>
+              <a:t>	e.g., </a:t>
             </a:r>
             <a:r>
               <a:rPr lang="en-US" sz="1200" dirty="0" err="1"/>
-              <a:t>bankID</a:t>
-            </a:r>
-            <a:r>
-              <a:rPr lang="en-US" sz="1200" dirty="0"/>
-              <a:t> of that name.</a:t>
-            </a:r>
-          </a:p>
-          <a:p>
+              <a:t>sl_k_pan_i</a:t>
+            </a:r>
             <a:endParaRPr lang="en-US" sz="1200" dirty="0"/>
           </a:p>
           <a:p>
-            <a:r>
-              <a:rPr lang="en-US" sz="1200" dirty="0"/>
-              <a:t>For example, if you want to be able to bank select between three separate 8 channel mixers plugins and have the entire control surface move together between them you would use Widget names like:</a:t>
-            </a:r>
-          </a:p>
-          <a:p>
-            <a:r>
-              <a:rPr lang="en-US" sz="1200" dirty="0"/>
-              <a:t>	mc_f_mix1_[0..7]         mc_k_mix1_[0..7]        mc_p_mix1_[0..15]        mc_b_mix1_[0..15]</a:t>
-            </a:r>
-          </a:p>
-          <a:p>
-            <a:r>
-              <a:rPr lang="en-US" sz="1200" dirty="0"/>
-              <a:t>	mc_f_mix2_[0..7]         mc_k_mix2_[0..7]        mc_p_mix2_[0..15]        mc_b_mix2_[0..15]</a:t>
-            </a:r>
-          </a:p>
-          <a:p>
-            <a:r>
-              <a:rPr lang="en-US" sz="1200" dirty="0"/>
-              <a:t>	mc_f_mix3_[0..7]         mc_k_mix3_[0..7]        mc_p_mix3_[0..15]        mc_b_mix3_[0..15]</a:t>
-            </a:r>
-          </a:p>
-          <a:p>
             <a:endParaRPr lang="en-US" sz="1200" dirty="0"/>
           </a:p>
           <a:p>
             <a:r>
               <a:rPr lang="en-US" sz="1200" dirty="0"/>
-              <a:t>Named as such, when you bank select using the Knob bank select keys you will automatically also select the corresponding set of Faders, Pads, and Buttons.</a:t>
+              <a:t>Indicator Widgets are generally created as Text widgets, most often with the text itself being blank or with the Text Color alpha set to zero so that the text itself does not appear on the Rackspace screen.</a:t>
             </a:r>
           </a:p>
           <a:p>
@@ -4840,45 +5816,66 @@
           <a:p>
             <a:r>
               <a:rPr lang="en-US" sz="1200" dirty="0"/>
-              <a:t>In contrast, if you want to use the same three mixer plugins and be able to independently select which mixer plugin the Knobs, Faders, and Pads are actively controlling you must use different </a:t>
+              <a:t>When the bank specified is “active” the extension will set the value of the widget to 1, which will raise its visibility on the Rackspace screen.  When the bank is not active the value will be set to 0.3, which will reduce its visibility.  A common use of these widgets is as an outline and background behind the associated set of Control Widgets.</a:t>
+            </a:r>
+          </a:p>
+          <a:p>
+            <a:endParaRPr lang="en-US" sz="1200" dirty="0"/>
+          </a:p>
+          <a:p>
+            <a:r>
+              <a:rPr lang="en-US" sz="1200" dirty="0"/>
+              <a:t>The Caption of Indicator Widgets for knob and button banks controls the text that appears in the label areas on the right-most display on the SL-MK3, or temporarily in the Notify area when bank switching pad banks.  Text for knob and button banks appears on two lines, which should be separated in the Caption by the “_” character.  e.g., a Caption of “</a:t>
             </a:r>
             <a:r>
               <a:rPr lang="en-US" sz="1200" dirty="0" err="1"/>
-              <a:t>bankIDs</a:t>
-            </a:r>
-            <a:r>
-              <a:rPr lang="en-US" sz="1200" dirty="0"/>
-              <a:t> for each widget row.  A simple example would be:</a:t>
-            </a:r>
-          </a:p>
-          <a:p>
-            <a:r>
-              <a:rPr lang="en-US" sz="1200" dirty="0"/>
-              <a:t>	mc_f_volume1_[0..7]          mc_k_pan1_[0..7]            mc_b_mute1_[0…7]</a:t>
-            </a:r>
-          </a:p>
-          <a:p>
-            <a:r>
-              <a:rPr lang="en-US" sz="1200" dirty="0"/>
-              <a:t>	mc_f_volume2_[0..7]          mc_k_pan2_[0..7]            mc_b_mute2_[0…7]</a:t>
-            </a:r>
-          </a:p>
-          <a:p>
-            <a:r>
-              <a:rPr lang="en-US" sz="1200" dirty="0"/>
-              <a:t>	mc_f_volume3_[0..7]          mc_k_pan3_[0..7]            mc_b_mute3_[0…7]</a:t>
+              <a:t>Solo_Mute</a:t>
+            </a:r>
+            <a:r>
+              <a:rPr lang="en-US" sz="1200" dirty="0"/>
+              <a:t>” for a button bank would show the label “Solo” next to the top row of buttons, and “Mute” next to the bottom row.</a:t>
             </a:r>
           </a:p>
           <a:p>
             <a:endParaRPr lang="en-US" sz="1200" dirty="0"/>
           </a:p>
           <a:p>
+            <a:r>
+              <a:rPr lang="en-US" sz="1200" b="1" dirty="0"/>
+              <a:t>Note</a:t>
+            </a:r>
+            <a:r>
+              <a:rPr lang="en-US" sz="1200" dirty="0"/>
+              <a:t> – </a:t>
+            </a:r>
+            <a:r>
+              <a:rPr lang="en-US" sz="1200" dirty="0" err="1"/>
+              <a:t>GigPerformer</a:t>
+            </a:r>
+            <a:r>
+              <a:rPr lang="en-US" sz="1200" dirty="0"/>
+              <a:t> will remember Indicator Widget values when switching between </a:t>
+            </a:r>
+            <a:r>
+              <a:rPr lang="en-US" sz="1200" dirty="0" err="1"/>
+              <a:t>Rackspaces</a:t>
+            </a:r>
+            <a:r>
+              <a:rPr lang="en-US" sz="1200" dirty="0"/>
+              <a:t>/Variations/etc.  As a result, it will remember which banks you were controlling when you last used or saved a Variation, and when you return to it those same banks will be “active” again on the SL-MK3.</a:t>
+            </a:r>
+          </a:p>
+          <a:p>
             <a:endParaRPr lang="en-US" sz="1200" dirty="0"/>
           </a:p>
           <a:p>
             <a:r>
-              <a:rPr lang="en-US" sz="1200" dirty="0"/>
-              <a:t>I sometimes use a mix of both approaches in the same Rackspace.  </a:t>
+              <a:rPr lang="en-US" sz="1200" b="1" dirty="0"/>
+              <a:t>Note</a:t>
+            </a:r>
+            <a:r>
+              <a:rPr lang="en-US" sz="1200" dirty="0"/>
+              <a:t> – the background color of an Indicator Widget is used for coloring the up/down bank select arrows on the SL-MK3.  If you make each bank a different color, the up/down arrows will indicate which bank is next/previous as you bank select.</a:t>
             </a:r>
           </a:p>
         </p:txBody>
@@ -4886,7 +5883,7 @@
     </p:spTree>
     <p:extLst>
       <p:ext uri="{BB962C8B-B14F-4D97-AF65-F5344CB8AC3E}">
-        <p14:creationId xmlns:p14="http://schemas.microsoft.com/office/powerpoint/2010/main" val="98072306"/>
+        <p14:creationId xmlns:p14="http://schemas.microsoft.com/office/powerpoint/2010/main" val="3928714981"/>
       </p:ext>
     </p:extLst>
   </p:cSld>
@@ -4922,7 +5919,7 @@
         <p:spPr>
           <a:xfrm>
             <a:off x="362992" y="369537"/>
-            <a:ext cx="8095208" cy="4985980"/>
+            <a:ext cx="8095208" cy="4216539"/>
           </a:xfrm>
           <a:prstGeom prst="rect">
             <a:avLst/>
@@ -4936,33 +5933,45 @@
           <a:lstStyle/>
           <a:p>
             <a:r>
+              <a:rPr lang="en-US" sz="1400" b="1" dirty="0" err="1"/>
+              <a:t>BankID</a:t>
+            </a:r>
+            <a:r>
               <a:rPr lang="en-US" sz="1400" b="1" dirty="0"/>
-              <a:t>Additional Controls</a:t>
-            </a:r>
-          </a:p>
-          <a:p>
-            <a:endParaRPr lang="en-US" sz="1400" b="1" dirty="0"/>
-          </a:p>
-          <a:p>
-            <a:r>
-              <a:rPr lang="en-US" sz="1200" dirty="0"/>
-              <a:t>The buttons immediately below the display are always assigned to select </a:t>
+              <a:t> Linking</a:t>
+            </a:r>
+          </a:p>
+          <a:p>
+            <a:endParaRPr lang="en-US" sz="1400" dirty="0"/>
+          </a:p>
+          <a:p>
+            <a:r>
+              <a:rPr lang="en-US" sz="1200" dirty="0"/>
+              <a:t>If the same </a:t>
             </a:r>
             <a:r>
               <a:rPr lang="en-US" sz="1200" dirty="0" err="1"/>
-              <a:t>Rackspaces</a:t>
-            </a:r>
-            <a:r>
-              <a:rPr lang="en-US" sz="1200" dirty="0"/>
-              <a:t>, Variations, Songs, or </a:t>
+              <a:t>bankID</a:t>
+            </a:r>
+            <a:r>
+              <a:rPr lang="en-US" sz="1200" dirty="0"/>
+              <a:t> is used for different control rows (e.g., Faders and Knobs) then when that </a:t>
             </a:r>
             <a:r>
               <a:rPr lang="en-US" sz="1200" dirty="0" err="1"/>
-              <a:t>Songparts</a:t>
-            </a:r>
-            <a:r>
-              <a:rPr lang="en-US" sz="1200" dirty="0"/>
-              <a:t>.  You can scroll through the them using the left and right arrow keys toward the bottom left of the control surface. </a:t>
+              <a:t>bankID</a:t>
+            </a:r>
+            <a:r>
+              <a:rPr lang="en-US" sz="1200" dirty="0"/>
+              <a:t> is selected to be active for one control row (e.g., Knobs or Faders) it will be selected for all rows that have a </a:t>
+            </a:r>
+            <a:r>
+              <a:rPr lang="en-US" sz="1200" dirty="0" err="1"/>
+              <a:t>bankID</a:t>
+            </a:r>
+            <a:r>
+              <a:rPr lang="en-US" sz="1200" dirty="0"/>
+              <a:t> of that name.</a:t>
             </a:r>
           </a:p>
           <a:p>
@@ -4971,190 +5980,81 @@
           <a:p>
             <a:r>
               <a:rPr lang="en-US" sz="1200" dirty="0"/>
-              <a:t>Other button assignments are:</a:t>
-            </a:r>
-          </a:p>
-          <a:p>
-            <a:pPr marL="628650" lvl="1" indent="-171450">
-              <a:buFont typeface="Arial" panose="020B0604020202020204" pitchFamily="34" charset="0"/>
-              <a:buChar char="•"/>
-            </a:pPr>
-            <a:r>
-              <a:rPr lang="en-US" sz="1200" dirty="0"/>
-              <a:t>“Play” – starts the </a:t>
+              <a:t>For example, if you want to be able to bank select between three separate 8 channel mixers plugins and have the entire control surface move together between them you would use Widget names like:</a:t>
+            </a:r>
+          </a:p>
+          <a:p>
+            <a:r>
+              <a:rPr lang="en-US" sz="1200" dirty="0"/>
+              <a:t>	sl_f_mix1_[0..7]         sl_k_mix1_[0..7]        sl_p_mix1_[0..15]        sl_b_mix1_[0..15]</a:t>
+            </a:r>
+          </a:p>
+          <a:p>
+            <a:r>
+              <a:rPr lang="en-US" sz="1200" dirty="0"/>
+              <a:t>	sl_f_mix2_[0..7]         sl_k_mix2_[0..7]        sl_p_mix2_[0..15]        sl_b_mix2_[0..15]</a:t>
+            </a:r>
+          </a:p>
+          <a:p>
+            <a:r>
+              <a:rPr lang="en-US" sz="1200" dirty="0"/>
+              <a:t>	sl_f_mix3_[0..7]         sl_k_mix3_[0..7]        sl_p_mix3_[0..15]        sl_b_mix3_[0..15]</a:t>
+            </a:r>
+          </a:p>
+          <a:p>
+            <a:endParaRPr lang="en-US" sz="1200" dirty="0"/>
+          </a:p>
+          <a:p>
+            <a:r>
+              <a:rPr lang="en-US" sz="1200" dirty="0"/>
+              <a:t>Named as such, when you bank select using the Knob bank select keys you will automatically also select the corresponding set of Faders, Pads, and Buttons.</a:t>
+            </a:r>
+          </a:p>
+          <a:p>
+            <a:endParaRPr lang="en-US" sz="1200" dirty="0"/>
+          </a:p>
+          <a:p>
+            <a:r>
+              <a:rPr lang="en-US" sz="1200" dirty="0"/>
+              <a:t>In contrast, if you want to use the same three mixer plugins and be able to independently select which mixer plugin the Knobs, Faders, and Pads are actively controlling you must use different </a:t>
             </a:r>
             <a:r>
               <a:rPr lang="en-US" sz="1200" dirty="0" err="1"/>
-              <a:t>playhead</a:t>
-            </a:r>
+              <a:t>bankIDs</a:t>
+            </a:r>
+            <a:r>
+              <a:rPr lang="en-US" sz="1200" dirty="0"/>
+              <a:t> for each widget row.  A simple example would be:</a:t>
+            </a:r>
+          </a:p>
+          <a:p>
+            <a:r>
+              <a:rPr lang="en-US" sz="1200" dirty="0"/>
+              <a:t>	sl_f_volume1_[0..7]          sl_k_pan1_[0..7]            sl_b_mute1_[0…7]</a:t>
+            </a:r>
+          </a:p>
+          <a:p>
+            <a:r>
+              <a:rPr lang="en-US" sz="1200" dirty="0"/>
+              <a:t>	sl_f_volume2_[0..7]          sl_k_pan2_[0..7]            sl_b_mute2_[0…7]</a:t>
+            </a:r>
+          </a:p>
+          <a:p>
+            <a:r>
+              <a:rPr lang="en-US" sz="1200" dirty="0"/>
+              <a:t>	sl_f_volume3_[0..7]          sl_k_pan3_[0..7]            sl_b_mute3_[0…7]</a:t>
+            </a:r>
+          </a:p>
+          <a:p>
             <a:endParaRPr lang="en-US" sz="1200" dirty="0"/>
           </a:p>
           <a:p>
-            <a:pPr marL="628650" lvl="1" indent="-171450">
-              <a:buFont typeface="Arial" panose="020B0604020202020204" pitchFamily="34" charset="0"/>
-              <a:buChar char="•"/>
-            </a:pPr>
-            <a:r>
-              <a:rPr lang="en-US" sz="1200" dirty="0"/>
-              <a:t>“Stop” – stops the </a:t>
-            </a:r>
-            <a:r>
-              <a:rPr lang="en-US" sz="1200" dirty="0" err="1"/>
-              <a:t>playhead</a:t>
-            </a:r>
             <a:endParaRPr lang="en-US" sz="1200" dirty="0"/>
           </a:p>
           <a:p>
-            <a:pPr marL="628650" lvl="1" indent="-171450">
-              <a:buFont typeface="Arial" panose="020B0604020202020204" pitchFamily="34" charset="0"/>
-              <a:buChar char="•"/>
-            </a:pPr>
-            <a:r>
-              <a:rPr lang="en-US" sz="1200" dirty="0"/>
-              <a:t>“Clear” – toggles in and out of Setlist mode</a:t>
-            </a:r>
-          </a:p>
-          <a:p>
-            <a:pPr marL="628650" lvl="1" indent="-171450">
-              <a:buFont typeface="Arial" panose="020B0604020202020204" pitchFamily="34" charset="0"/>
-              <a:buChar char="•"/>
-            </a:pPr>
-            <a:r>
-              <a:rPr lang="en-US" sz="1200" dirty="0"/>
-              <a:t>“Grid” – toggles between displaying </a:t>
-            </a:r>
-            <a:r>
-              <a:rPr lang="en-US" sz="1200" dirty="0" err="1"/>
-              <a:t>Rackspaces</a:t>
-            </a:r>
-            <a:r>
-              <a:rPr lang="en-US" sz="1200" dirty="0"/>
-              <a:t>/Variation or Songs/</a:t>
-            </a:r>
-            <a:r>
-              <a:rPr lang="en-US" sz="1200" dirty="0" err="1"/>
-              <a:t>Songparts</a:t>
-            </a:r>
-            <a:r>
-              <a:rPr lang="en-US" sz="1200" dirty="0"/>
-              <a:t> if you are in </a:t>
-            </a:r>
-            <a:r>
-              <a:rPr lang="en-US" sz="1200" dirty="0" err="1"/>
-              <a:t>Setlist</a:t>
-            </a:r>
-            <a:r>
-              <a:rPr lang="en-US" sz="1200" dirty="0"/>
-              <a:t> Mode</a:t>
-            </a:r>
-          </a:p>
-          <a:p>
-            <a:pPr marL="628650" lvl="1" indent="-171450">
-              <a:buFont typeface="Arial" panose="020B0604020202020204" pitchFamily="34" charset="0"/>
-              <a:buChar char="•"/>
-            </a:pPr>
-            <a:r>
-              <a:rPr lang="en-US" sz="1200" dirty="0"/>
-              <a:t>“Option” – toggle the SL-MK3 displays between showing Knobs and showing Pad assignments.</a:t>
-            </a:r>
-          </a:p>
-          <a:p>
-            <a:endParaRPr lang="en-US" sz="1200" dirty="0"/>
-          </a:p>
-          <a:p>
-            <a:endParaRPr lang="en-US" sz="1200" dirty="0"/>
-          </a:p>
-          <a:p>
-            <a:r>
-              <a:rPr lang="en-US" sz="1400" b="1" dirty="0"/>
-              <a:t>Fader Controls</a:t>
-            </a:r>
-          </a:p>
-          <a:p>
-            <a:endParaRPr lang="en-US" sz="1200" dirty="0"/>
-          </a:p>
-          <a:p>
-            <a:r>
-              <a:rPr lang="en-US" sz="1200" dirty="0"/>
-              <a:t>The faders on the SL-MK3 are not motorized, which usually means that any time you change a Rackspace, Variation, Song, or </a:t>
-            </a:r>
-            <a:r>
-              <a:rPr lang="en-US" sz="1200" dirty="0" err="1"/>
-              <a:t>Songpart</a:t>
-            </a:r>
-            <a:r>
-              <a:rPr lang="en-US" sz="1200" dirty="0"/>
-              <a:t> the physical position of the faders will most likely not match the widgets they are linked to.</a:t>
-            </a:r>
-          </a:p>
-          <a:p>
-            <a:endParaRPr lang="en-US" sz="1200" dirty="0"/>
-          </a:p>
-          <a:p>
-            <a:r>
-              <a:rPr lang="en-US" sz="1200" dirty="0"/>
-              <a:t>The SL-MK3 extension uses a “catch” approach before establishing a link between an individual fader and the widget that it is controlling.  The LED above each fader indicates the status of each fader.  The color codes are:</a:t>
-            </a:r>
-          </a:p>
-          <a:p>
-            <a:pPr marL="628650" lvl="1" indent="-171450">
-              <a:buFont typeface="Arial" panose="020B0604020202020204" pitchFamily="34" charset="0"/>
-              <a:buChar char="•"/>
-            </a:pPr>
-            <a:r>
-              <a:rPr lang="en-US" sz="1200" dirty="0"/>
-              <a:t>Unlit – following Rackspace/Variation/Song/</a:t>
-            </a:r>
-            <a:r>
-              <a:rPr lang="en-US" sz="1200" dirty="0" err="1"/>
-              <a:t>Songpart</a:t>
-            </a:r>
-            <a:r>
-              <a:rPr lang="en-US" sz="1200" dirty="0"/>
-              <a:t> change it is unknown if the fader is in sync with the widget</a:t>
-            </a:r>
-          </a:p>
-          <a:p>
-            <a:pPr marL="628650" lvl="1" indent="-171450">
-              <a:buFont typeface="Arial" panose="020B0604020202020204" pitchFamily="34" charset="0"/>
-              <a:buChar char="•"/>
-            </a:pPr>
-            <a:r>
-              <a:rPr lang="en-US" sz="1200" dirty="0"/>
-              <a:t>Green – the fader on the SL-MK3 is materially higher than the value of the widget</a:t>
-            </a:r>
-          </a:p>
-          <a:p>
-            <a:pPr marL="628650" lvl="1" indent="-171450">
-              <a:buFont typeface="Arial" panose="020B0604020202020204" pitchFamily="34" charset="0"/>
-              <a:buChar char="•"/>
-            </a:pPr>
-            <a:r>
-              <a:rPr lang="en-US" sz="1200" dirty="0"/>
-              <a:t>Red – the fader is too low relative to the value of the widget</a:t>
-            </a:r>
-          </a:p>
-          <a:p>
-            <a:pPr marL="628650" lvl="1" indent="-171450">
-              <a:buFont typeface="Arial" panose="020B0604020202020204" pitchFamily="34" charset="0"/>
-              <a:buChar char="•"/>
-            </a:pPr>
-            <a:r>
-              <a:rPr lang="en-US" sz="1200" dirty="0"/>
-              <a:t>Other – the light changes to the fader bank color on the Indicator or Parameter widget when fader is in sync</a:t>
-            </a:r>
-          </a:p>
-          <a:p>
-            <a:pPr marL="628650" lvl="1" indent="-171450">
-              <a:buFont typeface="Arial" panose="020B0604020202020204" pitchFamily="34" charset="0"/>
-              <a:buChar char="•"/>
-            </a:pPr>
-            <a:endParaRPr lang="en-US" sz="1200" dirty="0"/>
-          </a:p>
-          <a:p>
-            <a:r>
-              <a:rPr lang="en-US" sz="1200" dirty="0"/>
-              <a:t>Fader bank switching is done using the round Scene buttons between the pads and faders.</a:t>
+            <a:r>
+              <a:rPr lang="en-US" sz="1200" dirty="0"/>
+              <a:t>I sometimes use a mix of both approaches in the same Rackspace.  </a:t>
             </a:r>
           </a:p>
         </p:txBody>
@@ -5162,7 +6062,7 @@
     </p:spTree>
     <p:extLst>
       <p:ext uri="{BB962C8B-B14F-4D97-AF65-F5344CB8AC3E}">
-        <p14:creationId xmlns:p14="http://schemas.microsoft.com/office/powerpoint/2010/main" val="764461086"/>
+        <p14:creationId xmlns:p14="http://schemas.microsoft.com/office/powerpoint/2010/main" val="98072306"/>
       </p:ext>
     </p:extLst>
   </p:cSld>
@@ -5198,7 +6098,7 @@
         <p:spPr>
           <a:xfrm>
             <a:off x="362992" y="369537"/>
-            <a:ext cx="8095208" cy="4955203"/>
+            <a:ext cx="8095208" cy="4985980"/>
           </a:xfrm>
           <a:prstGeom prst="rect">
             <a:avLst/>
@@ -5213,7 +6113,7 @@
           <a:p>
             <a:r>
               <a:rPr lang="en-US" sz="1400" b="1" dirty="0"/>
-              <a:t>Key Lights</a:t>
+              <a:t>Additional Controls</a:t>
             </a:r>
           </a:p>
           <a:p>
@@ -5222,7 +6122,23 @@
           <a:p>
             <a:r>
               <a:rPr lang="en-US" sz="1200" dirty="0"/>
-              <a:t>The SL MK3 key lights can be lit to show zone assignments.  Zones and their color are defined with widgets conforming to the same standard as other widgets.</a:t>
+              <a:t>The buttons immediately below the display are always assigned to select </a:t>
+            </a:r>
+            <a:r>
+              <a:rPr lang="en-US" sz="1200" dirty="0" err="1"/>
+              <a:t>Rackspaces</a:t>
+            </a:r>
+            <a:r>
+              <a:rPr lang="en-US" sz="1200" dirty="0"/>
+              <a:t>, Variations, Songs, or </a:t>
+            </a:r>
+            <a:r>
+              <a:rPr lang="en-US" sz="1200" dirty="0" err="1"/>
+              <a:t>Songparts</a:t>
+            </a:r>
+            <a:r>
+              <a:rPr lang="en-US" sz="1200" dirty="0"/>
+              <a:t>.  You can scroll through the them using the left and right arrow keys toward the bottom left of the control surface. </a:t>
             </a:r>
           </a:p>
           <a:p>
@@ -5231,57 +6147,7 @@
           <a:p>
             <a:r>
               <a:rPr lang="en-US" sz="1200" dirty="0"/>
-              <a:t>The format is:</a:t>
-            </a:r>
-          </a:p>
-          <a:p>
-            <a:r>
-              <a:rPr lang="en-US" sz="1200" dirty="0"/>
-              <a:t>	sl_zone_zoneID_0    and  sl_zone_zoneID_1</a:t>
-            </a:r>
-          </a:p>
-          <a:p>
-            <a:endParaRPr lang="en-US" sz="1200" dirty="0"/>
-          </a:p>
-          <a:p>
-            <a:r>
-              <a:rPr lang="en-US" sz="1200" dirty="0"/>
-              <a:t>The widget values map to the first and last MIDI notes of the zone.  The bottom note on the 61SL-MKII is 36, which corresponds to a widget value of 28.4.  You can calculate this as [note number / 127] * 100.</a:t>
-            </a:r>
-          </a:p>
-          <a:p>
-            <a:endParaRPr lang="en-US" sz="1200" dirty="0"/>
-          </a:p>
-          <a:p>
-            <a:r>
-              <a:rPr lang="en-US" sz="1200" dirty="0"/>
-              <a:t>The fill color of the “0” widget will be used as the RGB zone color.  You can create as many “</a:t>
-            </a:r>
-            <a:r>
-              <a:rPr lang="en-US" sz="1200" dirty="0" err="1"/>
-              <a:t>zoneID</a:t>
-            </a:r>
-            <a:r>
-              <a:rPr lang="en-US" sz="1200" dirty="0"/>
-              <a:t>” banks as you want.  Each bank will be displayed with its own color. </a:t>
-            </a:r>
-          </a:p>
-          <a:p>
-            <a:endParaRPr lang="en-US" sz="1200" dirty="0"/>
-          </a:p>
-          <a:p>
-            <a:r>
-              <a:rPr lang="en-US" sz="1200" dirty="0"/>
-              <a:t>If these widgets are linked to GP’s Midi In blocks the “0” widget should be linked to the Min Note parameter and the “1” to the Max Note parameter.</a:t>
-            </a:r>
-          </a:p>
-          <a:p>
-            <a:endParaRPr lang="en-US" sz="1200" dirty="0"/>
-          </a:p>
-          <a:p>
-            <a:r>
-              <a:rPr lang="en-US" sz="1200" dirty="0"/>
-              <a:t>If two zones overlap the color of the key LED will be the mathematical sum of the two colors.  These may not look the way you expect or want.  </a:t>
+              <a:t>Other button assignments are:</a:t>
             </a:r>
           </a:p>
           <a:p>
@@ -5291,8 +6157,13 @@
             </a:pPr>
             <a:r>
               <a:rPr lang="en-US" sz="1200" dirty="0"/>
-              <a:t>Tip:  if you look at the hexadecimal values of the three color channels (RGB) in the color picker, keep each of the channels below 0x80 and overlapping colors should look more like you’d expect.</a:t>
-            </a:r>
+              <a:t>“Play” – starts the </a:t>
+            </a:r>
+            <a:r>
+              <a:rPr lang="en-US" sz="1200" dirty="0" err="1"/>
+              <a:t>playhead</a:t>
+            </a:r>
+            <a:endParaRPr lang="en-US" sz="1200" dirty="0"/>
           </a:p>
           <a:p>
             <a:pPr marL="628650" lvl="1" indent="-171450">
@@ -5301,7 +6172,152 @@
             </a:pPr>
             <a:r>
               <a:rPr lang="en-US" sz="1200" dirty="0"/>
-              <a:t>Tip:  if you want complete control over the color of overlapping zones you can un-link your zone widgets from the MIDI in blocks, or create separate MIDI in blocks and widgets for any overlap portions.</a:t>
+              <a:t>“Stop” – stops the </a:t>
+            </a:r>
+            <a:r>
+              <a:rPr lang="en-US" sz="1200" dirty="0" err="1"/>
+              <a:t>playhead</a:t>
+            </a:r>
+            <a:endParaRPr lang="en-US" sz="1200" dirty="0"/>
+          </a:p>
+          <a:p>
+            <a:pPr marL="628650" lvl="1" indent="-171450">
+              <a:buFont typeface="Arial" panose="020B0604020202020204" pitchFamily="34" charset="0"/>
+              <a:buChar char="•"/>
+            </a:pPr>
+            <a:r>
+              <a:rPr lang="en-US" sz="1200" dirty="0"/>
+              <a:t>“Clear” – toggles in and out of Setlist mode</a:t>
+            </a:r>
+          </a:p>
+          <a:p>
+            <a:pPr marL="628650" lvl="1" indent="-171450">
+              <a:buFont typeface="Arial" panose="020B0604020202020204" pitchFamily="34" charset="0"/>
+              <a:buChar char="•"/>
+            </a:pPr>
+            <a:r>
+              <a:rPr lang="en-US" sz="1200" dirty="0"/>
+              <a:t>“Grid” – toggles between displaying </a:t>
+            </a:r>
+            <a:r>
+              <a:rPr lang="en-US" sz="1200" dirty="0" err="1"/>
+              <a:t>Rackspaces</a:t>
+            </a:r>
+            <a:r>
+              <a:rPr lang="en-US" sz="1200" dirty="0"/>
+              <a:t>/Variation or Songs/</a:t>
+            </a:r>
+            <a:r>
+              <a:rPr lang="en-US" sz="1200" dirty="0" err="1"/>
+              <a:t>Songparts</a:t>
+            </a:r>
+            <a:r>
+              <a:rPr lang="en-US" sz="1200" dirty="0"/>
+              <a:t> if you are in </a:t>
+            </a:r>
+            <a:r>
+              <a:rPr lang="en-US" sz="1200" dirty="0" err="1"/>
+              <a:t>Setlist</a:t>
+            </a:r>
+            <a:r>
+              <a:rPr lang="en-US" sz="1200" dirty="0"/>
+              <a:t> Mode</a:t>
+            </a:r>
+          </a:p>
+          <a:p>
+            <a:pPr marL="628650" lvl="1" indent="-171450">
+              <a:buFont typeface="Arial" panose="020B0604020202020204" pitchFamily="34" charset="0"/>
+              <a:buChar char="•"/>
+            </a:pPr>
+            <a:r>
+              <a:rPr lang="en-US" sz="1200" dirty="0"/>
+              <a:t>“Option” – toggle the SL-MK3 displays between showing Knobs and showing Pad assignments.</a:t>
+            </a:r>
+          </a:p>
+          <a:p>
+            <a:endParaRPr lang="en-US" sz="1200" dirty="0"/>
+          </a:p>
+          <a:p>
+            <a:endParaRPr lang="en-US" sz="1200" dirty="0"/>
+          </a:p>
+          <a:p>
+            <a:r>
+              <a:rPr lang="en-US" sz="1400" b="1" dirty="0"/>
+              <a:t>Fader Controls</a:t>
+            </a:r>
+          </a:p>
+          <a:p>
+            <a:endParaRPr lang="en-US" sz="1200" dirty="0"/>
+          </a:p>
+          <a:p>
+            <a:r>
+              <a:rPr lang="en-US" sz="1200" dirty="0"/>
+              <a:t>The faders on the SL-MK3 are not motorized, which usually means that any time you change a Rackspace, Variation, Song, or </a:t>
+            </a:r>
+            <a:r>
+              <a:rPr lang="en-US" sz="1200" dirty="0" err="1"/>
+              <a:t>Songpart</a:t>
+            </a:r>
+            <a:r>
+              <a:rPr lang="en-US" sz="1200" dirty="0"/>
+              <a:t> the physical position of the faders will most likely not match the widgets they are linked to.</a:t>
+            </a:r>
+          </a:p>
+          <a:p>
+            <a:endParaRPr lang="en-US" sz="1200" dirty="0"/>
+          </a:p>
+          <a:p>
+            <a:r>
+              <a:rPr lang="en-US" sz="1200" dirty="0"/>
+              <a:t>The SL-MK3 extension uses a “catch” approach before establishing a link between an individual fader and the widget that it is controlling.  The LED above each fader indicates the status of each fader.  The color codes are:</a:t>
+            </a:r>
+          </a:p>
+          <a:p>
+            <a:pPr marL="628650" lvl="1" indent="-171450">
+              <a:buFont typeface="Arial" panose="020B0604020202020204" pitchFamily="34" charset="0"/>
+              <a:buChar char="•"/>
+            </a:pPr>
+            <a:r>
+              <a:rPr lang="en-US" sz="1200" dirty="0"/>
+              <a:t>Unlit – following Rackspace/Variation/Song/</a:t>
+            </a:r>
+            <a:r>
+              <a:rPr lang="en-US" sz="1200" dirty="0" err="1"/>
+              <a:t>Songpart</a:t>
+            </a:r>
+            <a:r>
+              <a:rPr lang="en-US" sz="1200" dirty="0"/>
+              <a:t> change it is unknown if the fader is in sync with the widget</a:t>
+            </a:r>
+          </a:p>
+          <a:p>
+            <a:pPr marL="628650" lvl="1" indent="-171450">
+              <a:buFont typeface="Arial" panose="020B0604020202020204" pitchFamily="34" charset="0"/>
+              <a:buChar char="•"/>
+            </a:pPr>
+            <a:r>
+              <a:rPr lang="en-US" sz="1200" dirty="0"/>
+              <a:t>Green – the fader on the SL-MK3 is materially higher than the value of the widget</a:t>
+            </a:r>
+          </a:p>
+          <a:p>
+            <a:pPr marL="628650" lvl="1" indent="-171450">
+              <a:buFont typeface="Arial" panose="020B0604020202020204" pitchFamily="34" charset="0"/>
+              <a:buChar char="•"/>
+            </a:pPr>
+            <a:r>
+              <a:rPr lang="en-US" sz="1200" dirty="0"/>
+              <a:t>Red – the fader is too low relative to the value of the widget</a:t>
+            </a:r>
+          </a:p>
+          <a:p>
+            <a:pPr marL="628650" lvl="1" indent="-171450">
+              <a:buFont typeface="Arial" panose="020B0604020202020204" pitchFamily="34" charset="0"/>
+              <a:buChar char="•"/>
+            </a:pPr>
+            <a:r>
+              <a:rPr lang="en-US" sz="1200" dirty="0"/>
+              <a:t>Other – the light changes to the fader bank color on the Indicator or Parameter widget when fader is in sync</a:t>
             </a:r>
           </a:p>
           <a:p>
@@ -5314,7 +6330,7 @@
           <a:p>
             <a:r>
               <a:rPr lang="en-US" sz="1200" dirty="0"/>
-              <a:t>Note:  the key light for the highest key on the 61SL-MK3 cannot be lit through this interface.  This is a limitation of the Novation “In Control” protocol.</a:t>
+              <a:t>Fader bank switching is done using the round Scene buttons between the pads and faders.</a:t>
             </a:r>
           </a:p>
         </p:txBody>
@@ -5322,7 +6338,7 @@
     </p:spTree>
     <p:extLst>
       <p:ext uri="{BB962C8B-B14F-4D97-AF65-F5344CB8AC3E}">
-        <p14:creationId xmlns:p14="http://schemas.microsoft.com/office/powerpoint/2010/main" val="1412992480"/>
+        <p14:creationId xmlns:p14="http://schemas.microsoft.com/office/powerpoint/2010/main" val="764461086"/>
       </p:ext>
     </p:extLst>
   </p:cSld>
@@ -5358,7 +6374,7 @@
         <p:spPr>
           <a:xfrm>
             <a:off x="362992" y="369537"/>
-            <a:ext cx="8095208" cy="2739211"/>
+            <a:ext cx="8095208" cy="4955203"/>
           </a:xfrm>
           <a:prstGeom prst="rect">
             <a:avLst/>
@@ -5373,7 +6389,7 @@
           <a:p>
             <a:r>
               <a:rPr lang="en-US" sz="1400" b="1" dirty="0"/>
-              <a:t>Additional Comments</a:t>
+              <a:t>Key Lights</a:t>
             </a:r>
           </a:p>
           <a:p>
@@ -5382,7 +6398,7 @@
           <a:p>
             <a:r>
               <a:rPr lang="en-US" sz="1200" dirty="0"/>
-              <a:t>The only Transport buttons integrated into the extension are the Play and Stop buttons.  The others are not used.</a:t>
+              <a:t>The SL MK3 key lights can be lit to show zone assignments.  Zones and their color are defined with widgets conforming to the same standard as other widgets.</a:t>
             </a:r>
           </a:p>
           <a:p>
@@ -5391,7 +6407,13 @@
           <a:p>
             <a:r>
               <a:rPr lang="en-US" sz="1200" dirty="0"/>
-              <a:t>You can open the Script Logger window in GP and see some level of debugging detail that might help if you encounter odd behavior.  Probably not, though, because I try to keep it to a minimum in the released versions.</a:t>
+              <a:t>The format is:</a:t>
+            </a:r>
+          </a:p>
+          <a:p>
+            <a:r>
+              <a:rPr lang="en-US" sz="1200" dirty="0"/>
+              <a:t>	sl_zone_zoneID_0    and  sl_zone_zoneID_1</a:t>
             </a:r>
           </a:p>
           <a:p>
@@ -5400,15 +6422,24 @@
           <a:p>
             <a:r>
               <a:rPr lang="en-US" sz="1200" dirty="0"/>
-              <a:t>Configuring the details of how things are displayed can take a lot of extra widgets.  I usually hide these in my </a:t>
+              <a:t>The widget values map to the first and last MIDI notes of the zone.  The bottom note on the 61SL-MKII is 36, which corresponds to a widget value of 28.4.  You can calculate this as [note number / 127] * 100.</a:t>
+            </a:r>
+          </a:p>
+          <a:p>
+            <a:endParaRPr lang="en-US" sz="1200" dirty="0"/>
+          </a:p>
+          <a:p>
+            <a:r>
+              <a:rPr lang="en-US" sz="1200" dirty="0"/>
+              <a:t>The fill color of the “0” widget will be used as the RGB zone color.  You can create as many “</a:t>
             </a:r>
             <a:r>
               <a:rPr lang="en-US" sz="1200" dirty="0" err="1"/>
-              <a:t>rackspaces</a:t>
-            </a:r>
-            <a:r>
-              <a:rPr lang="en-US" sz="1200" dirty="0"/>
-              <a:t>, which means they’re only visible in Edit mode.  I tend to put them near (or even right on top of) the widgets they’re associated with.</a:t>
+              <a:t>zoneID</a:t>
+            </a:r>
+            <a:r>
+              <a:rPr lang="en-US" sz="1200" dirty="0"/>
+              <a:t>” banks as you want.  Each bank will be displayed with its own color. </a:t>
             </a:r>
           </a:p>
           <a:p>
@@ -5417,21 +6448,147 @@
           <a:p>
             <a:r>
               <a:rPr lang="en-US" sz="1200" dirty="0"/>
-              <a:t>At times I’ve considered storing the configuration data in a separate file rather than extra widgets.  I always conclude that this would make things less reliable, more confusing, more difficult for the user, and require more user effort to keep files in sync.</a:t>
-            </a:r>
-          </a:p>
-          <a:p>
-            <a:endParaRPr lang="en-US" sz="1200"/>
+              <a:t>If these widgets are linked to GP’s Midi In blocks the “0” widget should be linked to the Min Note parameter and the “1” to the Max Note parameter.</a:t>
+            </a:r>
           </a:p>
           <a:p>
             <a:endParaRPr lang="en-US" sz="1200" dirty="0"/>
           </a:p>
-        </p:txBody>
-      </p:sp>
+          <a:p>
+            <a:r>
+              <a:rPr lang="en-US" sz="1200" dirty="0"/>
+              <a:t>If two zones overlap the color of the key LED will be the mathematical sum of the two colors.  These may not look the way you expect or want.  </a:t>
+            </a:r>
+          </a:p>
+          <a:p>
+            <a:pPr marL="628650" lvl="1" indent="-171450">
+              <a:buFont typeface="Arial" panose="020B0604020202020204" pitchFamily="34" charset="0"/>
+              <a:buChar char="•"/>
+            </a:pPr>
+            <a:r>
+              <a:rPr lang="en-US" sz="1200" dirty="0"/>
+              <a:t>Tip:  if you look at the hexadecimal values of the three color channels (RGB) in the color picker, keep each of the channels below 0x80 and overlapping colors should look more like you’d expect.</a:t>
+            </a:r>
+          </a:p>
+          <a:p>
+            <a:pPr marL="628650" lvl="1" indent="-171450">
+              <a:buFont typeface="Arial" panose="020B0604020202020204" pitchFamily="34" charset="0"/>
+              <a:buChar char="•"/>
+            </a:pPr>
+            <a:r>
+              <a:rPr lang="en-US" sz="1200" dirty="0"/>
+              <a:t>Tip:  if you want complete control over the color of overlapping zones you can un-link your zone widgets from the MIDI in blocks, or create separate MIDI in blocks and widgets for any overlap portions.</a:t>
+            </a:r>
+          </a:p>
+          <a:p>
+            <a:pPr marL="628650" lvl="1" indent="-171450">
+              <a:buFont typeface="Arial" panose="020B0604020202020204" pitchFamily="34" charset="0"/>
+              <a:buChar char="•"/>
+            </a:pPr>
+            <a:endParaRPr lang="en-US" sz="1200" dirty="0"/>
+          </a:p>
+          <a:p>
+            <a:r>
+              <a:rPr lang="en-US" sz="1200" dirty="0"/>
+              <a:t>Note:  the key light for the highest key on the 61SL-MK3 cannot be lit through this interface.  This is a limitation of the Novation “In Control” protocol.</a:t>
+            </a:r>
+          </a:p>
+        </p:txBody>
+      </p:sp>
+      <p:pic>
+        <p:nvPicPr>
+          <p:cNvPr id="8" name="Picture 7">
+            <a:extLst>
+              <a:ext uri="{FF2B5EF4-FFF2-40B4-BE49-F238E27FC236}">
+                <a16:creationId xmlns:a16="http://schemas.microsoft.com/office/drawing/2014/main" id="{DFFF16D3-7D2B-C2AB-374E-A2EFEDEA2E7C}"/>
+              </a:ext>
+            </a:extLst>
+          </p:cNvPr>
+          <p:cNvPicPr>
+            <a:picLocks noChangeAspect="1"/>
+          </p:cNvPicPr>
+          <p:nvPr/>
+        </p:nvPicPr>
+        <p:blipFill>
+          <a:blip r:embed="rId2"/>
+          <a:stretch>
+            <a:fillRect/>
+          </a:stretch>
+        </p:blipFill>
+        <p:spPr>
+          <a:xfrm>
+            <a:off x="2453270" y="5616226"/>
+            <a:ext cx="2842800" cy="852840"/>
+          </a:xfrm>
+          <a:prstGeom prst="rect">
+            <a:avLst/>
+          </a:prstGeom>
+        </p:spPr>
+      </p:pic>
+      <p:pic>
+        <p:nvPicPr>
+          <p:cNvPr id="10" name="Picture 9">
+            <a:extLst>
+              <a:ext uri="{FF2B5EF4-FFF2-40B4-BE49-F238E27FC236}">
+                <a16:creationId xmlns:a16="http://schemas.microsoft.com/office/drawing/2014/main" id="{FFE9C4C3-2ADC-E5EC-3F48-FC4C78E1C94C}"/>
+              </a:ext>
+            </a:extLst>
+          </p:cNvPr>
+          <p:cNvPicPr>
+            <a:picLocks noChangeAspect="1"/>
+          </p:cNvPicPr>
+          <p:nvPr/>
+        </p:nvPicPr>
+        <p:blipFill>
+          <a:blip r:embed="rId3"/>
+          <a:stretch>
+            <a:fillRect/>
+          </a:stretch>
+        </p:blipFill>
+        <p:spPr>
+          <a:xfrm>
+            <a:off x="5352586" y="5606992"/>
+            <a:ext cx="2490439" cy="862074"/>
+          </a:xfrm>
+          <a:prstGeom prst="rect">
+            <a:avLst/>
+          </a:prstGeom>
+        </p:spPr>
+      </p:pic>
+      <p:pic>
+        <p:nvPicPr>
+          <p:cNvPr id="12" name="Picture 11">
+            <a:extLst>
+              <a:ext uri="{FF2B5EF4-FFF2-40B4-BE49-F238E27FC236}">
+                <a16:creationId xmlns:a16="http://schemas.microsoft.com/office/drawing/2014/main" id="{68720E48-0193-8C02-39EA-C8135DB5F2EA}"/>
+              </a:ext>
+            </a:extLst>
+          </p:cNvPr>
+          <p:cNvPicPr>
+            <a:picLocks noChangeAspect="1"/>
+          </p:cNvPicPr>
+          <p:nvPr/>
+        </p:nvPicPr>
+        <p:blipFill>
+          <a:blip r:embed="rId4"/>
+          <a:stretch>
+            <a:fillRect/>
+          </a:stretch>
+        </p:blipFill>
+        <p:spPr>
+          <a:xfrm>
+            <a:off x="1039155" y="5725938"/>
+            <a:ext cx="1044030" cy="624894"/>
+          </a:xfrm>
+          <a:prstGeom prst="rect">
+            <a:avLst/>
+          </a:prstGeom>
+        </p:spPr>
+      </p:pic>
     </p:spTree>
     <p:extLst>
       <p:ext uri="{BB962C8B-B14F-4D97-AF65-F5344CB8AC3E}">
-        <p14:creationId xmlns:p14="http://schemas.microsoft.com/office/powerpoint/2010/main" val="1060359456"/>
+        <p14:creationId xmlns:p14="http://schemas.microsoft.com/office/powerpoint/2010/main" val="1412992480"/>
       </p:ext>
     </p:extLst>
   </p:cSld>

</xml_diff>